<commit_message>
update presentation outline. spend at least four hours tomorrow actually making slides. ...
</commit_message>
<xml_diff>
--- a/notes/presentation.pptx
+++ b/notes/presentation.pptx
@@ -2,8 +2,11 @@
 <file path=ppt/presentation.xml><?xml version="1.0" encoding="utf-8"?>
 <p:presentation xmlns:a="http://schemas.openxmlformats.org/drawingml/2006/main" xmlns:r="http://schemas.openxmlformats.org/officeDocument/2006/relationships" xmlns:p="http://schemas.openxmlformats.org/presentationml/2006/main" saveSubsetFonts="1">
   <p:sldMasterIdLst>
-    <p:sldMasterId id="2147483648" r:id="rId1"/>
+    <p:sldMasterId id="2147483672" r:id="rId1"/>
   </p:sldMasterIdLst>
+  <p:notesMasterIdLst>
+    <p:notesMasterId r:id="rId3"/>
+  </p:notesMasterIdLst>
   <p:sldIdLst>
     <p:sldId id="256" r:id="rId2"/>
   </p:sldIdLst>
@@ -104,12 +107,22 @@
       </a:defRPr>
     </a:lvl9pPr>
   </p:defaultTextStyle>
+  <p:extLst>
+    <p:ext uri="{EFAFB233-063F-42B5-8137-9DF3F51BA10A}">
+      <p15:sldGuideLst xmlns:p15="http://schemas.microsoft.com/office/powerpoint/2012/main"/>
+    </p:ext>
+  </p:extLst>
 </p:presentation>
 </file>
 
-<file path=ppt/slideLayouts/slideLayout1.xml><?xml version="1.0" encoding="utf-8"?>
-<p:sldLayout xmlns:a="http://schemas.openxmlformats.org/drawingml/2006/main" xmlns:r="http://schemas.openxmlformats.org/officeDocument/2006/relationships" xmlns:p="http://schemas.openxmlformats.org/presentationml/2006/main" type="title" preserve="1">
-  <p:cSld name="Title Slide">
+<file path=ppt/notesMasters/notesMaster1.xml><?xml version="1.0" encoding="utf-8"?>
+<p:notesMaster xmlns:a="http://schemas.openxmlformats.org/drawingml/2006/main" xmlns:r="http://schemas.openxmlformats.org/officeDocument/2006/relationships" xmlns:p="http://schemas.openxmlformats.org/presentationml/2006/main">
+  <p:cSld>
+    <p:bg>
+      <p:bgRef idx="1001">
+        <a:schemeClr val="bg1"/>
+      </p:bgRef>
+    </p:bg>
     <p:spTree>
       <p:nvGrpSpPr>
         <p:cNvPr id="1" name=""/>
@@ -126,135 +139,65 @@
       </p:grpSpPr>
       <p:sp>
         <p:nvSpPr>
-          <p:cNvPr id="2" name="Title 1">
-            <a:extLst>
-              <a:ext uri="{FF2B5EF4-FFF2-40B4-BE49-F238E27FC236}">
-                <a16:creationId xmlns:a16="http://schemas.microsoft.com/office/drawing/2014/main" id="{3A71FA5E-6CE0-4B80-982A-823C1310235C}"/>
-              </a:ext>
-            </a:extLst>
-          </p:cNvPr>
-          <p:cNvSpPr>
-            <a:spLocks noGrp="1"/>
-          </p:cNvSpPr>
-          <p:nvPr>
-            <p:ph type="ctrTitle"/>
+          <p:cNvPr id="2" name="Header Placeholder 1"/>
+          <p:cNvSpPr>
+            <a:spLocks noGrp="1"/>
+          </p:cNvSpPr>
+          <p:nvPr>
+            <p:ph type="hdr" sz="quarter"/>
           </p:nvPr>
         </p:nvSpPr>
         <p:spPr>
           <a:xfrm>
-            <a:off x="1524000" y="1122363"/>
-            <a:ext cx="9144000" cy="2387600"/>
+            <a:off x="0" y="0"/>
+            <a:ext cx="2971800" cy="458788"/>
           </a:xfrm>
+          <a:prstGeom prst="rect">
+            <a:avLst/>
+          </a:prstGeom>
         </p:spPr>
         <p:txBody>
-          <a:bodyPr anchor="b"/>
+          <a:bodyPr vert="horz" lIns="91440" tIns="45720" rIns="91440" bIns="45720" rtlCol="0"/>
           <a:lstStyle>
-            <a:lvl1pPr algn="ctr">
-              <a:defRPr sz="6000"/>
+            <a:lvl1pPr algn="l">
+              <a:defRPr sz="1200"/>
             </a:lvl1pPr>
           </a:lstStyle>
           <a:p>
-            <a:r>
-              <a:rPr lang="en-US"/>
-              <a:t>Click to edit Master title style</a:t>
-            </a:r>
-          </a:p>
-        </p:txBody>
-      </p:sp>
-      <p:sp>
-        <p:nvSpPr>
-          <p:cNvPr id="3" name="Subtitle 2">
-            <a:extLst>
-              <a:ext uri="{FF2B5EF4-FFF2-40B4-BE49-F238E27FC236}">
-                <a16:creationId xmlns:a16="http://schemas.microsoft.com/office/drawing/2014/main" id="{8C3B9E91-ECCE-4721-AF2C-10C905E8D06A}"/>
-              </a:ext>
-            </a:extLst>
-          </p:cNvPr>
-          <p:cNvSpPr>
-            <a:spLocks noGrp="1"/>
-          </p:cNvSpPr>
-          <p:nvPr>
-            <p:ph type="subTitle" idx="1"/>
+            <a:endParaRPr lang="en-US"/>
+          </a:p>
+        </p:txBody>
+      </p:sp>
+      <p:sp>
+        <p:nvSpPr>
+          <p:cNvPr id="3" name="Date Placeholder 2"/>
+          <p:cNvSpPr>
+            <a:spLocks noGrp="1"/>
+          </p:cNvSpPr>
+          <p:nvPr>
+            <p:ph type="dt" idx="1"/>
           </p:nvPr>
         </p:nvSpPr>
         <p:spPr>
           <a:xfrm>
-            <a:off x="1524000" y="3602038"/>
-            <a:ext cx="9144000" cy="1655762"/>
+            <a:off x="3884613" y="0"/>
+            <a:ext cx="2971800" cy="458788"/>
           </a:xfrm>
+          <a:prstGeom prst="rect">
+            <a:avLst/>
+          </a:prstGeom>
         </p:spPr>
         <p:txBody>
-          <a:bodyPr/>
+          <a:bodyPr vert="horz" lIns="91440" tIns="45720" rIns="91440" bIns="45720" rtlCol="0"/>
           <a:lstStyle>
-            <a:lvl1pPr marL="0" indent="0" algn="ctr">
-              <a:buNone/>
-              <a:defRPr sz="2400"/>
+            <a:lvl1pPr algn="r">
+              <a:defRPr sz="1200"/>
             </a:lvl1pPr>
-            <a:lvl2pPr marL="457200" indent="0" algn="ctr">
-              <a:buNone/>
-              <a:defRPr sz="2000"/>
-            </a:lvl2pPr>
-            <a:lvl3pPr marL="914400" indent="0" algn="ctr">
-              <a:buNone/>
-              <a:defRPr sz="1800"/>
-            </a:lvl3pPr>
-            <a:lvl4pPr marL="1371600" indent="0" algn="ctr">
-              <a:buNone/>
-              <a:defRPr sz="1600"/>
-            </a:lvl4pPr>
-            <a:lvl5pPr marL="1828800" indent="0" algn="ctr">
-              <a:buNone/>
-              <a:defRPr sz="1600"/>
-            </a:lvl5pPr>
-            <a:lvl6pPr marL="2286000" indent="0" algn="ctr">
-              <a:buNone/>
-              <a:defRPr sz="1600"/>
-            </a:lvl6pPr>
-            <a:lvl7pPr marL="2743200" indent="0" algn="ctr">
-              <a:buNone/>
-              <a:defRPr sz="1600"/>
-            </a:lvl7pPr>
-            <a:lvl8pPr marL="3200400" indent="0" algn="ctr">
-              <a:buNone/>
-              <a:defRPr sz="1600"/>
-            </a:lvl8pPr>
-            <a:lvl9pPr marL="3657600" indent="0" algn="ctr">
-              <a:buNone/>
-              <a:defRPr sz="1600"/>
-            </a:lvl9pPr>
           </a:lstStyle>
           <a:p>
-            <a:r>
-              <a:rPr lang="en-US"/>
-              <a:t>Click to edit Master subtitle style</a:t>
-            </a:r>
-          </a:p>
-        </p:txBody>
-      </p:sp>
-      <p:sp>
-        <p:nvSpPr>
-          <p:cNvPr id="4" name="Date Placeholder 3">
-            <a:extLst>
-              <a:ext uri="{FF2B5EF4-FFF2-40B4-BE49-F238E27FC236}">
-                <a16:creationId xmlns:a16="http://schemas.microsoft.com/office/drawing/2014/main" id="{714C08FD-D5D7-49B6-93E1-69CF54AE5E61}"/>
-              </a:ext>
-            </a:extLst>
-          </p:cNvPr>
-          <p:cNvSpPr>
-            <a:spLocks noGrp="1"/>
-          </p:cNvSpPr>
-          <p:nvPr>
-            <p:ph type="dt" sz="half" idx="10"/>
-          </p:nvPr>
-        </p:nvSpPr>
-        <p:spPr/>
-        <p:txBody>
-          <a:bodyPr/>
-          <a:lstStyle/>
-          <a:p>
-            <a:fld id="{A71E6E4A-F1E9-49B1-A7E6-64E029784417}" type="datetimeFigureOut">
-              <a:rPr lang="en-US" smtClean="0"/>
-              <a:t>8/6/2019</a:t>
+            <a:fld id="{FDF96BE0-DDC8-4B5A-BC10-EDDAFF2A2D2D}" type="datetimeFigureOut">
+              <a:rPr lang="en-US" smtClean="0"/>
+              <a:t>8/7/2019</a:t>
             </a:fld>
             <a:endParaRPr lang="en-US"/>
           </a:p>
@@ -262,23 +205,31 @@
       </p:sp>
       <p:sp>
         <p:nvSpPr>
-          <p:cNvPr id="5" name="Footer Placeholder 4">
-            <a:extLst>
-              <a:ext uri="{FF2B5EF4-FFF2-40B4-BE49-F238E27FC236}">
-                <a16:creationId xmlns:a16="http://schemas.microsoft.com/office/drawing/2014/main" id="{43BFB5D6-8D6D-4676-8302-9993C934817B}"/>
-              </a:ext>
-            </a:extLst>
-          </p:cNvPr>
-          <p:cNvSpPr>
-            <a:spLocks noGrp="1"/>
-          </p:cNvSpPr>
-          <p:nvPr>
-            <p:ph type="ftr" sz="quarter" idx="11"/>
-          </p:nvPr>
-        </p:nvSpPr>
-        <p:spPr/>
-        <p:txBody>
-          <a:bodyPr/>
+          <p:cNvPr id="4" name="Slide Image Placeholder 3"/>
+          <p:cNvSpPr>
+            <a:spLocks noGrp="1" noRot="1" noChangeAspect="1"/>
+          </p:cNvSpPr>
+          <p:nvPr>
+            <p:ph type="sldImg" idx="2"/>
+          </p:nvPr>
+        </p:nvSpPr>
+        <p:spPr>
+          <a:xfrm>
+            <a:off x="685800" y="1143000"/>
+            <a:ext cx="5486400" cy="3086100"/>
+          </a:xfrm>
+          <a:prstGeom prst="rect">
+            <a:avLst/>
+          </a:prstGeom>
+          <a:noFill/>
+          <a:ln w="12700">
+            <a:solidFill>
+              <a:prstClr val="black"/>
+            </a:solidFill>
+          </a:ln>
+        </p:spPr>
+        <p:txBody>
+          <a:bodyPr vert="horz" lIns="91440" tIns="45720" rIns="91440" bIns="45720" rtlCol="0" anchor="ctr"/>
           <a:lstStyle/>
           <a:p>
             <a:endParaRPr lang="en-US"/>
@@ -287,26 +238,123 @@
       </p:sp>
       <p:sp>
         <p:nvSpPr>
-          <p:cNvPr id="6" name="Slide Number Placeholder 5">
-            <a:extLst>
-              <a:ext uri="{FF2B5EF4-FFF2-40B4-BE49-F238E27FC236}">
-                <a16:creationId xmlns:a16="http://schemas.microsoft.com/office/drawing/2014/main" id="{385B38EC-F56B-4351-9D4E-5A7870C5D099}"/>
-              </a:ext>
-            </a:extLst>
-          </p:cNvPr>
-          <p:cNvSpPr>
-            <a:spLocks noGrp="1"/>
-          </p:cNvSpPr>
-          <p:nvPr>
-            <p:ph type="sldNum" sz="quarter" idx="12"/>
-          </p:nvPr>
-        </p:nvSpPr>
-        <p:spPr/>
-        <p:txBody>
-          <a:bodyPr/>
-          <a:lstStyle/>
-          <a:p>
-            <a:fld id="{AEAEF7F8-C9E9-43F4-AB41-B24E5AA34872}" type="slidenum">
+          <p:cNvPr id="5" name="Notes Placeholder 4"/>
+          <p:cNvSpPr>
+            <a:spLocks noGrp="1"/>
+          </p:cNvSpPr>
+          <p:nvPr>
+            <p:ph type="body" sz="quarter" idx="3"/>
+          </p:nvPr>
+        </p:nvSpPr>
+        <p:spPr>
+          <a:xfrm>
+            <a:off x="685800" y="4400550"/>
+            <a:ext cx="5486400" cy="3600450"/>
+          </a:xfrm>
+          <a:prstGeom prst="rect">
+            <a:avLst/>
+          </a:prstGeom>
+        </p:spPr>
+        <p:txBody>
+          <a:bodyPr vert="horz" lIns="91440" tIns="45720" rIns="91440" bIns="45720" rtlCol="0"/>
+          <a:lstStyle/>
+          <a:p>
+            <a:pPr lvl="0"/>
+            <a:r>
+              <a:rPr lang="en-US" smtClean="0"/>
+              <a:t>Edit Master text styles</a:t>
+            </a:r>
+          </a:p>
+          <a:p>
+            <a:pPr lvl="1"/>
+            <a:r>
+              <a:rPr lang="en-US" smtClean="0"/>
+              <a:t>Second level</a:t>
+            </a:r>
+          </a:p>
+          <a:p>
+            <a:pPr lvl="2"/>
+            <a:r>
+              <a:rPr lang="en-US" smtClean="0"/>
+              <a:t>Third level</a:t>
+            </a:r>
+          </a:p>
+          <a:p>
+            <a:pPr lvl="3"/>
+            <a:r>
+              <a:rPr lang="en-US" smtClean="0"/>
+              <a:t>Fourth level</a:t>
+            </a:r>
+          </a:p>
+          <a:p>
+            <a:pPr lvl="4"/>
+            <a:r>
+              <a:rPr lang="en-US" smtClean="0"/>
+              <a:t>Fifth level</a:t>
+            </a:r>
+            <a:endParaRPr lang="en-US"/>
+          </a:p>
+        </p:txBody>
+      </p:sp>
+      <p:sp>
+        <p:nvSpPr>
+          <p:cNvPr id="6" name="Footer Placeholder 5"/>
+          <p:cNvSpPr>
+            <a:spLocks noGrp="1"/>
+          </p:cNvSpPr>
+          <p:nvPr>
+            <p:ph type="ftr" sz="quarter" idx="4"/>
+          </p:nvPr>
+        </p:nvSpPr>
+        <p:spPr>
+          <a:xfrm>
+            <a:off x="0" y="8685213"/>
+            <a:ext cx="2971800" cy="458787"/>
+          </a:xfrm>
+          <a:prstGeom prst="rect">
+            <a:avLst/>
+          </a:prstGeom>
+        </p:spPr>
+        <p:txBody>
+          <a:bodyPr vert="horz" lIns="91440" tIns="45720" rIns="91440" bIns="45720" rtlCol="0" anchor="b"/>
+          <a:lstStyle>
+            <a:lvl1pPr algn="l">
+              <a:defRPr sz="1200"/>
+            </a:lvl1pPr>
+          </a:lstStyle>
+          <a:p>
+            <a:endParaRPr lang="en-US"/>
+          </a:p>
+        </p:txBody>
+      </p:sp>
+      <p:sp>
+        <p:nvSpPr>
+          <p:cNvPr id="7" name="Slide Number Placeholder 6"/>
+          <p:cNvSpPr>
+            <a:spLocks noGrp="1"/>
+          </p:cNvSpPr>
+          <p:nvPr>
+            <p:ph type="sldNum" sz="quarter" idx="5"/>
+          </p:nvPr>
+        </p:nvSpPr>
+        <p:spPr>
+          <a:xfrm>
+            <a:off x="3884613" y="8685213"/>
+            <a:ext cx="2971800" cy="458787"/>
+          </a:xfrm>
+          <a:prstGeom prst="rect">
+            <a:avLst/>
+          </a:prstGeom>
+        </p:spPr>
+        <p:txBody>
+          <a:bodyPr vert="horz" lIns="91440" tIns="45720" rIns="91440" bIns="45720" rtlCol="0" anchor="b"/>
+          <a:lstStyle>
+            <a:lvl1pPr algn="r">
+              <a:defRPr sz="1200"/>
+            </a:lvl1pPr>
+          </a:lstStyle>
+          <a:p>
+            <a:fld id="{825F0330-01FC-4A5E-B2BE-FD83AA068E80}" type="slidenum">
               <a:rPr lang="en-US" smtClean="0"/>
               <a:t>‹#›</a:t>
             </a:fld>
@@ -317,12 +365,832 @@
     </p:spTree>
     <p:extLst>
       <p:ext uri="{BB962C8B-B14F-4D97-AF65-F5344CB8AC3E}">
-        <p14:creationId xmlns:p14="http://schemas.microsoft.com/office/powerpoint/2010/main" val="2417067225"/>
+        <p14:creationId xmlns:p14="http://schemas.microsoft.com/office/powerpoint/2010/main" val="1737432821"/>
+      </p:ext>
+    </p:extLst>
+  </p:cSld>
+  <p:clrMap bg1="lt1" tx1="dk1" bg2="lt2" tx2="dk2" accent1="accent1" accent2="accent2" accent3="accent3" accent4="accent4" accent5="accent5" accent6="accent6" hlink="hlink" folHlink="folHlink"/>
+  <p:notesStyle>
+    <a:lvl1pPr marL="0" algn="l" defTabSz="914400" rtl="0" eaLnBrk="1" latinLnBrk="0" hangingPunct="1">
+      <a:defRPr sz="1200" kern="1200">
+        <a:solidFill>
+          <a:schemeClr val="tx1"/>
+        </a:solidFill>
+        <a:latin typeface="+mn-lt"/>
+        <a:ea typeface="+mn-ea"/>
+        <a:cs typeface="+mn-cs"/>
+      </a:defRPr>
+    </a:lvl1pPr>
+    <a:lvl2pPr marL="457200" algn="l" defTabSz="914400" rtl="0" eaLnBrk="1" latinLnBrk="0" hangingPunct="1">
+      <a:defRPr sz="1200" kern="1200">
+        <a:solidFill>
+          <a:schemeClr val="tx1"/>
+        </a:solidFill>
+        <a:latin typeface="+mn-lt"/>
+        <a:ea typeface="+mn-ea"/>
+        <a:cs typeface="+mn-cs"/>
+      </a:defRPr>
+    </a:lvl2pPr>
+    <a:lvl3pPr marL="914400" algn="l" defTabSz="914400" rtl="0" eaLnBrk="1" latinLnBrk="0" hangingPunct="1">
+      <a:defRPr sz="1200" kern="1200">
+        <a:solidFill>
+          <a:schemeClr val="tx1"/>
+        </a:solidFill>
+        <a:latin typeface="+mn-lt"/>
+        <a:ea typeface="+mn-ea"/>
+        <a:cs typeface="+mn-cs"/>
+      </a:defRPr>
+    </a:lvl3pPr>
+    <a:lvl4pPr marL="1371600" algn="l" defTabSz="914400" rtl="0" eaLnBrk="1" latinLnBrk="0" hangingPunct="1">
+      <a:defRPr sz="1200" kern="1200">
+        <a:solidFill>
+          <a:schemeClr val="tx1"/>
+        </a:solidFill>
+        <a:latin typeface="+mn-lt"/>
+        <a:ea typeface="+mn-ea"/>
+        <a:cs typeface="+mn-cs"/>
+      </a:defRPr>
+    </a:lvl4pPr>
+    <a:lvl5pPr marL="1828800" algn="l" defTabSz="914400" rtl="0" eaLnBrk="1" latinLnBrk="0" hangingPunct="1">
+      <a:defRPr sz="1200" kern="1200">
+        <a:solidFill>
+          <a:schemeClr val="tx1"/>
+        </a:solidFill>
+        <a:latin typeface="+mn-lt"/>
+        <a:ea typeface="+mn-ea"/>
+        <a:cs typeface="+mn-cs"/>
+      </a:defRPr>
+    </a:lvl5pPr>
+    <a:lvl6pPr marL="2286000" algn="l" defTabSz="914400" rtl="0" eaLnBrk="1" latinLnBrk="0" hangingPunct="1">
+      <a:defRPr sz="1200" kern="1200">
+        <a:solidFill>
+          <a:schemeClr val="tx1"/>
+        </a:solidFill>
+        <a:latin typeface="+mn-lt"/>
+        <a:ea typeface="+mn-ea"/>
+        <a:cs typeface="+mn-cs"/>
+      </a:defRPr>
+    </a:lvl6pPr>
+    <a:lvl7pPr marL="2743200" algn="l" defTabSz="914400" rtl="0" eaLnBrk="1" latinLnBrk="0" hangingPunct="1">
+      <a:defRPr sz="1200" kern="1200">
+        <a:solidFill>
+          <a:schemeClr val="tx1"/>
+        </a:solidFill>
+        <a:latin typeface="+mn-lt"/>
+        <a:ea typeface="+mn-ea"/>
+        <a:cs typeface="+mn-cs"/>
+      </a:defRPr>
+    </a:lvl7pPr>
+    <a:lvl8pPr marL="3200400" algn="l" defTabSz="914400" rtl="0" eaLnBrk="1" latinLnBrk="0" hangingPunct="1">
+      <a:defRPr sz="1200" kern="1200">
+        <a:solidFill>
+          <a:schemeClr val="tx1"/>
+        </a:solidFill>
+        <a:latin typeface="+mn-lt"/>
+        <a:ea typeface="+mn-ea"/>
+        <a:cs typeface="+mn-cs"/>
+      </a:defRPr>
+    </a:lvl8pPr>
+    <a:lvl9pPr marL="3657600" algn="l" defTabSz="914400" rtl="0" eaLnBrk="1" latinLnBrk="0" hangingPunct="1">
+      <a:defRPr sz="1200" kern="1200">
+        <a:solidFill>
+          <a:schemeClr val="tx1"/>
+        </a:solidFill>
+        <a:latin typeface="+mn-lt"/>
+        <a:ea typeface="+mn-ea"/>
+        <a:cs typeface="+mn-cs"/>
+      </a:defRPr>
+    </a:lvl9pPr>
+  </p:notesStyle>
+</p:notesMaster>
+</file>
+
+<file path=ppt/notesSlides/notesSlide1.xml><?xml version="1.0" encoding="utf-8"?>
+<p:notes xmlns:a="http://schemas.openxmlformats.org/drawingml/2006/main" xmlns:r="http://schemas.openxmlformats.org/officeDocument/2006/relationships" xmlns:p="http://schemas.openxmlformats.org/presentationml/2006/main">
+  <p:cSld>
+    <p:spTree>
+      <p:nvGrpSpPr>
+        <p:cNvPr id="1" name=""/>
+        <p:cNvGrpSpPr/>
+        <p:nvPr/>
+      </p:nvGrpSpPr>
+      <p:grpSpPr>
+        <a:xfrm>
+          <a:off x="0" y="0"/>
+          <a:ext cx="0" cy="0"/>
+          <a:chOff x="0" y="0"/>
+          <a:chExt cx="0" cy="0"/>
+        </a:xfrm>
+      </p:grpSpPr>
+      <p:sp>
+        <p:nvSpPr>
+          <p:cNvPr id="2" name="Slide Image Placeholder 1"/>
+          <p:cNvSpPr>
+            <a:spLocks noGrp="1" noRot="1" noChangeAspect="1"/>
+          </p:cNvSpPr>
+          <p:nvPr>
+            <p:ph type="sldImg"/>
+          </p:nvPr>
+        </p:nvSpPr>
+        <p:spPr/>
+      </p:sp>
+      <p:sp>
+        <p:nvSpPr>
+          <p:cNvPr id="3" name="Notes Placeholder 2"/>
+          <p:cNvSpPr>
+            <a:spLocks noGrp="1"/>
+          </p:cNvSpPr>
+          <p:nvPr>
+            <p:ph type="body" idx="1"/>
+          </p:nvPr>
+        </p:nvSpPr>
+        <p:spPr/>
+        <p:txBody>
+          <a:bodyPr/>
+          <a:lstStyle/>
+          <a:p>
+            <a:r>
+              <a:rPr lang="en-US" dirty="0" smtClean="0"/>
+              <a:t>“Finding and</a:t>
+            </a:r>
+            <a:r>
+              <a:rPr lang="en-US" baseline="0" dirty="0" smtClean="0"/>
+              <a:t> evaluating RNA motifs” – title?</a:t>
+            </a:r>
+          </a:p>
+          <a:p>
+            <a:endParaRPr lang="en-US" baseline="0" dirty="0" smtClean="0"/>
+          </a:p>
+          <a:p>
+            <a:r>
+              <a:rPr lang="en-US" baseline="0" dirty="0" smtClean="0"/>
+              <a:t>01: Introduction (2m?)</a:t>
+            </a:r>
+          </a:p>
+          <a:p>
+            <a:r>
+              <a:rPr lang="en-US" baseline="0" dirty="0" smtClean="0"/>
+              <a:t>Hello everyone! So this is “it” huh? </a:t>
+            </a:r>
+          </a:p>
+          <a:p>
+            <a:r>
+              <a:rPr lang="en-US" baseline="0" dirty="0" smtClean="0"/>
+              <a:t>For the last while, I’ve been working on ways to augment methods of detecting functional RNA. There’s quite a few algorithms that already take in some set of DNA sequences and produce results, but I wanted to focus on the “outside” of that box. The input and the output itself.</a:t>
+            </a:r>
+          </a:p>
+          <a:p>
+            <a:r>
+              <a:rPr lang="en-US" baseline="0" dirty="0" smtClean="0"/>
+              <a:t>But first I’m going to go through some of the background on functional RNA and what already exists, then describe my own work.</a:t>
+            </a:r>
+          </a:p>
+          <a:p>
+            <a:endParaRPr lang="en-US" baseline="0" dirty="0" smtClean="0"/>
+          </a:p>
+          <a:p>
+            <a:r>
+              <a:rPr lang="en-US" baseline="0" dirty="0" smtClean="0"/>
+              <a:t>02: Background explanation (5m?)</a:t>
+            </a:r>
+          </a:p>
+          <a:p>
+            <a:r>
+              <a:rPr lang="en-US" baseline="0" dirty="0" smtClean="0"/>
+              <a:t>First, what’s functional RNA?</a:t>
+            </a:r>
+          </a:p>
+          <a:p>
+            <a:r>
+              <a:rPr lang="en-US" baseline="0" dirty="0" smtClean="0"/>
+              <a:t>In some cell (example image), there is DNA in the nucleus. When the cell needs to make proteins, it will transcribe some sections of that DNA into RNA, which is then translated into a protein. This is the “canonical” example, pretty much one of the first things the bio classes I’ve taken have taught.</a:t>
+            </a:r>
+          </a:p>
+          <a:p>
+            <a:r>
+              <a:rPr lang="en-US" baseline="0" dirty="0" smtClean="0"/>
+              <a:t>However, the cell also transcribes lots of DNA-&gt;RNA that isn’t used to make proteins. Some of the ways this can happen: transcription happens outside of the known start position – this happens a lot especially in regions that generally surround a gene, RNA splicing (parts of the RNA that was transcribed are cut out of the sequence to produce the final messenger RNA), and the messenger RNA itself can have a lot of bases before and after the actual section that gets translated. </a:t>
+            </a:r>
+          </a:p>
+          <a:p>
+            <a:r>
+              <a:rPr lang="en-US" baseline="0" dirty="0" smtClean="0"/>
+              <a:t>An observation to make about RNA now. DNA is double-stranded. That means one strand bonds to the other, making a sort of ladder. RNA is single-stranded, and it is capable of bonding to itself and making shapes a lot more complicated than a ladder – can fold similar to how a protein folds. There’s a lot of space for functionality!</a:t>
+            </a:r>
+          </a:p>
+          <a:p>
+            <a:r>
+              <a:rPr lang="en-US" baseline="0" dirty="0" smtClean="0"/>
+              <a:t>That means that a lot of that “extra” transcription can probably be (and is!) being put to good use. Well, some of it’s still junk probably, but that’s fine too. The transcribed but not-protein RNA is usually referred to as “noncoding RNA” i.e. transcribed RNA that does not code for proteins, alternatively “functional RNA”. This class of genes isn’t super new: older (well-known) examples of </a:t>
+            </a:r>
+            <a:r>
+              <a:rPr lang="en-US" baseline="0" dirty="0" err="1" smtClean="0"/>
+              <a:t>ncRNA</a:t>
+            </a:r>
+            <a:r>
+              <a:rPr lang="en-US" baseline="0" dirty="0" smtClean="0"/>
+              <a:t> include transfer RNA and ribosomes, which have been known about for protein translation for a really long time. But a lot of new examples of different RNA genes have appeared recently, I think tending since the 2000s </a:t>
+            </a:r>
+            <a:r>
+              <a:rPr lang="en-US" baseline="0" dirty="0" err="1" smtClean="0"/>
+              <a:t>ish</a:t>
+            </a:r>
+            <a:r>
+              <a:rPr lang="en-US" baseline="0" dirty="0" smtClean="0"/>
+              <a:t>. More recently discovered examples of </a:t>
+            </a:r>
+            <a:r>
+              <a:rPr lang="en-US" baseline="0" dirty="0" err="1" smtClean="0"/>
+              <a:t>ncRNA</a:t>
+            </a:r>
+            <a:r>
+              <a:rPr lang="en-US" baseline="0" dirty="0" smtClean="0"/>
+              <a:t> include riboswitches (functional segments of the mRNA itself that can control if it is transcribed or not) and miRNA (…really small </a:t>
+            </a:r>
+            <a:r>
+              <a:rPr lang="en-US" baseline="0" dirty="0" err="1" smtClean="0"/>
+              <a:t>ncRNA</a:t>
+            </a:r>
+            <a:r>
+              <a:rPr lang="en-US" baseline="0" dirty="0" smtClean="0"/>
+              <a:t> pieces that can cut up a mRNA). There’s a database of a lot of them called </a:t>
+            </a:r>
+            <a:r>
+              <a:rPr lang="en-US" baseline="0" dirty="0" err="1" smtClean="0"/>
+              <a:t>rfam</a:t>
+            </a:r>
+            <a:r>
+              <a:rPr lang="en-US" baseline="0" dirty="0" smtClean="0"/>
+              <a:t>, parallel to a protein database called </a:t>
+            </a:r>
+            <a:r>
+              <a:rPr lang="en-US" baseline="0" dirty="0" err="1" smtClean="0"/>
+              <a:t>pfam</a:t>
+            </a:r>
+            <a:r>
+              <a:rPr lang="en-US" baseline="0" dirty="0" smtClean="0"/>
+              <a:t>. It’s got a lot of entries, somewhere above 2600 *families* of motifs.</a:t>
+            </a:r>
+          </a:p>
+          <a:p>
+            <a:r>
+              <a:rPr lang="en-US" baseline="0" dirty="0" smtClean="0"/>
+              <a:t>03: Previous studies explanation (7m?)</a:t>
+            </a:r>
+          </a:p>
+          <a:p>
+            <a:r>
+              <a:rPr lang="en-US" baseline="0" dirty="0" smtClean="0"/>
+              <a:t>Okay, so how have these functional RNA-finding algorithms worked and what am I trying to do differently.</a:t>
+            </a:r>
+          </a:p>
+          <a:p>
+            <a:r>
+              <a:rPr lang="en-US" baseline="0" dirty="0" smtClean="0"/>
+              <a:t>Qualities of a functional RNA: the structure pretty much stays the same, but the sequence is free to change. So mutations happen a lot over time, but they will preserve the base pairing: mutations happen in pairs. Since we only have the DNA of animals that are alive today, we need to look for compensating base changes.</a:t>
+            </a:r>
+          </a:p>
+          <a:p>
+            <a:r>
+              <a:rPr lang="en-US" baseline="0" dirty="0" smtClean="0"/>
+              <a:t>Here’s two algorithms that attack the challenge from basically different approaches: </a:t>
+            </a:r>
+            <a:r>
+              <a:rPr lang="en-US" baseline="0" dirty="0" err="1" smtClean="0"/>
+              <a:t>EvoFold</a:t>
+            </a:r>
+            <a:r>
+              <a:rPr lang="en-US" baseline="0" dirty="0" smtClean="0"/>
+              <a:t> starts with an alignment of sequences from multiple species and works based off that. (These alignments are based on the bases themselves.) </a:t>
+            </a:r>
+            <a:r>
+              <a:rPr lang="en-US" baseline="0" dirty="0" err="1" smtClean="0"/>
+              <a:t>Cmfinder</a:t>
+            </a:r>
+            <a:r>
+              <a:rPr lang="en-US" baseline="0" dirty="0" smtClean="0"/>
+              <a:t> starts with a set of any sequences, assuming that at least some fraction of that set of sequences contains the motif, and then proceeds to conduct E-M on a CM model / a representation of the motif. Both of these need you to give it a set of sequence inputs and spit out a CM or equivalent… I haven’t actually *used* </a:t>
+            </a:r>
+            <a:r>
+              <a:rPr lang="en-US" baseline="0" dirty="0" err="1" smtClean="0"/>
+              <a:t>EvoFold</a:t>
+            </a:r>
+            <a:r>
+              <a:rPr lang="en-US" baseline="0" dirty="0" smtClean="0"/>
+              <a:t>.</a:t>
+            </a:r>
+          </a:p>
+          <a:p>
+            <a:r>
+              <a:rPr lang="en-US" baseline="0" dirty="0" smtClean="0"/>
+              <a:t>Because I’m working with </a:t>
+            </a:r>
+            <a:r>
+              <a:rPr lang="en-US" baseline="0" dirty="0" err="1" smtClean="0"/>
+              <a:t>Cmfinder</a:t>
+            </a:r>
+            <a:r>
+              <a:rPr lang="en-US" baseline="0" dirty="0" smtClean="0"/>
+              <a:t>, let’s go over some of the studies that have already been done using it.</a:t>
+            </a:r>
+          </a:p>
+          <a:p>
+            <a:r>
+              <a:rPr lang="en-US" baseline="0" dirty="0" smtClean="0"/>
+              <a:t>There have been 2 and a half (the half was verifying results against a known set) studies using </a:t>
+            </a:r>
+            <a:r>
+              <a:rPr lang="en-US" baseline="0" dirty="0" err="1" smtClean="0"/>
+              <a:t>Cmfinder</a:t>
+            </a:r>
+            <a:r>
+              <a:rPr lang="en-US" baseline="0" dirty="0" smtClean="0"/>
+              <a:t> on bacteria. All of these focus on the 5’ UTR regions of homologous genes in bacteria, so the entire upstream sequences of a single gene from multiple species of bacteria were fed to </a:t>
+            </a:r>
+            <a:r>
+              <a:rPr lang="en-US" baseline="0" dirty="0" err="1" smtClean="0"/>
+              <a:t>Cmfinder</a:t>
+            </a:r>
+            <a:r>
+              <a:rPr lang="en-US" baseline="0" dirty="0" smtClean="0"/>
+              <a:t> as a set of input, and then repeated for some number of genes.</a:t>
+            </a:r>
+          </a:p>
+          <a:p>
+            <a:r>
+              <a:rPr lang="en-US" baseline="0" dirty="0" smtClean="0"/>
+              <a:t>There has been 1 big study of vertebrates using </a:t>
+            </a:r>
+            <a:r>
+              <a:rPr lang="en-US" baseline="0" dirty="0" err="1" smtClean="0"/>
+              <a:t>Cmfinder</a:t>
+            </a:r>
+            <a:r>
+              <a:rPr lang="en-US" baseline="0" dirty="0" smtClean="0"/>
+              <a:t> across the entire genome (human specifically, and then including other animals where they happen to align). Because of the scale of this study (and because the big-O of </a:t>
+            </a:r>
+            <a:r>
+              <a:rPr lang="en-US" baseline="0" dirty="0" err="1" smtClean="0"/>
+              <a:t>Cmfinder</a:t>
+            </a:r>
+            <a:r>
+              <a:rPr lang="en-US" baseline="0" dirty="0" smtClean="0"/>
+              <a:t> and similar algorithms is at least polynomial if not exponential </a:t>
+            </a:r>
+            <a:r>
+              <a:rPr lang="en-US" baseline="0" dirty="0" err="1" smtClean="0"/>
+              <a:t>iirc</a:t>
+            </a:r>
+            <a:r>
+              <a:rPr lang="en-US" baseline="0" dirty="0" smtClean="0"/>
+              <a:t>) the individual inputs were actually each alignment block.</a:t>
+            </a:r>
+          </a:p>
+          <a:p>
+            <a:r>
+              <a:rPr lang="en-US" baseline="0" dirty="0" smtClean="0"/>
+              <a:t>What is an alignment block? : one chunk of DNA where it happens to more or less match up across multiple species. (Here’s) what it looks like.</a:t>
+            </a:r>
+          </a:p>
+          <a:p>
+            <a:r>
+              <a:rPr lang="en-US" baseline="0" dirty="0" smtClean="0"/>
+              <a:t>However, this really runs the possibility of cutting apart </a:t>
+            </a:r>
+            <a:r>
+              <a:rPr lang="en-US" baseline="0" dirty="0" err="1" smtClean="0"/>
+              <a:t>ncRNA</a:t>
+            </a:r>
+            <a:r>
+              <a:rPr lang="en-US" baseline="0" dirty="0" smtClean="0"/>
+              <a:t> that crosses block boundaries! Some blocks are long enough that they might contain a significant portion of the motif to show up, but some might be too short and end up slicing a motif apart!</a:t>
+            </a:r>
+          </a:p>
+          <a:p>
+            <a:r>
+              <a:rPr lang="en-US" baseline="0" dirty="0" smtClean="0"/>
+              <a:t>04: </a:t>
+            </a:r>
+            <a:r>
+              <a:rPr lang="en-US" baseline="0" dirty="0" err="1" smtClean="0"/>
+              <a:t>Blockmerge</a:t>
+            </a:r>
+            <a:r>
+              <a:rPr lang="en-US" baseline="0" dirty="0" smtClean="0"/>
+              <a:t> explanation</a:t>
+            </a:r>
+          </a:p>
+          <a:p>
+            <a:r>
+              <a:rPr lang="en-US" baseline="0" dirty="0" smtClean="0"/>
+              <a:t>That’s the motivation for why I’m interested in merging blocks.</a:t>
+            </a:r>
+          </a:p>
+          <a:p>
+            <a:r>
+              <a:rPr lang="en-US" baseline="0" dirty="0" smtClean="0"/>
+              <a:t>Describe </a:t>
+            </a:r>
+            <a:r>
+              <a:rPr lang="en-US" baseline="0" dirty="0" err="1" smtClean="0"/>
+              <a:t>synteny</a:t>
+            </a:r>
+            <a:r>
+              <a:rPr lang="en-US" baseline="0" dirty="0" smtClean="0"/>
+              <a:t> blocks.</a:t>
+            </a:r>
+          </a:p>
+          <a:p>
+            <a:r>
+              <a:rPr lang="en-US" baseline="0" dirty="0" smtClean="0"/>
+              <a:t>Describe the motivations for how I’m merging them and the rules. Outline different attempts at behavior (n-block, </a:t>
+            </a:r>
+            <a:r>
+              <a:rPr lang="en-US" baseline="0" dirty="0" err="1" smtClean="0"/>
+              <a:t>fillblock</a:t>
+            </a:r>
+            <a:r>
+              <a:rPr lang="en-US" baseline="0" dirty="0" smtClean="0"/>
+              <a:t>).</a:t>
+            </a:r>
+          </a:p>
+          <a:p>
+            <a:r>
+              <a:rPr lang="en-US" baseline="0" dirty="0" smtClean="0"/>
+              <a:t>05: </a:t>
+            </a:r>
+            <a:r>
+              <a:rPr lang="en-US" baseline="0" dirty="0" err="1" smtClean="0"/>
+              <a:t>Blockmerge</a:t>
+            </a:r>
+            <a:r>
+              <a:rPr lang="en-US" baseline="0" dirty="0" smtClean="0"/>
+              <a:t> result exploration</a:t>
+            </a:r>
+          </a:p>
+          <a:p>
+            <a:r>
+              <a:rPr lang="en-US" baseline="0" dirty="0" smtClean="0"/>
+              <a:t>Look at the result pages (the track hub)</a:t>
+            </a:r>
+          </a:p>
+          <a:p>
+            <a:r>
+              <a:rPr lang="en-US" baseline="0" dirty="0" smtClean="0"/>
+              <a:t>Look at the individual score pages and overlap pages)</a:t>
+            </a:r>
+          </a:p>
+          <a:p>
+            <a:r>
+              <a:rPr lang="en-US" baseline="0" dirty="0" smtClean="0"/>
+              <a:t>TODO</a:t>
+            </a:r>
+          </a:p>
+          <a:p>
+            <a:r>
+              <a:rPr lang="en-US" baseline="0" dirty="0" smtClean="0"/>
+              <a:t>06: CMs background, K-L divergence background</a:t>
+            </a:r>
+          </a:p>
+          <a:p>
+            <a:r>
+              <a:rPr lang="en-US" baseline="0" dirty="0" smtClean="0"/>
+              <a:t>Let’s go back to CMs. What are they exactly? TODO</a:t>
+            </a:r>
+          </a:p>
+          <a:p>
+            <a:r>
+              <a:rPr lang="en-US" baseline="0" dirty="0" smtClean="0"/>
+              <a:t>Describe K-L divergence as a thing that exists TODO</a:t>
+            </a:r>
+          </a:p>
+          <a:p>
+            <a:r>
+              <a:rPr lang="en-US" baseline="0" dirty="0" smtClean="0"/>
+              <a:t>Now we have a lot of potential CMs above a score threshold that more than likely exist as patterns, but we also have a lot of overlapping between them. Some of the overlaps might be sensibly exact repeats, but some overlaps suggest an alternative folding. Almost all of them are different in some small regard, How do we collapse those overlaps?</a:t>
+            </a:r>
+          </a:p>
+          <a:p>
+            <a:r>
+              <a:rPr lang="en-US" baseline="0" dirty="0" err="1" smtClean="0"/>
+              <a:t>Rfam</a:t>
+            </a:r>
+            <a:r>
+              <a:rPr lang="en-US" baseline="0" dirty="0" smtClean="0"/>
+              <a:t> TODO</a:t>
+            </a:r>
+          </a:p>
+          <a:p>
+            <a:r>
+              <a:rPr lang="en-US" baseline="0" dirty="0" smtClean="0"/>
+              <a:t>07: Scoring explanation</a:t>
+            </a:r>
+          </a:p>
+          <a:p>
+            <a:r>
+              <a:rPr lang="en-US" baseline="0" dirty="0" smtClean="0"/>
+              <a:t>Describe the problem of solving for K-L divergence: it is basically impossible. Papers have been published about how it’s impossible for discrete probability distributions, and CMs are pretty discrete. But we can take the idea and still make use of it. Here’s six (really four, but combined approaches) ways that we tried that and why they all could make sense.</a:t>
+            </a:r>
+          </a:p>
+          <a:p>
+            <a:r>
+              <a:rPr lang="en-US" baseline="0" dirty="0" smtClean="0"/>
+              <a:t>TODO</a:t>
+            </a:r>
+          </a:p>
+          <a:p>
+            <a:r>
+              <a:rPr lang="en-US" baseline="0" dirty="0" smtClean="0"/>
+              <a:t>08: Scoring result exploration</a:t>
+            </a:r>
+          </a:p>
+          <a:p>
+            <a:r>
+              <a:rPr lang="en-US" baseline="0" dirty="0" smtClean="0"/>
+              <a:t>Here’s the six ways we tried that and how clustering them turned out. Probably some of those ways weren’t very good..</a:t>
+            </a:r>
+          </a:p>
+          <a:p>
+            <a:r>
+              <a:rPr lang="en-US" baseline="0" dirty="0" smtClean="0"/>
+              <a:t>09: Summary</a:t>
+            </a:r>
+          </a:p>
+          <a:p>
+            <a:r>
+              <a:rPr lang="en-US" baseline="0" dirty="0" smtClean="0"/>
+              <a:t>Review of the things that I did.</a:t>
+            </a:r>
+          </a:p>
+          <a:p>
+            <a:r>
+              <a:rPr lang="en-US" baseline="0" dirty="0" smtClean="0"/>
+              <a:t>Should I mention the </a:t>
+            </a:r>
+            <a:r>
+              <a:rPr lang="en-US" baseline="0" smtClean="0"/>
+              <a:t>things that I didn’t do?</a:t>
+            </a:r>
+            <a:endParaRPr lang="en-US" dirty="0"/>
+          </a:p>
+        </p:txBody>
+      </p:sp>
+      <p:sp>
+        <p:nvSpPr>
+          <p:cNvPr id="4" name="Slide Number Placeholder 3"/>
+          <p:cNvSpPr>
+            <a:spLocks noGrp="1"/>
+          </p:cNvSpPr>
+          <p:nvPr>
+            <p:ph type="sldNum" sz="quarter" idx="10"/>
+          </p:nvPr>
+        </p:nvSpPr>
+        <p:spPr/>
+        <p:txBody>
+          <a:bodyPr/>
+          <a:lstStyle/>
+          <a:p>
+            <a:fld id="{825F0330-01FC-4A5E-B2BE-FD83AA068E80}" type="slidenum">
+              <a:rPr lang="en-US" smtClean="0"/>
+              <a:t>1</a:t>
+            </a:fld>
+            <a:endParaRPr lang="en-US"/>
+          </a:p>
+        </p:txBody>
+      </p:sp>
+    </p:spTree>
+    <p:extLst>
+      <p:ext uri="{BB962C8B-B14F-4D97-AF65-F5344CB8AC3E}">
+        <p14:creationId xmlns:p14="http://schemas.microsoft.com/office/powerpoint/2010/main" val="714060163"/>
       </p:ext>
     </p:extLst>
   </p:cSld>
   <p:clrMapOvr>
     <a:masterClrMapping/>
+  </p:clrMapOvr>
+</p:notes>
+</file>
+
+<file path=ppt/slideLayouts/slideLayout1.xml><?xml version="1.0" encoding="utf-8"?>
+<p:sldLayout xmlns:a="http://schemas.openxmlformats.org/drawingml/2006/main" xmlns:r="http://schemas.openxmlformats.org/officeDocument/2006/relationships" xmlns:p="http://schemas.openxmlformats.org/presentationml/2006/main" type="title" preserve="1">
+  <p:cSld name="Title Slide">
+    <p:bg>
+      <p:bgPr>
+        <a:solidFill>
+          <a:schemeClr val="accent2"/>
+        </a:solidFill>
+        <a:effectLst/>
+      </p:bgPr>
+    </p:bg>
+    <p:spTree>
+      <p:nvGrpSpPr>
+        <p:cNvPr id="1" name=""/>
+        <p:cNvGrpSpPr/>
+        <p:nvPr/>
+      </p:nvGrpSpPr>
+      <p:grpSpPr>
+        <a:xfrm>
+          <a:off x="0" y="0"/>
+          <a:ext cx="0" cy="0"/>
+          <a:chOff x="0" y="0"/>
+          <a:chExt cx="0" cy="0"/>
+        </a:xfrm>
+      </p:grpSpPr>
+      <p:sp>
+        <p:nvSpPr>
+          <p:cNvPr id="2" name="Title 1"/>
+          <p:cNvSpPr>
+            <a:spLocks noGrp="1"/>
+          </p:cNvSpPr>
+          <p:nvPr>
+            <p:ph type="ctrTitle"/>
+          </p:nvPr>
+        </p:nvSpPr>
+        <p:spPr bwMode="blackWhite">
+          <a:xfrm>
+            <a:off x="1600200" y="2386744"/>
+            <a:ext cx="8991600" cy="1645920"/>
+          </a:xfrm>
+          <a:solidFill>
+            <a:srgbClr val="FFFFFF"/>
+          </a:solidFill>
+          <a:ln w="38100">
+            <a:solidFill>
+              <a:srgbClr val="404040"/>
+            </a:solidFill>
+          </a:ln>
+        </p:spPr>
+        <p:txBody>
+          <a:bodyPr lIns="274320" rIns="274320" anchor="ctr" anchorCtr="1">
+            <a:normAutofit/>
+          </a:bodyPr>
+          <a:lstStyle>
+            <a:lvl1pPr algn="ctr">
+              <a:defRPr sz="3800">
+                <a:solidFill>
+                  <a:srgbClr val="262626"/>
+                </a:solidFill>
+              </a:defRPr>
+            </a:lvl1pPr>
+          </a:lstStyle>
+          <a:p>
+            <a:r>
+              <a:rPr lang="en-US" smtClean="0"/>
+              <a:t>Click to edit Master title style</a:t>
+            </a:r>
+            <a:endParaRPr lang="en-US" dirty="0"/>
+          </a:p>
+        </p:txBody>
+      </p:sp>
+      <p:sp>
+        <p:nvSpPr>
+          <p:cNvPr id="3" name="Subtitle 2"/>
+          <p:cNvSpPr>
+            <a:spLocks noGrp="1"/>
+          </p:cNvSpPr>
+          <p:nvPr>
+            <p:ph type="subTitle" idx="1"/>
+          </p:nvPr>
+        </p:nvSpPr>
+        <p:spPr>
+          <a:xfrm>
+            <a:off x="2695194" y="4352544"/>
+            <a:ext cx="6801612" cy="1239894"/>
+          </a:xfrm>
+          <a:noFill/>
+        </p:spPr>
+        <p:txBody>
+          <a:bodyPr>
+            <a:normAutofit/>
+          </a:bodyPr>
+          <a:lstStyle>
+            <a:lvl1pPr marL="0" indent="0" algn="ctr">
+              <a:buNone/>
+              <a:defRPr sz="2000">
+                <a:solidFill>
+                  <a:schemeClr val="tx1">
+                    <a:lumMod val="75000"/>
+                    <a:lumOff val="25000"/>
+                  </a:schemeClr>
+                </a:solidFill>
+              </a:defRPr>
+            </a:lvl1pPr>
+            <a:lvl2pPr marL="457200" indent="0" algn="ctr">
+              <a:buNone/>
+              <a:defRPr sz="2000"/>
+            </a:lvl2pPr>
+            <a:lvl3pPr marL="914400" indent="0" algn="ctr">
+              <a:buNone/>
+              <a:defRPr sz="1800"/>
+            </a:lvl3pPr>
+            <a:lvl4pPr marL="1371600" indent="0" algn="ctr">
+              <a:buNone/>
+              <a:defRPr sz="1600"/>
+            </a:lvl4pPr>
+            <a:lvl5pPr marL="1828800" indent="0" algn="ctr">
+              <a:buNone/>
+              <a:defRPr sz="1600"/>
+            </a:lvl5pPr>
+            <a:lvl6pPr marL="2286000" indent="0" algn="ctr">
+              <a:buNone/>
+              <a:defRPr sz="1600"/>
+            </a:lvl6pPr>
+            <a:lvl7pPr marL="2743200" indent="0" algn="ctr">
+              <a:buNone/>
+              <a:defRPr sz="1600"/>
+            </a:lvl7pPr>
+            <a:lvl8pPr marL="3200400" indent="0" algn="ctr">
+              <a:buNone/>
+              <a:defRPr sz="1600"/>
+            </a:lvl8pPr>
+            <a:lvl9pPr marL="3657600" indent="0" algn="ctr">
+              <a:buNone/>
+              <a:defRPr sz="1600"/>
+            </a:lvl9pPr>
+          </a:lstStyle>
+          <a:p>
+            <a:r>
+              <a:rPr lang="en-US" smtClean="0"/>
+              <a:t>Click to edit Master subtitle style</a:t>
+            </a:r>
+            <a:endParaRPr lang="en-US" dirty="0"/>
+          </a:p>
+        </p:txBody>
+      </p:sp>
+      <p:sp>
+        <p:nvSpPr>
+          <p:cNvPr id="7" name="Date Placeholder 6"/>
+          <p:cNvSpPr>
+            <a:spLocks noGrp="1"/>
+          </p:cNvSpPr>
+          <p:nvPr>
+            <p:ph type="dt" sz="half" idx="10"/>
+          </p:nvPr>
+        </p:nvSpPr>
+        <p:spPr/>
+        <p:txBody>
+          <a:bodyPr/>
+          <a:lstStyle/>
+          <a:p>
+            <a:fld id="{A71E6E4A-F1E9-49B1-A7E6-64E029784417}" type="datetimeFigureOut">
+              <a:rPr lang="en-US" smtClean="0"/>
+              <a:t>8/7/2019</a:t>
+            </a:fld>
+            <a:endParaRPr lang="en-US"/>
+          </a:p>
+        </p:txBody>
+      </p:sp>
+      <p:sp>
+        <p:nvSpPr>
+          <p:cNvPr id="8" name="Footer Placeholder 7"/>
+          <p:cNvSpPr>
+            <a:spLocks noGrp="1"/>
+          </p:cNvSpPr>
+          <p:nvPr>
+            <p:ph type="ftr" sz="quarter" idx="11"/>
+          </p:nvPr>
+        </p:nvSpPr>
+        <p:spPr/>
+        <p:txBody>
+          <a:bodyPr/>
+          <a:lstStyle/>
+          <a:p>
+            <a:endParaRPr lang="en-US"/>
+          </a:p>
+        </p:txBody>
+      </p:sp>
+      <p:sp>
+        <p:nvSpPr>
+          <p:cNvPr id="9" name="Slide Number Placeholder 8"/>
+          <p:cNvSpPr>
+            <a:spLocks noGrp="1"/>
+          </p:cNvSpPr>
+          <p:nvPr>
+            <p:ph type="sldNum" sz="quarter" idx="12"/>
+          </p:nvPr>
+        </p:nvSpPr>
+        <p:spPr/>
+        <p:txBody>
+          <a:bodyPr/>
+          <a:lstStyle/>
+          <a:p>
+            <a:fld id="{AEAEF7F8-C9E9-43F4-AB41-B24E5AA34872}" type="slidenum">
+              <a:rPr lang="en-US" smtClean="0"/>
+              <a:t>‹#›</a:t>
+            </a:fld>
+            <a:endParaRPr lang="en-US"/>
+          </a:p>
+        </p:txBody>
+      </p:sp>
+    </p:spTree>
+    <p:extLst>
+      <p:ext uri="{BB962C8B-B14F-4D97-AF65-F5344CB8AC3E}">
+        <p14:creationId xmlns:p14="http://schemas.microsoft.com/office/powerpoint/2010/main" val="3520194709"/>
+      </p:ext>
+    </p:extLst>
+  </p:cSld>
+  <p:clrMapOvr>
+    <a:overrideClrMapping bg1="dk1" tx1="lt1" bg2="dk2" tx2="lt2" accent1="accent1" accent2="accent2" accent3="accent3" accent4="accent4" accent5="accent5" accent6="accent6" hlink="hlink" folHlink="folHlink"/>
   </p:clrMapOvr>
 </p:sldLayout>
 </file>
@@ -346,13 +1214,7 @@
       </p:grpSpPr>
       <p:sp>
         <p:nvSpPr>
-          <p:cNvPr id="2" name="Title 1">
-            <a:extLst>
-              <a:ext uri="{FF2B5EF4-FFF2-40B4-BE49-F238E27FC236}">
-                <a16:creationId xmlns:a16="http://schemas.microsoft.com/office/drawing/2014/main" id="{EA174B54-E3A0-40C1-85D9-9A5BC0F1B935}"/>
-              </a:ext>
-            </a:extLst>
-          </p:cNvPr>
+          <p:cNvPr id="2" name="Title 1"/>
           <p:cNvSpPr>
             <a:spLocks noGrp="1"/>
           </p:cNvSpPr>
@@ -366,21 +1228,16 @@
           <a:lstStyle/>
           <a:p>
             <a:r>
-              <a:rPr lang="en-US"/>
+              <a:rPr lang="en-US" smtClean="0"/>
               <a:t>Click to edit Master title style</a:t>
             </a:r>
-          </a:p>
-        </p:txBody>
-      </p:sp>
-      <p:sp>
-        <p:nvSpPr>
-          <p:cNvPr id="3" name="Vertical Text Placeholder 2">
-            <a:extLst>
-              <a:ext uri="{FF2B5EF4-FFF2-40B4-BE49-F238E27FC236}">
-                <a16:creationId xmlns:a16="http://schemas.microsoft.com/office/drawing/2014/main" id="{F8865920-8D17-4F95-8402-EACA24B1567F}"/>
-              </a:ext>
-            </a:extLst>
-          </p:cNvPr>
+            <a:endParaRPr lang="en-US" dirty="0"/>
+          </a:p>
+        </p:txBody>
+      </p:sp>
+      <p:sp>
+        <p:nvSpPr>
+          <p:cNvPr id="3" name="Vertical Text Placeholder 2"/>
           <p:cNvSpPr>
             <a:spLocks noGrp="1"/>
           </p:cNvSpPr>
@@ -395,49 +1252,44 @@
           <a:p>
             <a:pPr lvl="0"/>
             <a:r>
-              <a:rPr lang="en-US"/>
-              <a:t>Click to edit Master text styles</a:t>
+              <a:rPr lang="en-US" smtClean="0"/>
+              <a:t>Edit Master text styles</a:t>
             </a:r>
           </a:p>
           <a:p>
             <a:pPr lvl="1"/>
             <a:r>
-              <a:rPr lang="en-US"/>
+              <a:rPr lang="en-US" smtClean="0"/>
               <a:t>Second level</a:t>
             </a:r>
           </a:p>
           <a:p>
             <a:pPr lvl="2"/>
             <a:r>
-              <a:rPr lang="en-US"/>
+              <a:rPr lang="en-US" smtClean="0"/>
               <a:t>Third level</a:t>
             </a:r>
           </a:p>
           <a:p>
             <a:pPr lvl="3"/>
             <a:r>
-              <a:rPr lang="en-US"/>
+              <a:rPr lang="en-US" smtClean="0"/>
               <a:t>Fourth level</a:t>
             </a:r>
           </a:p>
           <a:p>
             <a:pPr lvl="4"/>
             <a:r>
-              <a:rPr lang="en-US"/>
+              <a:rPr lang="en-US" smtClean="0"/>
               <a:t>Fifth level</a:t>
             </a:r>
-          </a:p>
-        </p:txBody>
-      </p:sp>
-      <p:sp>
-        <p:nvSpPr>
-          <p:cNvPr id="4" name="Date Placeholder 3">
-            <a:extLst>
-              <a:ext uri="{FF2B5EF4-FFF2-40B4-BE49-F238E27FC236}">
-                <a16:creationId xmlns:a16="http://schemas.microsoft.com/office/drawing/2014/main" id="{5AD4F789-2A23-42DC-BAA2-91A0F9AB7394}"/>
-              </a:ext>
-            </a:extLst>
-          </p:cNvPr>
+            <a:endParaRPr lang="en-US" dirty="0"/>
+          </a:p>
+        </p:txBody>
+      </p:sp>
+      <p:sp>
+        <p:nvSpPr>
+          <p:cNvPr id="4" name="Date Placeholder 3"/>
           <p:cNvSpPr>
             <a:spLocks noGrp="1"/>
           </p:cNvSpPr>
@@ -452,7 +1304,7 @@
           <a:p>
             <a:fld id="{A71E6E4A-F1E9-49B1-A7E6-64E029784417}" type="datetimeFigureOut">
               <a:rPr lang="en-US" smtClean="0"/>
-              <a:t>8/6/2019</a:t>
+              <a:t>8/7/2019</a:t>
             </a:fld>
             <a:endParaRPr lang="en-US"/>
           </a:p>
@@ -460,13 +1312,7 @@
       </p:sp>
       <p:sp>
         <p:nvSpPr>
-          <p:cNvPr id="5" name="Footer Placeholder 4">
-            <a:extLst>
-              <a:ext uri="{FF2B5EF4-FFF2-40B4-BE49-F238E27FC236}">
-                <a16:creationId xmlns:a16="http://schemas.microsoft.com/office/drawing/2014/main" id="{45DCE300-4AAE-4428-989E-112F14FA5BA7}"/>
-              </a:ext>
-            </a:extLst>
-          </p:cNvPr>
+          <p:cNvPr id="5" name="Footer Placeholder 4"/>
           <p:cNvSpPr>
             <a:spLocks noGrp="1"/>
           </p:cNvSpPr>
@@ -485,13 +1331,7 @@
       </p:sp>
       <p:sp>
         <p:nvSpPr>
-          <p:cNvPr id="6" name="Slide Number Placeholder 5">
-            <a:extLst>
-              <a:ext uri="{FF2B5EF4-FFF2-40B4-BE49-F238E27FC236}">
-                <a16:creationId xmlns:a16="http://schemas.microsoft.com/office/drawing/2014/main" id="{FED8AA69-B35F-44C9-8D4D-F057BF1DF2F2}"/>
-              </a:ext>
-            </a:extLst>
-          </p:cNvPr>
+          <p:cNvPr id="6" name="Slide Number Placeholder 5"/>
           <p:cNvSpPr>
             <a:spLocks noGrp="1"/>
           </p:cNvSpPr>
@@ -515,7 +1355,7 @@
     </p:spTree>
     <p:extLst>
       <p:ext uri="{BB962C8B-B14F-4D97-AF65-F5344CB8AC3E}">
-        <p14:creationId xmlns:p14="http://schemas.microsoft.com/office/powerpoint/2010/main" val="2080986259"/>
+        <p14:creationId xmlns:p14="http://schemas.microsoft.com/office/powerpoint/2010/main" val="1965735823"/>
       </p:ext>
     </p:extLst>
   </p:cSld>
@@ -544,13 +1384,7 @@
       </p:grpSpPr>
       <p:sp>
         <p:nvSpPr>
-          <p:cNvPr id="2" name="Vertical Title 1">
-            <a:extLst>
-              <a:ext uri="{FF2B5EF4-FFF2-40B4-BE49-F238E27FC236}">
-                <a16:creationId xmlns:a16="http://schemas.microsoft.com/office/drawing/2014/main" id="{B631C231-2751-425D-8A5F-7223E18F9220}"/>
-              </a:ext>
-            </a:extLst>
-          </p:cNvPr>
+          <p:cNvPr id="2" name="Vertical Title 1"/>
           <p:cNvSpPr>
             <a:spLocks noGrp="1"/>
           </p:cNvSpPr>
@@ -560,8 +1394,8 @@
         </p:nvSpPr>
         <p:spPr>
           <a:xfrm>
-            <a:off x="8724900" y="365125"/>
-            <a:ext cx="2628900" cy="5811838"/>
+            <a:off x="8653112" y="937260"/>
+            <a:ext cx="1298608" cy="4983480"/>
           </a:xfrm>
         </p:spPr>
         <p:txBody>
@@ -569,21 +1403,16 @@
           <a:lstStyle/>
           <a:p>
             <a:r>
-              <a:rPr lang="en-US"/>
+              <a:rPr lang="en-US" smtClean="0"/>
               <a:t>Click to edit Master title style</a:t>
             </a:r>
-          </a:p>
-        </p:txBody>
-      </p:sp>
-      <p:sp>
-        <p:nvSpPr>
-          <p:cNvPr id="3" name="Vertical Text Placeholder 2">
-            <a:extLst>
-              <a:ext uri="{FF2B5EF4-FFF2-40B4-BE49-F238E27FC236}">
-                <a16:creationId xmlns:a16="http://schemas.microsoft.com/office/drawing/2014/main" id="{0470DED0-B592-4B21-98CF-FAB4478EDE03}"/>
-              </a:ext>
-            </a:extLst>
-          </p:cNvPr>
+            <a:endParaRPr lang="en-US" dirty="0"/>
+          </a:p>
+        </p:txBody>
+      </p:sp>
+      <p:sp>
+        <p:nvSpPr>
+          <p:cNvPr id="3" name="Vertical Text Placeholder 2"/>
           <p:cNvSpPr>
             <a:spLocks noGrp="1"/>
           </p:cNvSpPr>
@@ -593,8 +1422,8 @@
         </p:nvSpPr>
         <p:spPr>
           <a:xfrm>
-            <a:off x="838200" y="365125"/>
-            <a:ext cx="7734300" cy="5811838"/>
+            <a:off x="2231136" y="937260"/>
+            <a:ext cx="6198489" cy="4983480"/>
           </a:xfrm>
         </p:spPr>
         <p:txBody>
@@ -603,49 +1432,44 @@
           <a:p>
             <a:pPr lvl="0"/>
             <a:r>
-              <a:rPr lang="en-US"/>
-              <a:t>Click to edit Master text styles</a:t>
+              <a:rPr lang="en-US" smtClean="0"/>
+              <a:t>Edit Master text styles</a:t>
             </a:r>
           </a:p>
           <a:p>
             <a:pPr lvl="1"/>
             <a:r>
-              <a:rPr lang="en-US"/>
+              <a:rPr lang="en-US" smtClean="0"/>
               <a:t>Second level</a:t>
             </a:r>
           </a:p>
           <a:p>
             <a:pPr lvl="2"/>
             <a:r>
-              <a:rPr lang="en-US"/>
+              <a:rPr lang="en-US" smtClean="0"/>
               <a:t>Third level</a:t>
             </a:r>
           </a:p>
           <a:p>
             <a:pPr lvl="3"/>
             <a:r>
-              <a:rPr lang="en-US"/>
+              <a:rPr lang="en-US" smtClean="0"/>
               <a:t>Fourth level</a:t>
             </a:r>
           </a:p>
           <a:p>
             <a:pPr lvl="4"/>
             <a:r>
-              <a:rPr lang="en-US"/>
+              <a:rPr lang="en-US" smtClean="0"/>
               <a:t>Fifth level</a:t>
             </a:r>
-          </a:p>
-        </p:txBody>
-      </p:sp>
-      <p:sp>
-        <p:nvSpPr>
-          <p:cNvPr id="4" name="Date Placeholder 3">
-            <a:extLst>
-              <a:ext uri="{FF2B5EF4-FFF2-40B4-BE49-F238E27FC236}">
-                <a16:creationId xmlns:a16="http://schemas.microsoft.com/office/drawing/2014/main" id="{0FBF5D76-91BD-400F-AABB-E1E502E7E6C0}"/>
-              </a:ext>
-            </a:extLst>
-          </p:cNvPr>
+            <a:endParaRPr lang="en-US" dirty="0"/>
+          </a:p>
+        </p:txBody>
+      </p:sp>
+      <p:sp>
+        <p:nvSpPr>
+          <p:cNvPr id="4" name="Date Placeholder 3"/>
           <p:cNvSpPr>
             <a:spLocks noGrp="1"/>
           </p:cNvSpPr>
@@ -660,7 +1484,7 @@
           <a:p>
             <a:fld id="{A71E6E4A-F1E9-49B1-A7E6-64E029784417}" type="datetimeFigureOut">
               <a:rPr lang="en-US" smtClean="0"/>
-              <a:t>8/6/2019</a:t>
+              <a:t>8/7/2019</a:t>
             </a:fld>
             <a:endParaRPr lang="en-US"/>
           </a:p>
@@ -668,13 +1492,7 @@
       </p:sp>
       <p:sp>
         <p:nvSpPr>
-          <p:cNvPr id="5" name="Footer Placeholder 4">
-            <a:extLst>
-              <a:ext uri="{FF2B5EF4-FFF2-40B4-BE49-F238E27FC236}">
-                <a16:creationId xmlns:a16="http://schemas.microsoft.com/office/drawing/2014/main" id="{19A95BEB-3A39-4A7B-BE9A-40E57AE1CB3B}"/>
-              </a:ext>
-            </a:extLst>
-          </p:cNvPr>
+          <p:cNvPr id="5" name="Footer Placeholder 4"/>
           <p:cNvSpPr>
             <a:spLocks noGrp="1"/>
           </p:cNvSpPr>
@@ -693,13 +1511,7 @@
       </p:sp>
       <p:sp>
         <p:nvSpPr>
-          <p:cNvPr id="6" name="Slide Number Placeholder 5">
-            <a:extLst>
-              <a:ext uri="{FF2B5EF4-FFF2-40B4-BE49-F238E27FC236}">
-                <a16:creationId xmlns:a16="http://schemas.microsoft.com/office/drawing/2014/main" id="{C5FFFBAE-D9B0-4416-8C7C-C7074D9525CE}"/>
-              </a:ext>
-            </a:extLst>
-          </p:cNvPr>
+          <p:cNvPr id="6" name="Slide Number Placeholder 5"/>
           <p:cNvSpPr>
             <a:spLocks noGrp="1"/>
           </p:cNvSpPr>
@@ -723,7 +1535,7 @@
     </p:spTree>
     <p:extLst>
       <p:ext uri="{BB962C8B-B14F-4D97-AF65-F5344CB8AC3E}">
-        <p14:creationId xmlns:p14="http://schemas.microsoft.com/office/powerpoint/2010/main" val="1655647977"/>
+        <p14:creationId xmlns:p14="http://schemas.microsoft.com/office/powerpoint/2010/main" val="1156086124"/>
       </p:ext>
     </p:extLst>
   </p:cSld>
@@ -752,13 +1564,7 @@
       </p:grpSpPr>
       <p:sp>
         <p:nvSpPr>
-          <p:cNvPr id="2" name="Title 1">
-            <a:extLst>
-              <a:ext uri="{FF2B5EF4-FFF2-40B4-BE49-F238E27FC236}">
-                <a16:creationId xmlns:a16="http://schemas.microsoft.com/office/drawing/2014/main" id="{ADCE49BB-B8B6-48BA-8B03-BE8FD7CE3EC9}"/>
-              </a:ext>
-            </a:extLst>
-          </p:cNvPr>
+          <p:cNvPr id="2" name="Title 1"/>
           <p:cNvSpPr>
             <a:spLocks noGrp="1"/>
           </p:cNvSpPr>
@@ -772,21 +1578,16 @@
           <a:lstStyle/>
           <a:p>
             <a:r>
-              <a:rPr lang="en-US"/>
+              <a:rPr lang="en-US" smtClean="0"/>
               <a:t>Click to edit Master title style</a:t>
             </a:r>
-          </a:p>
-        </p:txBody>
-      </p:sp>
-      <p:sp>
-        <p:nvSpPr>
-          <p:cNvPr id="3" name="Content Placeholder 2">
-            <a:extLst>
-              <a:ext uri="{FF2B5EF4-FFF2-40B4-BE49-F238E27FC236}">
-                <a16:creationId xmlns:a16="http://schemas.microsoft.com/office/drawing/2014/main" id="{96DFDD29-77EE-402C-A58B-5130238EEE45}"/>
-              </a:ext>
-            </a:extLst>
-          </p:cNvPr>
+            <a:endParaRPr lang="en-US" dirty="0"/>
+          </a:p>
+        </p:txBody>
+      </p:sp>
+      <p:sp>
+        <p:nvSpPr>
+          <p:cNvPr id="3" name="Content Placeholder 2"/>
           <p:cNvSpPr>
             <a:spLocks noGrp="1"/>
           </p:cNvSpPr>
@@ -801,49 +1602,44 @@
           <a:p>
             <a:pPr lvl="0"/>
             <a:r>
-              <a:rPr lang="en-US"/>
-              <a:t>Click to edit Master text styles</a:t>
+              <a:rPr lang="en-US" smtClean="0"/>
+              <a:t>Edit Master text styles</a:t>
             </a:r>
           </a:p>
           <a:p>
             <a:pPr lvl="1"/>
             <a:r>
-              <a:rPr lang="en-US"/>
+              <a:rPr lang="en-US" smtClean="0"/>
               <a:t>Second level</a:t>
             </a:r>
           </a:p>
           <a:p>
             <a:pPr lvl="2"/>
             <a:r>
-              <a:rPr lang="en-US"/>
+              <a:rPr lang="en-US" smtClean="0"/>
               <a:t>Third level</a:t>
             </a:r>
           </a:p>
           <a:p>
             <a:pPr lvl="3"/>
             <a:r>
-              <a:rPr lang="en-US"/>
+              <a:rPr lang="en-US" smtClean="0"/>
               <a:t>Fourth level</a:t>
             </a:r>
           </a:p>
           <a:p>
             <a:pPr lvl="4"/>
             <a:r>
-              <a:rPr lang="en-US"/>
+              <a:rPr lang="en-US" smtClean="0"/>
               <a:t>Fifth level</a:t>
             </a:r>
-          </a:p>
-        </p:txBody>
-      </p:sp>
-      <p:sp>
-        <p:nvSpPr>
-          <p:cNvPr id="4" name="Date Placeholder 3">
-            <a:extLst>
-              <a:ext uri="{FF2B5EF4-FFF2-40B4-BE49-F238E27FC236}">
-                <a16:creationId xmlns:a16="http://schemas.microsoft.com/office/drawing/2014/main" id="{E9E123A9-CBBA-4702-9427-B2D49DE0EF13}"/>
-              </a:ext>
-            </a:extLst>
-          </p:cNvPr>
+            <a:endParaRPr lang="en-US" dirty="0"/>
+          </a:p>
+        </p:txBody>
+      </p:sp>
+      <p:sp>
+        <p:nvSpPr>
+          <p:cNvPr id="7" name="Date Placeholder 6"/>
           <p:cNvSpPr>
             <a:spLocks noGrp="1"/>
           </p:cNvSpPr>
@@ -858,7 +1654,7 @@
           <a:p>
             <a:fld id="{A71E6E4A-F1E9-49B1-A7E6-64E029784417}" type="datetimeFigureOut">
               <a:rPr lang="en-US" smtClean="0"/>
-              <a:t>8/6/2019</a:t>
+              <a:t>8/7/2019</a:t>
             </a:fld>
             <a:endParaRPr lang="en-US"/>
           </a:p>
@@ -866,13 +1662,7 @@
       </p:sp>
       <p:sp>
         <p:nvSpPr>
-          <p:cNvPr id="5" name="Footer Placeholder 4">
-            <a:extLst>
-              <a:ext uri="{FF2B5EF4-FFF2-40B4-BE49-F238E27FC236}">
-                <a16:creationId xmlns:a16="http://schemas.microsoft.com/office/drawing/2014/main" id="{12D9422F-5692-45FE-B44C-0ACE841786A5}"/>
-              </a:ext>
-            </a:extLst>
-          </p:cNvPr>
+          <p:cNvPr id="8" name="Footer Placeholder 7"/>
           <p:cNvSpPr>
             <a:spLocks noGrp="1"/>
           </p:cNvSpPr>
@@ -891,13 +1681,7 @@
       </p:sp>
       <p:sp>
         <p:nvSpPr>
-          <p:cNvPr id="6" name="Slide Number Placeholder 5">
-            <a:extLst>
-              <a:ext uri="{FF2B5EF4-FFF2-40B4-BE49-F238E27FC236}">
-                <a16:creationId xmlns:a16="http://schemas.microsoft.com/office/drawing/2014/main" id="{C83B8FD9-97D7-4E46-A0A2-8ED18AD2F3AA}"/>
-              </a:ext>
-            </a:extLst>
-          </p:cNvPr>
+          <p:cNvPr id="9" name="Slide Number Placeholder 8"/>
           <p:cNvSpPr>
             <a:spLocks noGrp="1"/>
           </p:cNvSpPr>
@@ -921,7 +1705,7 @@
     </p:spTree>
     <p:extLst>
       <p:ext uri="{BB962C8B-B14F-4D97-AF65-F5344CB8AC3E}">
-        <p14:creationId xmlns:p14="http://schemas.microsoft.com/office/powerpoint/2010/main" val="1527368216"/>
+        <p14:creationId xmlns:p14="http://schemas.microsoft.com/office/powerpoint/2010/main" val="193291787"/>
       </p:ext>
     </p:extLst>
   </p:cSld>
@@ -934,6 +1718,14 @@
 <file path=ppt/slideLayouts/slideLayout3.xml><?xml version="1.0" encoding="utf-8"?>
 <p:sldLayout xmlns:a="http://schemas.openxmlformats.org/drawingml/2006/main" xmlns:r="http://schemas.openxmlformats.org/officeDocument/2006/relationships" xmlns:p="http://schemas.openxmlformats.org/presentationml/2006/main" type="secHead" preserve="1">
   <p:cSld name="Section Header">
+    <p:bg>
+      <p:bgPr>
+        <a:solidFill>
+          <a:schemeClr val="accent1"/>
+        </a:solidFill>
+        <a:effectLst/>
+      </p:bgPr>
+    </p:bg>
     <p:spTree>
       <p:nvGrpSpPr>
         <p:cNvPr id="1" name=""/>
@@ -950,73 +1742,76 @@
       </p:grpSpPr>
       <p:sp>
         <p:nvSpPr>
-          <p:cNvPr id="2" name="Title 1">
-            <a:extLst>
-              <a:ext uri="{FF2B5EF4-FFF2-40B4-BE49-F238E27FC236}">
-                <a16:creationId xmlns:a16="http://schemas.microsoft.com/office/drawing/2014/main" id="{EAA1D437-C937-4D02-9917-B3CCE8570E31}"/>
-              </a:ext>
-            </a:extLst>
-          </p:cNvPr>
+          <p:cNvPr id="2" name="Title 1"/>
           <p:cNvSpPr>
             <a:spLocks noGrp="1"/>
           </p:cNvSpPr>
           <p:nvPr>
             <p:ph type="title"/>
+          </p:nvPr>
+        </p:nvSpPr>
+        <p:spPr bwMode="blackWhite">
+          <a:xfrm>
+            <a:off x="1600200" y="2386744"/>
+            <a:ext cx="8991600" cy="1645920"/>
+          </a:xfrm>
+          <a:solidFill>
+            <a:srgbClr val="FFFFFF"/>
+          </a:solidFill>
+          <a:ln w="38100">
+            <a:solidFill>
+              <a:srgbClr val="404040"/>
+            </a:solidFill>
+          </a:ln>
+        </p:spPr>
+        <p:txBody>
+          <a:bodyPr lIns="274320" rIns="274320" anchor="ctr" anchorCtr="1">
+            <a:normAutofit/>
+          </a:bodyPr>
+          <a:lstStyle>
+            <a:lvl1pPr>
+              <a:defRPr sz="3800">
+                <a:solidFill>
+                  <a:srgbClr val="262626"/>
+                </a:solidFill>
+              </a:defRPr>
+            </a:lvl1pPr>
+          </a:lstStyle>
+          <a:p>
+            <a:r>
+              <a:rPr lang="en-US" smtClean="0"/>
+              <a:t>Click to edit Master title style</a:t>
+            </a:r>
+            <a:endParaRPr lang="en-US" dirty="0"/>
+          </a:p>
+        </p:txBody>
+      </p:sp>
+      <p:sp>
+        <p:nvSpPr>
+          <p:cNvPr id="3" name="Text Placeholder 2"/>
+          <p:cNvSpPr>
+            <a:spLocks noGrp="1"/>
+          </p:cNvSpPr>
+          <p:nvPr>
+            <p:ph type="body" idx="1"/>
           </p:nvPr>
         </p:nvSpPr>
         <p:spPr>
           <a:xfrm>
-            <a:off x="831850" y="1709738"/>
-            <a:ext cx="10515600" cy="2852737"/>
+            <a:off x="2695194" y="4352465"/>
+            <a:ext cx="6801612" cy="1265082"/>
           </a:xfrm>
         </p:spPr>
         <p:txBody>
-          <a:bodyPr anchor="b"/>
-          <a:lstStyle>
-            <a:lvl1pPr>
-              <a:defRPr sz="6000"/>
-            </a:lvl1pPr>
-          </a:lstStyle>
-          <a:p>
-            <a:r>
-              <a:rPr lang="en-US"/>
-              <a:t>Click to edit Master title style</a:t>
-            </a:r>
-          </a:p>
-        </p:txBody>
-      </p:sp>
-      <p:sp>
-        <p:nvSpPr>
-          <p:cNvPr id="3" name="Text Placeholder 2">
-            <a:extLst>
-              <a:ext uri="{FF2B5EF4-FFF2-40B4-BE49-F238E27FC236}">
-                <a16:creationId xmlns:a16="http://schemas.microsoft.com/office/drawing/2014/main" id="{8F231793-BC7B-4DD4-9D7E-696073A70435}"/>
-              </a:ext>
-            </a:extLst>
-          </p:cNvPr>
-          <p:cNvSpPr>
-            <a:spLocks noGrp="1"/>
-          </p:cNvSpPr>
-          <p:nvPr>
-            <p:ph type="body" idx="1"/>
-          </p:nvPr>
-        </p:nvSpPr>
-        <p:spPr>
-          <a:xfrm>
-            <a:off x="831850" y="4589463"/>
-            <a:ext cx="10515600" cy="1500187"/>
-          </a:xfrm>
-        </p:spPr>
-        <p:txBody>
-          <a:bodyPr/>
+          <a:bodyPr anchor="t" anchorCtr="1">
+            <a:normAutofit/>
+          </a:bodyPr>
           <a:lstStyle>
             <a:lvl1pPr marL="0" indent="0">
               <a:buNone/>
-              <a:defRPr sz="2400">
+              <a:defRPr sz="2000">
                 <a:solidFill>
-                  <a:schemeClr val="tx1">
-                    <a:tint val="75000"/>
-                  </a:schemeClr>
+                  <a:schemeClr val="tx1"/>
                 </a:solidFill>
               </a:defRPr>
             </a:lvl1pPr>
@@ -1104,21 +1899,15 @@
           <a:p>
             <a:pPr lvl="0"/>
             <a:r>
-              <a:rPr lang="en-US"/>
-              <a:t>Click to edit Master text styles</a:t>
-            </a:r>
-          </a:p>
-        </p:txBody>
-      </p:sp>
-      <p:sp>
-        <p:nvSpPr>
-          <p:cNvPr id="4" name="Date Placeholder 3">
-            <a:extLst>
-              <a:ext uri="{FF2B5EF4-FFF2-40B4-BE49-F238E27FC236}">
-                <a16:creationId xmlns:a16="http://schemas.microsoft.com/office/drawing/2014/main" id="{0F48D8C6-6875-47BE-A993-44C62B2103D9}"/>
-              </a:ext>
-            </a:extLst>
-          </p:cNvPr>
+              <a:rPr lang="en-US" smtClean="0"/>
+              <a:t>Edit Master text styles</a:t>
+            </a:r>
+          </a:p>
+        </p:txBody>
+      </p:sp>
+      <p:sp>
+        <p:nvSpPr>
+          <p:cNvPr id="7" name="Date Placeholder 6"/>
           <p:cNvSpPr>
             <a:spLocks noGrp="1"/>
           </p:cNvSpPr>
@@ -1133,7 +1922,7 @@
           <a:p>
             <a:fld id="{A71E6E4A-F1E9-49B1-A7E6-64E029784417}" type="datetimeFigureOut">
               <a:rPr lang="en-US" smtClean="0"/>
-              <a:t>8/6/2019</a:t>
+              <a:t>8/7/2019</a:t>
             </a:fld>
             <a:endParaRPr lang="en-US"/>
           </a:p>
@@ -1141,13 +1930,7 @@
       </p:sp>
       <p:sp>
         <p:nvSpPr>
-          <p:cNvPr id="5" name="Footer Placeholder 4">
-            <a:extLst>
-              <a:ext uri="{FF2B5EF4-FFF2-40B4-BE49-F238E27FC236}">
-                <a16:creationId xmlns:a16="http://schemas.microsoft.com/office/drawing/2014/main" id="{256F51FD-5238-47BC-9822-933069DA297C}"/>
-              </a:ext>
-            </a:extLst>
-          </p:cNvPr>
+          <p:cNvPr id="8" name="Footer Placeholder 7"/>
           <p:cNvSpPr>
             <a:spLocks noGrp="1"/>
           </p:cNvSpPr>
@@ -1166,13 +1949,7 @@
       </p:sp>
       <p:sp>
         <p:nvSpPr>
-          <p:cNvPr id="6" name="Slide Number Placeholder 5">
-            <a:extLst>
-              <a:ext uri="{FF2B5EF4-FFF2-40B4-BE49-F238E27FC236}">
-                <a16:creationId xmlns:a16="http://schemas.microsoft.com/office/drawing/2014/main" id="{4F0CDAF3-73A9-471D-AF68-0CBF04CC6C12}"/>
-              </a:ext>
-            </a:extLst>
-          </p:cNvPr>
+          <p:cNvPr id="9" name="Slide Number Placeholder 8"/>
           <p:cNvSpPr>
             <a:spLocks noGrp="1"/>
           </p:cNvSpPr>
@@ -1196,12 +1973,12 @@
     </p:spTree>
     <p:extLst>
       <p:ext uri="{BB962C8B-B14F-4D97-AF65-F5344CB8AC3E}">
-        <p14:creationId xmlns:p14="http://schemas.microsoft.com/office/powerpoint/2010/main" val="3277282675"/>
+        <p14:creationId xmlns:p14="http://schemas.microsoft.com/office/powerpoint/2010/main" val="1397783435"/>
       </p:ext>
     </p:extLst>
   </p:cSld>
   <p:clrMapOvr>
-    <a:masterClrMapping/>
+    <a:overrideClrMapping bg1="dk1" tx1="lt1" bg2="dk2" tx2="lt2" accent1="accent1" accent2="accent2" accent3="accent3" accent4="accent4" accent5="accent5" accent6="accent6" hlink="hlink" folHlink="folHlink"/>
   </p:clrMapOvr>
 </p:sldLayout>
 </file>
@@ -1225,13 +2002,7 @@
       </p:grpSpPr>
       <p:sp>
         <p:nvSpPr>
-          <p:cNvPr id="2" name="Title 1">
-            <a:extLst>
-              <a:ext uri="{FF2B5EF4-FFF2-40B4-BE49-F238E27FC236}">
-                <a16:creationId xmlns:a16="http://schemas.microsoft.com/office/drawing/2014/main" id="{E3ED8ACB-CBE4-4892-934D-772F28431774}"/>
-              </a:ext>
-            </a:extLst>
-          </p:cNvPr>
+          <p:cNvPr id="2" name="Title 1"/>
           <p:cNvSpPr>
             <a:spLocks noGrp="1"/>
           </p:cNvSpPr>
@@ -1245,21 +2016,16 @@
           <a:lstStyle/>
           <a:p>
             <a:r>
-              <a:rPr lang="en-US"/>
+              <a:rPr lang="en-US" smtClean="0"/>
               <a:t>Click to edit Master title style</a:t>
             </a:r>
-          </a:p>
-        </p:txBody>
-      </p:sp>
-      <p:sp>
-        <p:nvSpPr>
-          <p:cNvPr id="3" name="Content Placeholder 2">
-            <a:extLst>
-              <a:ext uri="{FF2B5EF4-FFF2-40B4-BE49-F238E27FC236}">
-                <a16:creationId xmlns:a16="http://schemas.microsoft.com/office/drawing/2014/main" id="{53F8C26C-B092-44BC-8511-E360EE4C5BEB}"/>
-              </a:ext>
-            </a:extLst>
-          </p:cNvPr>
+            <a:endParaRPr lang="en-US" dirty="0"/>
+          </a:p>
+        </p:txBody>
+      </p:sp>
+      <p:sp>
+        <p:nvSpPr>
+          <p:cNvPr id="3" name="Content Placeholder 2"/>
           <p:cNvSpPr>
             <a:spLocks noGrp="1"/>
           </p:cNvSpPr>
@@ -1269,8 +2035,8 @@
         </p:nvSpPr>
         <p:spPr>
           <a:xfrm>
-            <a:off x="838200" y="1825625"/>
-            <a:ext cx="5181600" cy="4351338"/>
+            <a:off x="1581912" y="2638044"/>
+            <a:ext cx="4271771" cy="3101982"/>
           </a:xfrm>
         </p:spPr>
         <p:txBody>
@@ -1279,49 +2045,44 @@
           <a:p>
             <a:pPr lvl="0"/>
             <a:r>
-              <a:rPr lang="en-US"/>
-              <a:t>Click to edit Master text styles</a:t>
+              <a:rPr lang="en-US" smtClean="0"/>
+              <a:t>Edit Master text styles</a:t>
             </a:r>
           </a:p>
           <a:p>
             <a:pPr lvl="1"/>
             <a:r>
-              <a:rPr lang="en-US"/>
+              <a:rPr lang="en-US" smtClean="0"/>
               <a:t>Second level</a:t>
             </a:r>
           </a:p>
           <a:p>
             <a:pPr lvl="2"/>
             <a:r>
-              <a:rPr lang="en-US"/>
+              <a:rPr lang="en-US" smtClean="0"/>
               <a:t>Third level</a:t>
             </a:r>
           </a:p>
           <a:p>
             <a:pPr lvl="3"/>
             <a:r>
-              <a:rPr lang="en-US"/>
+              <a:rPr lang="en-US" smtClean="0"/>
               <a:t>Fourth level</a:t>
             </a:r>
           </a:p>
           <a:p>
             <a:pPr lvl="4"/>
             <a:r>
-              <a:rPr lang="en-US"/>
+              <a:rPr lang="en-US" smtClean="0"/>
               <a:t>Fifth level</a:t>
             </a:r>
-          </a:p>
-        </p:txBody>
-      </p:sp>
-      <p:sp>
-        <p:nvSpPr>
-          <p:cNvPr id="4" name="Content Placeholder 3">
-            <a:extLst>
-              <a:ext uri="{FF2B5EF4-FFF2-40B4-BE49-F238E27FC236}">
-                <a16:creationId xmlns:a16="http://schemas.microsoft.com/office/drawing/2014/main" id="{828961B2-0EE5-4CDF-BCF4-A33FF4B71F04}"/>
-              </a:ext>
-            </a:extLst>
-          </p:cNvPr>
+            <a:endParaRPr lang="en-US" dirty="0"/>
+          </a:p>
+        </p:txBody>
+      </p:sp>
+      <p:sp>
+        <p:nvSpPr>
+          <p:cNvPr id="4" name="Content Placeholder 3"/>
           <p:cNvSpPr>
             <a:spLocks noGrp="1"/>
           </p:cNvSpPr>
@@ -1331,8 +2092,8 @@
         </p:nvSpPr>
         <p:spPr>
           <a:xfrm>
-            <a:off x="6172200" y="1825625"/>
-            <a:ext cx="5181600" cy="4351338"/>
+            <a:off x="6338315" y="2638044"/>
+            <a:ext cx="4270247" cy="3101982"/>
           </a:xfrm>
         </p:spPr>
         <p:txBody>
@@ -1341,49 +2102,44 @@
           <a:p>
             <a:pPr lvl="0"/>
             <a:r>
-              <a:rPr lang="en-US"/>
-              <a:t>Click to edit Master text styles</a:t>
+              <a:rPr lang="en-US" smtClean="0"/>
+              <a:t>Edit Master text styles</a:t>
             </a:r>
           </a:p>
           <a:p>
             <a:pPr lvl="1"/>
             <a:r>
-              <a:rPr lang="en-US"/>
+              <a:rPr lang="en-US" smtClean="0"/>
               <a:t>Second level</a:t>
             </a:r>
           </a:p>
           <a:p>
             <a:pPr lvl="2"/>
             <a:r>
-              <a:rPr lang="en-US"/>
+              <a:rPr lang="en-US" smtClean="0"/>
               <a:t>Third level</a:t>
             </a:r>
           </a:p>
           <a:p>
             <a:pPr lvl="3"/>
             <a:r>
-              <a:rPr lang="en-US"/>
+              <a:rPr lang="en-US" smtClean="0"/>
               <a:t>Fourth level</a:t>
             </a:r>
           </a:p>
           <a:p>
             <a:pPr lvl="4"/>
             <a:r>
-              <a:rPr lang="en-US"/>
+              <a:rPr lang="en-US" smtClean="0"/>
               <a:t>Fifth level</a:t>
             </a:r>
-          </a:p>
-        </p:txBody>
-      </p:sp>
-      <p:sp>
-        <p:nvSpPr>
-          <p:cNvPr id="5" name="Date Placeholder 4">
-            <a:extLst>
-              <a:ext uri="{FF2B5EF4-FFF2-40B4-BE49-F238E27FC236}">
-                <a16:creationId xmlns:a16="http://schemas.microsoft.com/office/drawing/2014/main" id="{F1681C13-939F-4763-B291-B258981875BC}"/>
-              </a:ext>
-            </a:extLst>
-          </p:cNvPr>
+            <a:endParaRPr lang="en-US" dirty="0"/>
+          </a:p>
+        </p:txBody>
+      </p:sp>
+      <p:sp>
+        <p:nvSpPr>
+          <p:cNvPr id="8" name="Date Placeholder 7"/>
           <p:cNvSpPr>
             <a:spLocks noGrp="1"/>
           </p:cNvSpPr>
@@ -1398,7 +2154,7 @@
           <a:p>
             <a:fld id="{A71E6E4A-F1E9-49B1-A7E6-64E029784417}" type="datetimeFigureOut">
               <a:rPr lang="en-US" smtClean="0"/>
-              <a:t>8/6/2019</a:t>
+              <a:t>8/7/2019</a:t>
             </a:fld>
             <a:endParaRPr lang="en-US"/>
           </a:p>
@@ -1406,13 +2162,7 @@
       </p:sp>
       <p:sp>
         <p:nvSpPr>
-          <p:cNvPr id="6" name="Footer Placeholder 5">
-            <a:extLst>
-              <a:ext uri="{FF2B5EF4-FFF2-40B4-BE49-F238E27FC236}">
-                <a16:creationId xmlns:a16="http://schemas.microsoft.com/office/drawing/2014/main" id="{AB28920C-2DEA-4CD0-A843-76DAD60E4194}"/>
-              </a:ext>
-            </a:extLst>
-          </p:cNvPr>
+          <p:cNvPr id="9" name="Footer Placeholder 8"/>
           <p:cNvSpPr>
             <a:spLocks noGrp="1"/>
           </p:cNvSpPr>
@@ -1431,13 +2181,7 @@
       </p:sp>
       <p:sp>
         <p:nvSpPr>
-          <p:cNvPr id="7" name="Slide Number Placeholder 6">
-            <a:extLst>
-              <a:ext uri="{FF2B5EF4-FFF2-40B4-BE49-F238E27FC236}">
-                <a16:creationId xmlns:a16="http://schemas.microsoft.com/office/drawing/2014/main" id="{DD7683A6-D243-44C7-B704-11C4C1563E76}"/>
-              </a:ext>
-            </a:extLst>
-          </p:cNvPr>
+          <p:cNvPr id="10" name="Slide Number Placeholder 9"/>
           <p:cNvSpPr>
             <a:spLocks noGrp="1"/>
           </p:cNvSpPr>
@@ -1461,7 +2205,7 @@
     </p:spTree>
     <p:extLst>
       <p:ext uri="{BB962C8B-B14F-4D97-AF65-F5344CB8AC3E}">
-        <p14:creationId xmlns:p14="http://schemas.microsoft.com/office/powerpoint/2010/main" val="1696016390"/>
+        <p14:creationId xmlns:p14="http://schemas.microsoft.com/office/powerpoint/2010/main" val="3419572134"/>
       </p:ext>
     </p:extLst>
   </p:cSld>
@@ -1490,69 +2234,38 @@
       </p:grpSpPr>
       <p:sp>
         <p:nvSpPr>
-          <p:cNvPr id="2" name="Title 1">
-            <a:extLst>
-              <a:ext uri="{FF2B5EF4-FFF2-40B4-BE49-F238E27FC236}">
-                <a16:creationId xmlns:a16="http://schemas.microsoft.com/office/drawing/2014/main" id="{83BA3D5B-C630-4FAC-983F-9DB657192DE7}"/>
-              </a:ext>
-            </a:extLst>
-          </p:cNvPr>
-          <p:cNvSpPr>
-            <a:spLocks noGrp="1"/>
-          </p:cNvSpPr>
-          <p:nvPr>
-            <p:ph type="title"/>
+          <p:cNvPr id="3" name="Text Placeholder 2"/>
+          <p:cNvSpPr>
+            <a:spLocks noGrp="1"/>
+          </p:cNvSpPr>
+          <p:nvPr>
+            <p:ph type="body" idx="1"/>
           </p:nvPr>
         </p:nvSpPr>
         <p:spPr>
           <a:xfrm>
-            <a:off x="839788" y="365125"/>
-            <a:ext cx="10515600" cy="1325563"/>
+            <a:off x="1583436" y="2313433"/>
+            <a:ext cx="4270248" cy="704087"/>
           </a:xfrm>
         </p:spPr>
         <p:txBody>
-          <a:bodyPr/>
-          <a:lstStyle/>
-          <a:p>
-            <a:r>
-              <a:rPr lang="en-US"/>
-              <a:t>Click to edit Master title style</a:t>
-            </a:r>
-          </a:p>
-        </p:txBody>
-      </p:sp>
-      <p:sp>
-        <p:nvSpPr>
-          <p:cNvPr id="3" name="Text Placeholder 2">
-            <a:extLst>
-              <a:ext uri="{FF2B5EF4-FFF2-40B4-BE49-F238E27FC236}">
-                <a16:creationId xmlns:a16="http://schemas.microsoft.com/office/drawing/2014/main" id="{B9C3FADA-B563-4A3D-9438-FB188A30E32B}"/>
-              </a:ext>
-            </a:extLst>
-          </p:cNvPr>
-          <p:cNvSpPr>
-            <a:spLocks noGrp="1"/>
-          </p:cNvSpPr>
-          <p:nvPr>
-            <p:ph type="body" idx="1"/>
-          </p:nvPr>
-        </p:nvSpPr>
-        <p:spPr>
-          <a:xfrm>
-            <a:off x="839788" y="1681163"/>
-            <a:ext cx="5157787" cy="823912"/>
-          </a:xfrm>
-        </p:spPr>
-        <p:txBody>
-          <a:bodyPr anchor="b"/>
+          <a:bodyPr anchor="b" anchorCtr="1">
+            <a:normAutofit/>
+          </a:bodyPr>
           <a:lstStyle>
-            <a:lvl1pPr marL="0" indent="0">
-              <a:buNone/>
-              <a:defRPr sz="2400" b="1"/>
+            <a:lvl1pPr marL="0" indent="0" algn="ctr">
+              <a:buNone/>
+              <a:defRPr sz="1900" b="0" cap="all" spc="100" baseline="0">
+                <a:solidFill>
+                  <a:schemeClr val="accent2">
+                    <a:lumMod val="75000"/>
+                  </a:schemeClr>
+                </a:solidFill>
+              </a:defRPr>
             </a:lvl1pPr>
             <a:lvl2pPr marL="457200" indent="0">
               <a:buNone/>
-              <a:defRPr sz="2000" b="1"/>
+              <a:defRPr sz="1900" b="1"/>
             </a:lvl2pPr>
             <a:lvl3pPr marL="914400" indent="0">
               <a:buNone/>
@@ -1586,21 +2299,15 @@
           <a:p>
             <a:pPr lvl="0"/>
             <a:r>
-              <a:rPr lang="en-US"/>
-              <a:t>Click to edit Master text styles</a:t>
-            </a:r>
-          </a:p>
-        </p:txBody>
-      </p:sp>
-      <p:sp>
-        <p:nvSpPr>
-          <p:cNvPr id="4" name="Content Placeholder 3">
-            <a:extLst>
-              <a:ext uri="{FF2B5EF4-FFF2-40B4-BE49-F238E27FC236}">
-                <a16:creationId xmlns:a16="http://schemas.microsoft.com/office/drawing/2014/main" id="{F066A93A-E1B0-4A98-B7D5-3B7F9A1AE755}"/>
-              </a:ext>
-            </a:extLst>
-          </p:cNvPr>
+              <a:rPr lang="en-US" smtClean="0"/>
+              <a:t>Edit Master text styles</a:t>
+            </a:r>
+          </a:p>
+        </p:txBody>
+      </p:sp>
+      <p:sp>
+        <p:nvSpPr>
+          <p:cNvPr id="4" name="Content Placeholder 3"/>
           <p:cNvSpPr>
             <a:spLocks noGrp="1"/>
           </p:cNvSpPr>
@@ -1610,8 +2317,8 @@
         </p:nvSpPr>
         <p:spPr>
           <a:xfrm>
-            <a:off x="839788" y="2505075"/>
-            <a:ext cx="5157787" cy="3684588"/>
+            <a:off x="1583436" y="3143250"/>
+            <a:ext cx="4270248" cy="2596776"/>
           </a:xfrm>
         </p:spPr>
         <p:txBody>
@@ -1620,72 +2327,136 @@
           <a:p>
             <a:pPr lvl="0"/>
             <a:r>
-              <a:rPr lang="en-US"/>
-              <a:t>Click to edit Master text styles</a:t>
+              <a:rPr lang="en-US" smtClean="0"/>
+              <a:t>Edit Master text styles</a:t>
             </a:r>
           </a:p>
           <a:p>
             <a:pPr lvl="1"/>
             <a:r>
-              <a:rPr lang="en-US"/>
+              <a:rPr lang="en-US" smtClean="0"/>
               <a:t>Second level</a:t>
             </a:r>
           </a:p>
           <a:p>
             <a:pPr lvl="2"/>
             <a:r>
-              <a:rPr lang="en-US"/>
+              <a:rPr lang="en-US" smtClean="0"/>
               <a:t>Third level</a:t>
             </a:r>
           </a:p>
           <a:p>
             <a:pPr lvl="3"/>
             <a:r>
-              <a:rPr lang="en-US"/>
+              <a:rPr lang="en-US" smtClean="0"/>
               <a:t>Fourth level</a:t>
             </a:r>
           </a:p>
           <a:p>
             <a:pPr lvl="4"/>
             <a:r>
-              <a:rPr lang="en-US"/>
+              <a:rPr lang="en-US" smtClean="0"/>
               <a:t>Fifth level</a:t>
             </a:r>
-          </a:p>
-        </p:txBody>
-      </p:sp>
-      <p:sp>
-        <p:nvSpPr>
-          <p:cNvPr id="5" name="Text Placeholder 4">
-            <a:extLst>
-              <a:ext uri="{FF2B5EF4-FFF2-40B4-BE49-F238E27FC236}">
-                <a16:creationId xmlns:a16="http://schemas.microsoft.com/office/drawing/2014/main" id="{DA1F38D3-8478-491F-A723-6A414C81A237}"/>
-              </a:ext>
-            </a:extLst>
-          </p:cNvPr>
-          <p:cNvSpPr>
-            <a:spLocks noGrp="1"/>
-          </p:cNvSpPr>
-          <p:nvPr>
-            <p:ph type="body" sz="quarter" idx="3"/>
+            <a:endParaRPr lang="en-US" dirty="0"/>
+          </a:p>
+        </p:txBody>
+      </p:sp>
+      <p:sp>
+        <p:nvSpPr>
+          <p:cNvPr id="6" name="Content Placeholder 5"/>
+          <p:cNvSpPr>
+            <a:spLocks noGrp="1"/>
+          </p:cNvSpPr>
+          <p:nvPr>
+            <p:ph sz="quarter" idx="4"/>
           </p:nvPr>
         </p:nvSpPr>
         <p:spPr>
           <a:xfrm>
-            <a:off x="6172200" y="1681163"/>
-            <a:ext cx="5183188" cy="823912"/>
+            <a:off x="6338316" y="3143250"/>
+            <a:ext cx="4253484" cy="2596776"/>
           </a:xfrm>
         </p:spPr>
         <p:txBody>
-          <a:bodyPr anchor="b"/>
+          <a:bodyPr/>
           <a:lstStyle>
-            <a:lvl1pPr marL="0" indent="0">
-              <a:buNone/>
-              <a:defRPr sz="2400" b="1"/>
+            <a:lvl5pPr>
+              <a:defRPr/>
+            </a:lvl5pPr>
+          </a:lstStyle>
+          <a:p>
+            <a:pPr lvl="0"/>
+            <a:r>
+              <a:rPr lang="en-US" smtClean="0"/>
+              <a:t>Edit Master text styles</a:t>
+            </a:r>
+          </a:p>
+          <a:p>
+            <a:pPr lvl="1"/>
+            <a:r>
+              <a:rPr lang="en-US" smtClean="0"/>
+              <a:t>Second level</a:t>
+            </a:r>
+          </a:p>
+          <a:p>
+            <a:pPr lvl="2"/>
+            <a:r>
+              <a:rPr lang="en-US" smtClean="0"/>
+              <a:t>Third level</a:t>
+            </a:r>
+          </a:p>
+          <a:p>
+            <a:pPr lvl="3"/>
+            <a:r>
+              <a:rPr lang="en-US" smtClean="0"/>
+              <a:t>Fourth level</a:t>
+            </a:r>
+          </a:p>
+          <a:p>
+            <a:pPr lvl="4"/>
+            <a:r>
+              <a:rPr lang="en-US" smtClean="0"/>
+              <a:t>Fifth level</a:t>
+            </a:r>
+            <a:endParaRPr lang="en-US" dirty="0"/>
+          </a:p>
+        </p:txBody>
+      </p:sp>
+      <p:sp>
+        <p:nvSpPr>
+          <p:cNvPr id="11" name="Text Placeholder 4"/>
+          <p:cNvSpPr>
+            <a:spLocks noGrp="1"/>
+          </p:cNvSpPr>
+          <p:nvPr>
+            <p:ph type="body" sz="quarter" idx="13"/>
+          </p:nvPr>
+        </p:nvSpPr>
+        <p:spPr>
+          <a:xfrm>
+            <a:off x="6338316" y="2313433"/>
+            <a:ext cx="4270248" cy="704087"/>
+          </a:xfrm>
+        </p:spPr>
+        <p:txBody>
+          <a:bodyPr anchor="b" anchorCtr="1">
+            <a:normAutofit/>
+          </a:bodyPr>
+          <a:lstStyle>
+            <a:lvl1pPr marL="0" indent="0" algn="ctr">
+              <a:buNone/>
+              <a:defRPr sz="1900" b="0" cap="all" spc="100" baseline="0">
+                <a:solidFill>
+                  <a:schemeClr val="accent2">
+                    <a:lumMod val="75000"/>
+                  </a:schemeClr>
+                </a:solidFill>
+              </a:defRPr>
             </a:lvl1pPr>
             <a:lvl2pPr marL="457200" indent="0">
               <a:buNone/>
-              <a:defRPr sz="2000" b="1"/>
+              <a:defRPr sz="1900" b="1"/>
             </a:lvl2pPr>
             <a:lvl3pPr marL="914400" indent="0">
               <a:buNone/>
@@ -1719,98 +2490,30 @@
           <a:p>
             <a:pPr lvl="0"/>
             <a:r>
-              <a:rPr lang="en-US"/>
-              <a:t>Click to edit Master text styles</a:t>
-            </a:r>
-          </a:p>
-        </p:txBody>
-      </p:sp>
-      <p:sp>
-        <p:nvSpPr>
-          <p:cNvPr id="6" name="Content Placeholder 5">
-            <a:extLst>
-              <a:ext uri="{FF2B5EF4-FFF2-40B4-BE49-F238E27FC236}">
-                <a16:creationId xmlns:a16="http://schemas.microsoft.com/office/drawing/2014/main" id="{0BDB5CEE-BC16-4632-9D94-0A5A429E678A}"/>
-              </a:ext>
-            </a:extLst>
-          </p:cNvPr>
-          <p:cNvSpPr>
-            <a:spLocks noGrp="1"/>
-          </p:cNvSpPr>
-          <p:nvPr>
-            <p:ph sz="quarter" idx="4"/>
-          </p:nvPr>
-        </p:nvSpPr>
-        <p:spPr>
-          <a:xfrm>
-            <a:off x="6172200" y="2505075"/>
-            <a:ext cx="5183188" cy="3684588"/>
-          </a:xfrm>
-        </p:spPr>
+              <a:rPr lang="en-US" smtClean="0"/>
+              <a:t>Edit Master text styles</a:t>
+            </a:r>
+          </a:p>
+        </p:txBody>
+      </p:sp>
+      <p:sp>
+        <p:nvSpPr>
+          <p:cNvPr id="7" name="Date Placeholder 6"/>
+          <p:cNvSpPr>
+            <a:spLocks noGrp="1"/>
+          </p:cNvSpPr>
+          <p:nvPr>
+            <p:ph type="dt" sz="half" idx="10"/>
+          </p:nvPr>
+        </p:nvSpPr>
+        <p:spPr/>
         <p:txBody>
           <a:bodyPr/>
           <a:lstStyle/>
           <a:p>
-            <a:pPr lvl="0"/>
-            <a:r>
-              <a:rPr lang="en-US"/>
-              <a:t>Click to edit Master text styles</a:t>
-            </a:r>
-          </a:p>
-          <a:p>
-            <a:pPr lvl="1"/>
-            <a:r>
-              <a:rPr lang="en-US"/>
-              <a:t>Second level</a:t>
-            </a:r>
-          </a:p>
-          <a:p>
-            <a:pPr lvl="2"/>
-            <a:r>
-              <a:rPr lang="en-US"/>
-              <a:t>Third level</a:t>
-            </a:r>
-          </a:p>
-          <a:p>
-            <a:pPr lvl="3"/>
-            <a:r>
-              <a:rPr lang="en-US"/>
-              <a:t>Fourth level</a:t>
-            </a:r>
-          </a:p>
-          <a:p>
-            <a:pPr lvl="4"/>
-            <a:r>
-              <a:rPr lang="en-US"/>
-              <a:t>Fifth level</a:t>
-            </a:r>
-          </a:p>
-        </p:txBody>
-      </p:sp>
-      <p:sp>
-        <p:nvSpPr>
-          <p:cNvPr id="7" name="Date Placeholder 6">
-            <a:extLst>
-              <a:ext uri="{FF2B5EF4-FFF2-40B4-BE49-F238E27FC236}">
-                <a16:creationId xmlns:a16="http://schemas.microsoft.com/office/drawing/2014/main" id="{962C7CC6-94DF-4163-9445-25749AFEDD18}"/>
-              </a:ext>
-            </a:extLst>
-          </p:cNvPr>
-          <p:cNvSpPr>
-            <a:spLocks noGrp="1"/>
-          </p:cNvSpPr>
-          <p:nvPr>
-            <p:ph type="dt" sz="half" idx="10"/>
-          </p:nvPr>
-        </p:nvSpPr>
-        <p:spPr/>
-        <p:txBody>
-          <a:bodyPr/>
-          <a:lstStyle/>
-          <a:p>
             <a:fld id="{A71E6E4A-F1E9-49B1-A7E6-64E029784417}" type="datetimeFigureOut">
               <a:rPr lang="en-US" smtClean="0"/>
-              <a:t>8/6/2019</a:t>
+              <a:t>8/7/2019</a:t>
             </a:fld>
             <a:endParaRPr lang="en-US"/>
           </a:p>
@@ -1818,13 +2521,7 @@
       </p:sp>
       <p:sp>
         <p:nvSpPr>
-          <p:cNvPr id="8" name="Footer Placeholder 7">
-            <a:extLst>
-              <a:ext uri="{FF2B5EF4-FFF2-40B4-BE49-F238E27FC236}">
-                <a16:creationId xmlns:a16="http://schemas.microsoft.com/office/drawing/2014/main" id="{58C95B9C-C4F9-40FB-9370-A9DB8C7E6A7B}"/>
-              </a:ext>
-            </a:extLst>
-          </p:cNvPr>
+          <p:cNvPr id="8" name="Footer Placeholder 7"/>
           <p:cNvSpPr>
             <a:spLocks noGrp="1"/>
           </p:cNvSpPr>
@@ -1843,13 +2540,7 @@
       </p:sp>
       <p:sp>
         <p:nvSpPr>
-          <p:cNvPr id="9" name="Slide Number Placeholder 8">
-            <a:extLst>
-              <a:ext uri="{FF2B5EF4-FFF2-40B4-BE49-F238E27FC236}">
-                <a16:creationId xmlns:a16="http://schemas.microsoft.com/office/drawing/2014/main" id="{CBC358C7-971E-410C-AE9E-E109F8C7DF11}"/>
-              </a:ext>
-            </a:extLst>
-          </p:cNvPr>
+          <p:cNvPr id="9" name="Slide Number Placeholder 8"/>
           <p:cNvSpPr>
             <a:spLocks noGrp="1"/>
           </p:cNvSpPr>
@@ -1870,10 +2561,33 @@
           </a:p>
         </p:txBody>
       </p:sp>
+      <p:sp>
+        <p:nvSpPr>
+          <p:cNvPr id="10" name="Title 9"/>
+          <p:cNvSpPr>
+            <a:spLocks noGrp="1"/>
+          </p:cNvSpPr>
+          <p:nvPr>
+            <p:ph type="title"/>
+          </p:nvPr>
+        </p:nvSpPr>
+        <p:spPr/>
+        <p:txBody>
+          <a:bodyPr/>
+          <a:lstStyle/>
+          <a:p>
+            <a:r>
+              <a:rPr lang="en-US" smtClean="0"/>
+              <a:t>Click to edit Master title style</a:t>
+            </a:r>
+            <a:endParaRPr lang="en-US" dirty="0"/>
+          </a:p>
+        </p:txBody>
+      </p:sp>
     </p:spTree>
     <p:extLst>
       <p:ext uri="{BB962C8B-B14F-4D97-AF65-F5344CB8AC3E}">
-        <p14:creationId xmlns:p14="http://schemas.microsoft.com/office/powerpoint/2010/main" val="2428560907"/>
+        <p14:creationId xmlns:p14="http://schemas.microsoft.com/office/powerpoint/2010/main" val="700199176"/>
       </p:ext>
     </p:extLst>
   </p:cSld>
@@ -1902,13 +2616,7 @@
       </p:grpSpPr>
       <p:sp>
         <p:nvSpPr>
-          <p:cNvPr id="2" name="Title 1">
-            <a:extLst>
-              <a:ext uri="{FF2B5EF4-FFF2-40B4-BE49-F238E27FC236}">
-                <a16:creationId xmlns:a16="http://schemas.microsoft.com/office/drawing/2014/main" id="{F25B1AB9-BA9F-4B37-89E7-101FC059319C}"/>
-              </a:ext>
-            </a:extLst>
-          </p:cNvPr>
+          <p:cNvPr id="2" name="Title 1"/>
           <p:cNvSpPr>
             <a:spLocks noGrp="1"/>
           </p:cNvSpPr>
@@ -1922,21 +2630,16 @@
           <a:lstStyle/>
           <a:p>
             <a:r>
-              <a:rPr lang="en-US"/>
+              <a:rPr lang="en-US" smtClean="0"/>
               <a:t>Click to edit Master title style</a:t>
             </a:r>
-          </a:p>
-        </p:txBody>
-      </p:sp>
-      <p:sp>
-        <p:nvSpPr>
-          <p:cNvPr id="3" name="Date Placeholder 2">
-            <a:extLst>
-              <a:ext uri="{FF2B5EF4-FFF2-40B4-BE49-F238E27FC236}">
-                <a16:creationId xmlns:a16="http://schemas.microsoft.com/office/drawing/2014/main" id="{8A744BAF-40A6-4B16-AFD3-8FD78A38A21A}"/>
-              </a:ext>
-            </a:extLst>
-          </p:cNvPr>
+            <a:endParaRPr lang="en-US" dirty="0"/>
+          </a:p>
+        </p:txBody>
+      </p:sp>
+      <p:sp>
+        <p:nvSpPr>
+          <p:cNvPr id="3" name="Date Placeholder 2"/>
           <p:cNvSpPr>
             <a:spLocks noGrp="1"/>
           </p:cNvSpPr>
@@ -1951,7 +2654,7 @@
           <a:p>
             <a:fld id="{A71E6E4A-F1E9-49B1-A7E6-64E029784417}" type="datetimeFigureOut">
               <a:rPr lang="en-US" smtClean="0"/>
-              <a:t>8/6/2019</a:t>
+              <a:t>8/7/2019</a:t>
             </a:fld>
             <a:endParaRPr lang="en-US"/>
           </a:p>
@@ -1959,13 +2662,7 @@
       </p:sp>
       <p:sp>
         <p:nvSpPr>
-          <p:cNvPr id="4" name="Footer Placeholder 3">
-            <a:extLst>
-              <a:ext uri="{FF2B5EF4-FFF2-40B4-BE49-F238E27FC236}">
-                <a16:creationId xmlns:a16="http://schemas.microsoft.com/office/drawing/2014/main" id="{D7CBB04B-4AE5-4547-BF55-027B70BE6F6C}"/>
-              </a:ext>
-            </a:extLst>
-          </p:cNvPr>
+          <p:cNvPr id="4" name="Footer Placeholder 3"/>
           <p:cNvSpPr>
             <a:spLocks noGrp="1"/>
           </p:cNvSpPr>
@@ -1984,13 +2681,7 @@
       </p:sp>
       <p:sp>
         <p:nvSpPr>
-          <p:cNvPr id="5" name="Slide Number Placeholder 4">
-            <a:extLst>
-              <a:ext uri="{FF2B5EF4-FFF2-40B4-BE49-F238E27FC236}">
-                <a16:creationId xmlns:a16="http://schemas.microsoft.com/office/drawing/2014/main" id="{58CE23ED-83AD-4756-8430-11EC56E8F1CA}"/>
-              </a:ext>
-            </a:extLst>
-          </p:cNvPr>
+          <p:cNvPr id="5" name="Slide Number Placeholder 4"/>
           <p:cNvSpPr>
             <a:spLocks noGrp="1"/>
           </p:cNvSpPr>
@@ -2014,7 +2705,7 @@
     </p:spTree>
     <p:extLst>
       <p:ext uri="{BB962C8B-B14F-4D97-AF65-F5344CB8AC3E}">
-        <p14:creationId xmlns:p14="http://schemas.microsoft.com/office/powerpoint/2010/main" val="3205310111"/>
+        <p14:creationId xmlns:p14="http://schemas.microsoft.com/office/powerpoint/2010/main" val="3562050716"/>
       </p:ext>
     </p:extLst>
   </p:cSld>
@@ -2043,13 +2734,7 @@
       </p:grpSpPr>
       <p:sp>
         <p:nvSpPr>
-          <p:cNvPr id="2" name="Date Placeholder 1">
-            <a:extLst>
-              <a:ext uri="{FF2B5EF4-FFF2-40B4-BE49-F238E27FC236}">
-                <a16:creationId xmlns:a16="http://schemas.microsoft.com/office/drawing/2014/main" id="{252D3529-D700-4741-9679-FF2D3B1D4635}"/>
-              </a:ext>
-            </a:extLst>
-          </p:cNvPr>
+          <p:cNvPr id="2" name="Date Placeholder 1"/>
           <p:cNvSpPr>
             <a:spLocks noGrp="1"/>
           </p:cNvSpPr>
@@ -2064,7 +2749,7 @@
           <a:p>
             <a:fld id="{A71E6E4A-F1E9-49B1-A7E6-64E029784417}" type="datetimeFigureOut">
               <a:rPr lang="en-US" smtClean="0"/>
-              <a:t>8/6/2019</a:t>
+              <a:t>8/7/2019</a:t>
             </a:fld>
             <a:endParaRPr lang="en-US"/>
           </a:p>
@@ -2072,13 +2757,7 @@
       </p:sp>
       <p:sp>
         <p:nvSpPr>
-          <p:cNvPr id="3" name="Footer Placeholder 2">
-            <a:extLst>
-              <a:ext uri="{FF2B5EF4-FFF2-40B4-BE49-F238E27FC236}">
-                <a16:creationId xmlns:a16="http://schemas.microsoft.com/office/drawing/2014/main" id="{4ABF633B-7646-4D25-990C-A972954DB7FE}"/>
-              </a:ext>
-            </a:extLst>
-          </p:cNvPr>
+          <p:cNvPr id="3" name="Footer Placeholder 2"/>
           <p:cNvSpPr>
             <a:spLocks noGrp="1"/>
           </p:cNvSpPr>
@@ -2097,13 +2776,7 @@
       </p:sp>
       <p:sp>
         <p:nvSpPr>
-          <p:cNvPr id="4" name="Slide Number Placeholder 3">
-            <a:extLst>
-              <a:ext uri="{FF2B5EF4-FFF2-40B4-BE49-F238E27FC236}">
-                <a16:creationId xmlns:a16="http://schemas.microsoft.com/office/drawing/2014/main" id="{DD5A5315-58F5-49D2-B989-D63C96F07AED}"/>
-              </a:ext>
-            </a:extLst>
-          </p:cNvPr>
+          <p:cNvPr id="4" name="Slide Number Placeholder 3"/>
           <p:cNvSpPr>
             <a:spLocks noGrp="1"/>
           </p:cNvSpPr>
@@ -2127,7 +2800,7 @@
     </p:spTree>
     <p:extLst>
       <p:ext uri="{BB962C8B-B14F-4D97-AF65-F5344CB8AC3E}">
-        <p14:creationId xmlns:p14="http://schemas.microsoft.com/office/powerpoint/2010/main" val="2205216544"/>
+        <p14:creationId xmlns:p14="http://schemas.microsoft.com/office/powerpoint/2010/main" val="2305835793"/>
       </p:ext>
     </p:extLst>
   </p:cSld>
@@ -2156,265 +2829,326 @@
       </p:grpSpPr>
       <p:sp>
         <p:nvSpPr>
-          <p:cNvPr id="2" name="Title 1">
-            <a:extLst>
-              <a:ext uri="{FF2B5EF4-FFF2-40B4-BE49-F238E27FC236}">
-                <a16:creationId xmlns:a16="http://schemas.microsoft.com/office/drawing/2014/main" id="{F248C101-2FE0-4149-BDD2-96B3EF0A2A5F}"/>
-              </a:ext>
-            </a:extLst>
-          </p:cNvPr>
-          <p:cNvSpPr>
-            <a:spLocks noGrp="1"/>
-          </p:cNvSpPr>
-          <p:nvPr>
-            <p:ph type="title"/>
-          </p:nvPr>
+          <p:cNvPr id="26" name="Rectangle 25"/>
+          <p:cNvSpPr/>
+          <p:nvPr/>
         </p:nvSpPr>
         <p:spPr>
           <a:xfrm>
-            <a:off x="839788" y="457200"/>
-            <a:ext cx="3932237" cy="1600200"/>
+            <a:off x="0" y="0"/>
+            <a:ext cx="6096000" cy="6858000"/>
+          </a:xfrm>
+          <a:prstGeom prst="rect">
+            <a:avLst/>
+          </a:prstGeom>
+          <a:solidFill>
+            <a:schemeClr val="accent2"/>
+          </a:solidFill>
+          <a:ln>
+            <a:noFill/>
+          </a:ln>
+        </p:spPr>
+        <p:style>
+          <a:lnRef idx="2">
+            <a:schemeClr val="accent1">
+              <a:shade val="50000"/>
+            </a:schemeClr>
+          </a:lnRef>
+          <a:fillRef idx="1">
+            <a:schemeClr val="accent1"/>
+          </a:fillRef>
+          <a:effectRef idx="0">
+            <a:schemeClr val="accent1"/>
+          </a:effectRef>
+          <a:fontRef idx="minor">
+            <a:schemeClr val="lt1"/>
+          </a:fontRef>
+        </p:style>
+      </p:sp>
+      <p:sp>
+        <p:nvSpPr>
+          <p:cNvPr id="2" name="Title 1"/>
+          <p:cNvSpPr>
+            <a:spLocks noGrp="1"/>
+          </p:cNvSpPr>
+          <p:nvPr>
+            <p:ph type="title"/>
+          </p:nvPr>
+        </p:nvSpPr>
+        <p:spPr bwMode="blackWhite">
+          <a:xfrm>
+            <a:off x="804672" y="2243828"/>
+            <a:ext cx="4486656" cy="1141497"/>
+          </a:xfrm>
+          <a:solidFill>
+            <a:srgbClr val="FFFFFF"/>
+          </a:solidFill>
+          <a:ln>
+            <a:solidFill>
+              <a:srgbClr val="404040"/>
+            </a:solidFill>
+          </a:ln>
+        </p:spPr>
+        <p:txBody>
+          <a:bodyPr anchor="ctr" anchorCtr="1">
+            <a:normAutofit/>
+          </a:bodyPr>
+          <a:lstStyle>
+            <a:lvl1pPr>
+              <a:defRPr sz="2200">
+                <a:solidFill>
+                  <a:srgbClr val="262626"/>
+                </a:solidFill>
+              </a:defRPr>
+            </a:lvl1pPr>
+          </a:lstStyle>
+          <a:p>
+            <a:r>
+              <a:rPr lang="en-US" smtClean="0"/>
+              <a:t>Click to edit Master title style</a:t>
+            </a:r>
+            <a:endParaRPr lang="en-US" dirty="0"/>
+          </a:p>
+        </p:txBody>
+      </p:sp>
+      <p:sp>
+        <p:nvSpPr>
+          <p:cNvPr id="3" name="Content Placeholder 2"/>
+          <p:cNvSpPr>
+            <a:spLocks noGrp="1"/>
+          </p:cNvSpPr>
+          <p:nvPr>
+            <p:ph idx="1"/>
+          </p:nvPr>
+        </p:nvSpPr>
+        <p:spPr>
+          <a:xfrm>
+            <a:off x="6736080" y="804672"/>
+            <a:ext cx="4815840" cy="5248656"/>
           </a:xfrm>
         </p:spPr>
         <p:txBody>
-          <a:bodyPr anchor="b"/>
+          <a:bodyPr>
+            <a:normAutofit/>
+          </a:bodyPr>
           <a:lstStyle>
             <a:lvl1pPr>
-              <a:defRPr sz="3200"/>
+              <a:defRPr sz="1900">
+                <a:solidFill>
+                  <a:schemeClr val="tx1"/>
+                </a:solidFill>
+              </a:defRPr>
             </a:lvl1pPr>
+            <a:lvl2pPr>
+              <a:defRPr sz="1600">
+                <a:solidFill>
+                  <a:schemeClr val="tx1"/>
+                </a:solidFill>
+              </a:defRPr>
+            </a:lvl2pPr>
+            <a:lvl3pPr>
+              <a:defRPr sz="1600">
+                <a:solidFill>
+                  <a:schemeClr val="tx1"/>
+                </a:solidFill>
+              </a:defRPr>
+            </a:lvl3pPr>
+            <a:lvl4pPr>
+              <a:defRPr sz="1600">
+                <a:solidFill>
+                  <a:schemeClr val="tx1"/>
+                </a:solidFill>
+              </a:defRPr>
+            </a:lvl4pPr>
+            <a:lvl5pPr>
+              <a:defRPr sz="1600">
+                <a:solidFill>
+                  <a:schemeClr val="tx1"/>
+                </a:solidFill>
+              </a:defRPr>
+            </a:lvl5pPr>
+            <a:lvl6pPr>
+              <a:defRPr sz="1600"/>
+            </a:lvl6pPr>
+            <a:lvl7pPr>
+              <a:defRPr sz="1600"/>
+            </a:lvl7pPr>
+            <a:lvl8pPr>
+              <a:defRPr sz="1600"/>
+            </a:lvl8pPr>
+            <a:lvl9pPr>
+              <a:defRPr sz="1600"/>
+            </a:lvl9pPr>
           </a:lstStyle>
           <a:p>
-            <a:r>
-              <a:rPr lang="en-US"/>
-              <a:t>Click to edit Master title style</a:t>
-            </a:r>
-          </a:p>
-        </p:txBody>
-      </p:sp>
-      <p:sp>
-        <p:nvSpPr>
-          <p:cNvPr id="3" name="Content Placeholder 2">
-            <a:extLst>
-              <a:ext uri="{FF2B5EF4-FFF2-40B4-BE49-F238E27FC236}">
-                <a16:creationId xmlns:a16="http://schemas.microsoft.com/office/drawing/2014/main" id="{1354AABD-D666-4212-81B7-8E67BC0249FA}"/>
-              </a:ext>
-            </a:extLst>
-          </p:cNvPr>
-          <p:cNvSpPr>
-            <a:spLocks noGrp="1"/>
-          </p:cNvSpPr>
-          <p:nvPr>
-            <p:ph idx="1"/>
+            <a:pPr lvl="0"/>
+            <a:r>
+              <a:rPr lang="en-US" smtClean="0"/>
+              <a:t>Edit Master text styles</a:t>
+            </a:r>
+          </a:p>
+          <a:p>
+            <a:pPr lvl="1"/>
+            <a:r>
+              <a:rPr lang="en-US" smtClean="0"/>
+              <a:t>Second level</a:t>
+            </a:r>
+          </a:p>
+          <a:p>
+            <a:pPr lvl="2"/>
+            <a:r>
+              <a:rPr lang="en-US" smtClean="0"/>
+              <a:t>Third level</a:t>
+            </a:r>
+          </a:p>
+          <a:p>
+            <a:pPr lvl="3"/>
+            <a:r>
+              <a:rPr lang="en-US" smtClean="0"/>
+              <a:t>Fourth level</a:t>
+            </a:r>
+          </a:p>
+          <a:p>
+            <a:pPr lvl="4"/>
+            <a:r>
+              <a:rPr lang="en-US" smtClean="0"/>
+              <a:t>Fifth level</a:t>
+            </a:r>
+            <a:endParaRPr lang="en-US" dirty="0"/>
+          </a:p>
+        </p:txBody>
+      </p:sp>
+      <p:sp>
+        <p:nvSpPr>
+          <p:cNvPr id="4" name="Text Placeholder 3"/>
+          <p:cNvSpPr>
+            <a:spLocks noGrp="1"/>
+          </p:cNvSpPr>
+          <p:nvPr>
+            <p:ph type="body" sz="half" idx="2"/>
           </p:nvPr>
         </p:nvSpPr>
         <p:spPr>
           <a:xfrm>
-            <a:off x="5183188" y="987425"/>
-            <a:ext cx="6172200" cy="4873625"/>
+            <a:off x="1115568" y="3549918"/>
+            <a:ext cx="3794760" cy="2194036"/>
+          </a:xfrm>
+        </p:spPr>
+        <p:txBody>
+          <a:bodyPr anchor="t" anchorCtr="1">
+            <a:normAutofit/>
+          </a:bodyPr>
+          <a:lstStyle>
+            <a:lvl1pPr marL="0" indent="0" algn="ctr">
+              <a:buNone/>
+              <a:defRPr sz="1500">
+                <a:solidFill>
+                  <a:srgbClr val="FFFFFF"/>
+                </a:solidFill>
+              </a:defRPr>
+            </a:lvl1pPr>
+            <a:lvl2pPr marL="457200" indent="0">
+              <a:buNone/>
+              <a:defRPr sz="1400"/>
+            </a:lvl2pPr>
+            <a:lvl3pPr marL="914400" indent="0">
+              <a:buNone/>
+              <a:defRPr sz="1200"/>
+            </a:lvl3pPr>
+            <a:lvl4pPr marL="1371600" indent="0">
+              <a:buNone/>
+              <a:defRPr sz="1000"/>
+            </a:lvl4pPr>
+            <a:lvl5pPr marL="1828800" indent="0">
+              <a:buNone/>
+              <a:defRPr sz="1000"/>
+            </a:lvl5pPr>
+            <a:lvl6pPr marL="2286000" indent="0">
+              <a:buNone/>
+              <a:defRPr sz="1000"/>
+            </a:lvl6pPr>
+            <a:lvl7pPr marL="2743200" indent="0">
+              <a:buNone/>
+              <a:defRPr sz="1000"/>
+            </a:lvl7pPr>
+            <a:lvl8pPr marL="3200400" indent="0">
+              <a:buNone/>
+              <a:defRPr sz="1000"/>
+            </a:lvl8pPr>
+            <a:lvl9pPr marL="3657600" indent="0">
+              <a:buNone/>
+              <a:defRPr sz="1000"/>
+            </a:lvl9pPr>
+          </a:lstStyle>
+          <a:p>
+            <a:pPr lvl="0"/>
+            <a:r>
+              <a:rPr lang="en-US" smtClean="0"/>
+              <a:t>Edit Master text styles</a:t>
+            </a:r>
+          </a:p>
+        </p:txBody>
+      </p:sp>
+      <p:sp>
+        <p:nvSpPr>
+          <p:cNvPr id="9" name="Date Placeholder 8"/>
+          <p:cNvSpPr>
+            <a:spLocks noGrp="1"/>
+          </p:cNvSpPr>
+          <p:nvPr>
+            <p:ph type="dt" sz="half" idx="10"/>
+          </p:nvPr>
+        </p:nvSpPr>
+        <p:spPr/>
+        <p:txBody>
+          <a:bodyPr/>
+          <a:lstStyle/>
+          <a:p>
+            <a:fld id="{A71E6E4A-F1E9-49B1-A7E6-64E029784417}" type="datetimeFigureOut">
+              <a:rPr lang="en-US" smtClean="0"/>
+              <a:t>8/7/2019</a:t>
+            </a:fld>
+            <a:endParaRPr lang="en-US"/>
+          </a:p>
+        </p:txBody>
+      </p:sp>
+      <p:sp>
+        <p:nvSpPr>
+          <p:cNvPr id="10" name="Footer Placeholder 9"/>
+          <p:cNvSpPr>
+            <a:spLocks noGrp="1"/>
+          </p:cNvSpPr>
+          <p:nvPr>
+            <p:ph type="ftr" sz="quarter" idx="11"/>
+          </p:nvPr>
+        </p:nvSpPr>
+        <p:spPr>
+          <a:xfrm>
+            <a:off x="804672" y="6236208"/>
+            <a:ext cx="5124797" cy="320040"/>
           </a:xfrm>
         </p:spPr>
         <p:txBody>
           <a:bodyPr/>
           <a:lstStyle>
             <a:lvl1pPr>
-              <a:defRPr sz="3200"/>
+              <a:defRPr>
+                <a:solidFill>
+                  <a:srgbClr val="FFFFFF">
+                    <a:alpha val="70000"/>
+                  </a:srgbClr>
+                </a:solidFill>
+              </a:defRPr>
             </a:lvl1pPr>
-            <a:lvl2pPr>
-              <a:defRPr sz="2800"/>
-            </a:lvl2pPr>
-            <a:lvl3pPr>
-              <a:defRPr sz="2400"/>
-            </a:lvl3pPr>
-            <a:lvl4pPr>
-              <a:defRPr sz="2000"/>
-            </a:lvl4pPr>
-            <a:lvl5pPr>
-              <a:defRPr sz="2000"/>
-            </a:lvl5pPr>
-            <a:lvl6pPr>
-              <a:defRPr sz="2000"/>
-            </a:lvl6pPr>
-            <a:lvl7pPr>
-              <a:defRPr sz="2000"/>
-            </a:lvl7pPr>
-            <a:lvl8pPr>
-              <a:defRPr sz="2000"/>
-            </a:lvl8pPr>
-            <a:lvl9pPr>
-              <a:defRPr sz="2000"/>
-            </a:lvl9pPr>
           </a:lstStyle>
           <a:p>
-            <a:pPr lvl="0"/>
-            <a:r>
-              <a:rPr lang="en-US"/>
-              <a:t>Click to edit Master text styles</a:t>
-            </a:r>
-          </a:p>
-          <a:p>
-            <a:pPr lvl="1"/>
-            <a:r>
-              <a:rPr lang="en-US"/>
-              <a:t>Second level</a:t>
-            </a:r>
-          </a:p>
-          <a:p>
-            <a:pPr lvl="2"/>
-            <a:r>
-              <a:rPr lang="en-US"/>
-              <a:t>Third level</a:t>
-            </a:r>
-          </a:p>
-          <a:p>
-            <a:pPr lvl="3"/>
-            <a:r>
-              <a:rPr lang="en-US"/>
-              <a:t>Fourth level</a:t>
-            </a:r>
-          </a:p>
-          <a:p>
-            <a:pPr lvl="4"/>
-            <a:r>
-              <a:rPr lang="en-US"/>
-              <a:t>Fifth level</a:t>
-            </a:r>
-          </a:p>
-        </p:txBody>
-      </p:sp>
-      <p:sp>
-        <p:nvSpPr>
-          <p:cNvPr id="4" name="Text Placeholder 3">
-            <a:extLst>
-              <a:ext uri="{FF2B5EF4-FFF2-40B4-BE49-F238E27FC236}">
-                <a16:creationId xmlns:a16="http://schemas.microsoft.com/office/drawing/2014/main" id="{1CEAC984-AFEA-4F5E-851D-578FE4095B87}"/>
-              </a:ext>
-            </a:extLst>
-          </p:cNvPr>
-          <p:cNvSpPr>
-            <a:spLocks noGrp="1"/>
-          </p:cNvSpPr>
-          <p:nvPr>
-            <p:ph type="body" sz="half" idx="2"/>
-          </p:nvPr>
-        </p:nvSpPr>
-        <p:spPr>
-          <a:xfrm>
-            <a:off x="839788" y="2057400"/>
-            <a:ext cx="3932237" cy="3811588"/>
-          </a:xfrm>
-        </p:spPr>
-        <p:txBody>
-          <a:bodyPr/>
-          <a:lstStyle>
-            <a:lvl1pPr marL="0" indent="0">
-              <a:buNone/>
-              <a:defRPr sz="1600"/>
-            </a:lvl1pPr>
-            <a:lvl2pPr marL="457200" indent="0">
-              <a:buNone/>
-              <a:defRPr sz="1400"/>
-            </a:lvl2pPr>
-            <a:lvl3pPr marL="914400" indent="0">
-              <a:buNone/>
-              <a:defRPr sz="1200"/>
-            </a:lvl3pPr>
-            <a:lvl4pPr marL="1371600" indent="0">
-              <a:buNone/>
-              <a:defRPr sz="1000"/>
-            </a:lvl4pPr>
-            <a:lvl5pPr marL="1828800" indent="0">
-              <a:buNone/>
-              <a:defRPr sz="1000"/>
-            </a:lvl5pPr>
-            <a:lvl6pPr marL="2286000" indent="0">
-              <a:buNone/>
-              <a:defRPr sz="1000"/>
-            </a:lvl6pPr>
-            <a:lvl7pPr marL="2743200" indent="0">
-              <a:buNone/>
-              <a:defRPr sz="1000"/>
-            </a:lvl7pPr>
-            <a:lvl8pPr marL="3200400" indent="0">
-              <a:buNone/>
-              <a:defRPr sz="1000"/>
-            </a:lvl8pPr>
-            <a:lvl9pPr marL="3657600" indent="0">
-              <a:buNone/>
-              <a:defRPr sz="1000"/>
-            </a:lvl9pPr>
-          </a:lstStyle>
-          <a:p>
-            <a:pPr lvl="0"/>
-            <a:r>
-              <a:rPr lang="en-US"/>
-              <a:t>Click to edit Master text styles</a:t>
-            </a:r>
-          </a:p>
-        </p:txBody>
-      </p:sp>
-      <p:sp>
-        <p:nvSpPr>
-          <p:cNvPr id="5" name="Date Placeholder 4">
-            <a:extLst>
-              <a:ext uri="{FF2B5EF4-FFF2-40B4-BE49-F238E27FC236}">
-                <a16:creationId xmlns:a16="http://schemas.microsoft.com/office/drawing/2014/main" id="{D601B398-044C-419F-AD70-562D81E97BDD}"/>
-              </a:ext>
-            </a:extLst>
-          </p:cNvPr>
-          <p:cNvSpPr>
-            <a:spLocks noGrp="1"/>
-          </p:cNvSpPr>
-          <p:nvPr>
-            <p:ph type="dt" sz="half" idx="10"/>
-          </p:nvPr>
-        </p:nvSpPr>
-        <p:spPr/>
-        <p:txBody>
-          <a:bodyPr/>
-          <a:lstStyle/>
-          <a:p>
-            <a:fld id="{A71E6E4A-F1E9-49B1-A7E6-64E029784417}" type="datetimeFigureOut">
-              <a:rPr lang="en-US" smtClean="0"/>
-              <a:t>8/6/2019</a:t>
-            </a:fld>
             <a:endParaRPr lang="en-US"/>
           </a:p>
         </p:txBody>
       </p:sp>
       <p:sp>
         <p:nvSpPr>
-          <p:cNvPr id="6" name="Footer Placeholder 5">
-            <a:extLst>
-              <a:ext uri="{FF2B5EF4-FFF2-40B4-BE49-F238E27FC236}">
-                <a16:creationId xmlns:a16="http://schemas.microsoft.com/office/drawing/2014/main" id="{22BE86E0-1FE2-4A94-8011-2852AFABC8F3}"/>
-              </a:ext>
-            </a:extLst>
-          </p:cNvPr>
-          <p:cNvSpPr>
-            <a:spLocks noGrp="1"/>
-          </p:cNvSpPr>
-          <p:nvPr>
-            <p:ph type="ftr" sz="quarter" idx="11"/>
-          </p:nvPr>
-        </p:nvSpPr>
-        <p:spPr/>
-        <p:txBody>
-          <a:bodyPr/>
-          <a:lstStyle/>
-          <a:p>
-            <a:endParaRPr lang="en-US"/>
-          </a:p>
-        </p:txBody>
-      </p:sp>
-      <p:sp>
-        <p:nvSpPr>
-          <p:cNvPr id="7" name="Slide Number Placeholder 6">
-            <a:extLst>
-              <a:ext uri="{FF2B5EF4-FFF2-40B4-BE49-F238E27FC236}">
-                <a16:creationId xmlns:a16="http://schemas.microsoft.com/office/drawing/2014/main" id="{E3B3F351-9002-446A-B9F2-949DA106F491}"/>
-              </a:ext>
-            </a:extLst>
-          </p:cNvPr>
+          <p:cNvPr id="11" name="Slide Number Placeholder 10"/>
           <p:cNvSpPr>
             <a:spLocks noGrp="1"/>
           </p:cNvSpPr>
@@ -2438,7 +3172,7 @@
     </p:spTree>
     <p:extLst>
       <p:ext uri="{BB962C8B-B14F-4D97-AF65-F5344CB8AC3E}">
-        <p14:creationId xmlns:p14="http://schemas.microsoft.com/office/powerpoint/2010/main" val="2595856976"/>
+        <p14:creationId xmlns:p14="http://schemas.microsoft.com/office/powerpoint/2010/main" val="1294343517"/>
       </p:ext>
     </p:extLst>
   </p:cSld>
@@ -2467,52 +3201,93 @@
       </p:grpSpPr>
       <p:sp>
         <p:nvSpPr>
-          <p:cNvPr id="2" name="Title 1">
-            <a:extLst>
-              <a:ext uri="{FF2B5EF4-FFF2-40B4-BE49-F238E27FC236}">
-                <a16:creationId xmlns:a16="http://schemas.microsoft.com/office/drawing/2014/main" id="{89830F8D-B675-4747-B808-29FCB9B90D7F}"/>
-              </a:ext>
-            </a:extLst>
-          </p:cNvPr>
-          <p:cNvSpPr>
-            <a:spLocks noGrp="1"/>
-          </p:cNvSpPr>
-          <p:nvPr>
-            <p:ph type="title"/>
-          </p:nvPr>
+          <p:cNvPr id="18" name="Rectangle 17"/>
+          <p:cNvSpPr/>
+          <p:nvPr/>
         </p:nvSpPr>
         <p:spPr>
           <a:xfrm>
-            <a:off x="839788" y="457200"/>
-            <a:ext cx="3932237" cy="1600200"/>
+            <a:off x="0" y="0"/>
+            <a:ext cx="6095999" cy="6858000"/>
           </a:xfrm>
+          <a:prstGeom prst="rect">
+            <a:avLst/>
+          </a:prstGeom>
+          <a:solidFill>
+            <a:schemeClr val="accent2"/>
+          </a:solidFill>
+          <a:ln>
+            <a:noFill/>
+          </a:ln>
         </p:spPr>
-        <p:txBody>
-          <a:bodyPr anchor="b"/>
+        <p:style>
+          <a:lnRef idx="2">
+            <a:schemeClr val="accent1">
+              <a:shade val="50000"/>
+            </a:schemeClr>
+          </a:lnRef>
+          <a:fillRef idx="1">
+            <a:schemeClr val="accent1"/>
+          </a:fillRef>
+          <a:effectRef idx="0">
+            <a:schemeClr val="accent1"/>
+          </a:effectRef>
+          <a:fontRef idx="minor">
+            <a:schemeClr val="lt1"/>
+          </a:fontRef>
+        </p:style>
+      </p:sp>
+      <p:sp>
+        <p:nvSpPr>
+          <p:cNvPr id="2" name="Title 1"/>
+          <p:cNvSpPr>
+            <a:spLocks noGrp="1"/>
+          </p:cNvSpPr>
+          <p:nvPr>
+            <p:ph type="title"/>
+          </p:nvPr>
+        </p:nvSpPr>
+        <p:spPr bwMode="blackWhite">
+          <a:xfrm>
+            <a:off x="808523" y="2243828"/>
+            <a:ext cx="4494998" cy="1134640"/>
+          </a:xfrm>
+          <a:solidFill>
+            <a:srgbClr val="FFFFFF"/>
+          </a:solidFill>
+          <a:ln>
+            <a:solidFill>
+              <a:srgbClr val="404040"/>
+            </a:solidFill>
+          </a:ln>
+        </p:spPr>
+        <p:txBody>
+          <a:bodyPr anchor="ctr" anchorCtr="1">
+            <a:noAutofit/>
+          </a:bodyPr>
           <a:lstStyle>
             <a:lvl1pPr>
-              <a:defRPr sz="3200"/>
+              <a:defRPr sz="2200">
+                <a:solidFill>
+                  <a:srgbClr val="262626"/>
+                </a:solidFill>
+              </a:defRPr>
             </a:lvl1pPr>
           </a:lstStyle>
           <a:p>
             <a:r>
-              <a:rPr lang="en-US"/>
+              <a:rPr lang="en-US" smtClean="0"/>
               <a:t>Click to edit Master title style</a:t>
             </a:r>
-          </a:p>
-        </p:txBody>
-      </p:sp>
-      <p:sp>
-        <p:nvSpPr>
-          <p:cNvPr id="3" name="Picture Placeholder 2">
-            <a:extLst>
-              <a:ext uri="{FF2B5EF4-FFF2-40B4-BE49-F238E27FC236}">
-                <a16:creationId xmlns:a16="http://schemas.microsoft.com/office/drawing/2014/main" id="{29BC8676-88FD-4036-BBAE-C9825B7788BF}"/>
-              </a:ext>
-            </a:extLst>
-          </p:cNvPr>
-          <p:cNvSpPr>
-            <a:spLocks noGrp="1"/>
+            <a:endParaRPr lang="en-US" dirty="0"/>
+          </a:p>
+        </p:txBody>
+      </p:sp>
+      <p:sp>
+        <p:nvSpPr>
+          <p:cNvPr id="3" name="Picture Placeholder 2"/>
+          <p:cNvSpPr>
+            <a:spLocks noGrp="1" noChangeAspect="1"/>
           </p:cNvSpPr>
           <p:nvPr>
             <p:ph type="pic" idx="1"/>
@@ -2520,16 +3295,28 @@
         </p:nvSpPr>
         <p:spPr>
           <a:xfrm>
-            <a:off x="5183188" y="987425"/>
-            <a:ext cx="6172200" cy="4873625"/>
+            <a:off x="6095999" y="0"/>
+            <a:ext cx="6102097" cy="6858000"/>
           </a:xfrm>
+          <a:solidFill>
+            <a:schemeClr val="bg1">
+              <a:lumMod val="75000"/>
+            </a:schemeClr>
+          </a:solidFill>
         </p:spPr>
         <p:txBody>
-          <a:bodyPr/>
+          <a:bodyPr anchor="t"/>
           <a:lstStyle>
             <a:lvl1pPr marL="0" indent="0">
               <a:buNone/>
-              <a:defRPr sz="3200"/>
+              <a:defRPr sz="3200">
+                <a:solidFill>
+                  <a:schemeClr val="bg1">
+                    <a:lumMod val="85000"/>
+                    <a:lumOff val="15000"/>
+                  </a:schemeClr>
+                </a:solidFill>
+              </a:defRPr>
             </a:lvl1pPr>
             <a:lvl2pPr marL="457200" indent="0">
               <a:buNone/>
@@ -2565,19 +3352,17 @@
             </a:lvl9pPr>
           </a:lstStyle>
           <a:p>
-            <a:endParaRPr lang="en-US"/>
-          </a:p>
-        </p:txBody>
-      </p:sp>
-      <p:sp>
-        <p:nvSpPr>
-          <p:cNvPr id="4" name="Text Placeholder 3">
-            <a:extLst>
-              <a:ext uri="{FF2B5EF4-FFF2-40B4-BE49-F238E27FC236}">
-                <a16:creationId xmlns:a16="http://schemas.microsoft.com/office/drawing/2014/main" id="{6145CB5B-EEEB-4B9F-B9EF-A8DD1D21E7A9}"/>
-              </a:ext>
-            </a:extLst>
-          </p:cNvPr>
+            <a:r>
+              <a:rPr lang="en-US" smtClean="0"/>
+              <a:t>Click icon to add picture</a:t>
+            </a:r>
+            <a:endParaRPr lang="en-US" dirty="0"/>
+          </a:p>
+        </p:txBody>
+      </p:sp>
+      <p:sp>
+        <p:nvSpPr>
+          <p:cNvPr id="4" name="Text Placeholder 3"/>
           <p:cNvSpPr>
             <a:spLocks noGrp="1"/>
           </p:cNvSpPr>
@@ -2587,16 +3372,22 @@
         </p:nvSpPr>
         <p:spPr>
           <a:xfrm>
-            <a:off x="839788" y="2057400"/>
-            <a:ext cx="3932237" cy="3811588"/>
+            <a:off x="1115568" y="3549918"/>
+            <a:ext cx="3794760" cy="2194037"/>
           </a:xfrm>
         </p:spPr>
         <p:txBody>
-          <a:bodyPr/>
+          <a:bodyPr anchor="t" anchorCtr="1">
+            <a:normAutofit/>
+          </a:bodyPr>
           <a:lstStyle>
-            <a:lvl1pPr marL="0" indent="0">
-              <a:buNone/>
-              <a:defRPr sz="1600"/>
+            <a:lvl1pPr marL="0" indent="0" algn="ctr">
+              <a:buNone/>
+              <a:defRPr sz="1500">
+                <a:solidFill>
+                  <a:srgbClr val="FFFFFF"/>
+                </a:solidFill>
+              </a:defRPr>
             </a:lvl1pPr>
             <a:lvl2pPr marL="457200" indent="0">
               <a:buNone/>
@@ -2634,21 +3425,15 @@
           <a:p>
             <a:pPr lvl="0"/>
             <a:r>
-              <a:rPr lang="en-US"/>
-              <a:t>Click to edit Master text styles</a:t>
-            </a:r>
-          </a:p>
-        </p:txBody>
-      </p:sp>
-      <p:sp>
-        <p:nvSpPr>
-          <p:cNvPr id="5" name="Date Placeholder 4">
-            <a:extLst>
-              <a:ext uri="{FF2B5EF4-FFF2-40B4-BE49-F238E27FC236}">
-                <a16:creationId xmlns:a16="http://schemas.microsoft.com/office/drawing/2014/main" id="{F3224FFC-FAFC-4827-B4DE-752D6E0688F2}"/>
-              </a:ext>
-            </a:extLst>
-          </p:cNvPr>
+              <a:rPr lang="en-US" smtClean="0"/>
+              <a:t>Edit Master text styles</a:t>
+            </a:r>
+          </a:p>
+        </p:txBody>
+      </p:sp>
+      <p:sp>
+        <p:nvSpPr>
+          <p:cNvPr id="8" name="Date Placeholder 7"/>
           <p:cNvSpPr>
             <a:spLocks noGrp="1"/>
           </p:cNvSpPr>
@@ -2659,11 +3444,26 @@
         <p:spPr/>
         <p:txBody>
           <a:bodyPr/>
-          <a:lstStyle/>
+          <a:lstStyle>
+            <a:lvl1pPr>
+              <a:defRPr>
+                <a:solidFill>
+                  <a:srgbClr val="FFFFFF"/>
+                </a:solidFill>
+                <a:effectLst>
+                  <a:outerShdw blurRad="50800" dist="38100" dir="2700000" algn="tl" rotWithShape="0">
+                    <a:prstClr val="black">
+                      <a:alpha val="43000"/>
+                    </a:prstClr>
+                  </a:outerShdw>
+                </a:effectLst>
+              </a:defRPr>
+            </a:lvl1pPr>
+          </a:lstStyle>
           <a:p>
             <a:fld id="{A71E6E4A-F1E9-49B1-A7E6-64E029784417}" type="datetimeFigureOut">
               <a:rPr lang="en-US" smtClean="0"/>
-              <a:t>8/6/2019</a:t>
+              <a:t>8/7/2019</a:t>
             </a:fld>
             <a:endParaRPr lang="en-US"/>
           </a:p>
@@ -2671,13 +3471,7 @@
       </p:sp>
       <p:sp>
         <p:nvSpPr>
-          <p:cNvPr id="6" name="Footer Placeholder 5">
-            <a:extLst>
-              <a:ext uri="{FF2B5EF4-FFF2-40B4-BE49-F238E27FC236}">
-                <a16:creationId xmlns:a16="http://schemas.microsoft.com/office/drawing/2014/main" id="{8BE5F3EC-171B-4BB3-B294-118CE7DBB537}"/>
-              </a:ext>
-            </a:extLst>
-          </p:cNvPr>
+          <p:cNvPr id="9" name="Footer Placeholder 8"/>
           <p:cNvSpPr>
             <a:spLocks noGrp="1"/>
           </p:cNvSpPr>
@@ -2685,10 +3479,25 @@
             <p:ph type="ftr" sz="quarter" idx="11"/>
           </p:nvPr>
         </p:nvSpPr>
-        <p:spPr/>
+        <p:spPr>
+          <a:xfrm>
+            <a:off x="804672" y="6236208"/>
+            <a:ext cx="5124797" cy="320040"/>
+          </a:xfrm>
+        </p:spPr>
         <p:txBody>
           <a:bodyPr/>
-          <a:lstStyle/>
+          <a:lstStyle>
+            <a:lvl1pPr>
+              <a:defRPr>
+                <a:solidFill>
+                  <a:srgbClr val="FFFFFF">
+                    <a:alpha val="70000"/>
+                  </a:srgbClr>
+                </a:solidFill>
+              </a:defRPr>
+            </a:lvl1pPr>
+          </a:lstStyle>
           <a:p>
             <a:endParaRPr lang="en-US"/>
           </a:p>
@@ -2696,13 +3505,7 @@
       </p:sp>
       <p:sp>
         <p:nvSpPr>
-          <p:cNvPr id="7" name="Slide Number Placeholder 6">
-            <a:extLst>
-              <a:ext uri="{FF2B5EF4-FFF2-40B4-BE49-F238E27FC236}">
-                <a16:creationId xmlns:a16="http://schemas.microsoft.com/office/drawing/2014/main" id="{6B30D182-8459-4BD2-A018-5953467419BB}"/>
-              </a:ext>
-            </a:extLst>
-          </p:cNvPr>
+          <p:cNvPr id="10" name="Slide Number Placeholder 9"/>
           <p:cNvSpPr>
             <a:spLocks noGrp="1"/>
           </p:cNvSpPr>
@@ -2726,7 +3529,7 @@
     </p:spTree>
     <p:extLst>
       <p:ext uri="{BB962C8B-B14F-4D97-AF65-F5344CB8AC3E}">
-        <p14:creationId xmlns:p14="http://schemas.microsoft.com/office/powerpoint/2010/main" val="102584539"/>
+        <p14:creationId xmlns:p14="http://schemas.microsoft.com/office/powerpoint/2010/main" val="1628027672"/>
       </p:ext>
     </p:extLst>
   </p:cSld>
@@ -2740,9 +3543,14 @@
 <p:sldMaster xmlns:a="http://schemas.openxmlformats.org/drawingml/2006/main" xmlns:r="http://schemas.openxmlformats.org/officeDocument/2006/relationships" xmlns:p="http://schemas.openxmlformats.org/presentationml/2006/main">
   <p:cSld>
     <p:bg>
-      <p:bgRef idx="1001">
-        <a:schemeClr val="bg1"/>
-      </p:bgRef>
+      <p:bgPr>
+        <a:solidFill>
+          <a:schemeClr val="bg1">
+            <a:lumMod val="95000"/>
+          </a:schemeClr>
+        </a:solidFill>
+        <a:effectLst/>
+      </p:bgPr>
     </p:bg>
     <p:spTree>
       <p:nvGrpSpPr>
@@ -2760,129 +3568,162 @@
       </p:grpSpPr>
       <p:sp>
         <p:nvSpPr>
-          <p:cNvPr id="2" name="Title Placeholder 1">
-            <a:extLst>
-              <a:ext uri="{FF2B5EF4-FFF2-40B4-BE49-F238E27FC236}">
-                <a16:creationId xmlns:a16="http://schemas.microsoft.com/office/drawing/2014/main" id="{28DDE37F-84DF-40DF-A110-55D9E0E54C90}"/>
-              </a:ext>
-            </a:extLst>
-          </p:cNvPr>
+          <p:cNvPr id="2" name="Title Placeholder 1"/>
           <p:cNvSpPr>
             <a:spLocks noGrp="1"/>
           </p:cNvSpPr>
           <p:nvPr>
             <p:ph type="title"/>
+          </p:nvPr>
+        </p:nvSpPr>
+        <p:spPr bwMode="black">
+          <a:xfrm>
+            <a:off x="2231136" y="964692"/>
+            <a:ext cx="7729728" cy="1188720"/>
+          </a:xfrm>
+          <a:prstGeom prst="rect">
+            <a:avLst/>
+          </a:prstGeom>
+          <a:solidFill>
+            <a:srgbClr val="FFFFFF"/>
+          </a:solidFill>
+          <a:ln w="31750" cap="sq">
+            <a:solidFill>
+              <a:srgbClr val="404040"/>
+            </a:solidFill>
+            <a:miter lim="800000"/>
+          </a:ln>
+        </p:spPr>
+        <p:txBody>
+          <a:bodyPr vert="horz" lIns="182880" tIns="182880" rIns="182880" bIns="182880" rtlCol="0" anchor="ctr">
+            <a:normAutofit/>
+          </a:bodyPr>
+          <a:lstStyle/>
+          <a:p>
+            <a:r>
+              <a:rPr lang="en-US" smtClean="0"/>
+              <a:t>Click to edit Master title style</a:t>
+            </a:r>
+            <a:endParaRPr lang="en-US" dirty="0"/>
+          </a:p>
+        </p:txBody>
+      </p:sp>
+      <p:sp>
+        <p:nvSpPr>
+          <p:cNvPr id="3" name="Text Placeholder 2"/>
+          <p:cNvSpPr>
+            <a:spLocks noGrp="1"/>
+          </p:cNvSpPr>
+          <p:nvPr>
+            <p:ph type="body" idx="1"/>
           </p:nvPr>
         </p:nvSpPr>
         <p:spPr>
           <a:xfrm>
-            <a:off x="838200" y="365125"/>
-            <a:ext cx="10515600" cy="1325563"/>
+            <a:off x="2231136" y="2638044"/>
+            <a:ext cx="7729728" cy="3101983"/>
           </a:xfrm>
           <a:prstGeom prst="rect">
             <a:avLst/>
           </a:prstGeom>
         </p:spPr>
         <p:txBody>
-          <a:bodyPr vert="horz" lIns="91440" tIns="45720" rIns="91440" bIns="45720" rtlCol="0" anchor="ctr">
+          <a:bodyPr vert="horz" lIns="91440" tIns="45720" rIns="91440" bIns="45720" rtlCol="0">
             <a:normAutofit/>
           </a:bodyPr>
           <a:lstStyle/>
           <a:p>
-            <a:r>
-              <a:rPr lang="en-US"/>
-              <a:t>Click to edit Master title style</a:t>
-            </a:r>
-          </a:p>
-        </p:txBody>
-      </p:sp>
-      <p:sp>
-        <p:nvSpPr>
-          <p:cNvPr id="3" name="Text Placeholder 2">
-            <a:extLst>
-              <a:ext uri="{FF2B5EF4-FFF2-40B4-BE49-F238E27FC236}">
-                <a16:creationId xmlns:a16="http://schemas.microsoft.com/office/drawing/2014/main" id="{47F682B2-7603-4354-B583-67F48F9D36A8}"/>
-              </a:ext>
-            </a:extLst>
-          </p:cNvPr>
-          <p:cNvSpPr>
-            <a:spLocks noGrp="1"/>
-          </p:cNvSpPr>
-          <p:nvPr>
-            <p:ph type="body" idx="1"/>
+            <a:pPr lvl="0"/>
+            <a:r>
+              <a:rPr lang="en-US" dirty="0"/>
+              <a:t>Edit Master text styles</a:t>
+            </a:r>
+          </a:p>
+          <a:p>
+            <a:pPr lvl="1"/>
+            <a:r>
+              <a:rPr lang="en-US" dirty="0"/>
+              <a:t>Second level</a:t>
+            </a:r>
+          </a:p>
+          <a:p>
+            <a:pPr lvl="2"/>
+            <a:r>
+              <a:rPr lang="en-US" dirty="0"/>
+              <a:t>Third level</a:t>
+            </a:r>
+          </a:p>
+          <a:p>
+            <a:pPr lvl="3"/>
+            <a:r>
+              <a:rPr lang="en-US" dirty="0"/>
+              <a:t>Fourth level</a:t>
+            </a:r>
+          </a:p>
+          <a:p>
+            <a:pPr lvl="4"/>
+            <a:r>
+              <a:rPr lang="en-US" dirty="0"/>
+              <a:t>Fifth level</a:t>
+            </a:r>
+          </a:p>
+        </p:txBody>
+      </p:sp>
+      <p:sp>
+        <p:nvSpPr>
+          <p:cNvPr id="4" name="Date Placeholder 3"/>
+          <p:cNvSpPr>
+            <a:spLocks noGrp="1"/>
+          </p:cNvSpPr>
+          <p:nvPr>
+            <p:ph type="dt" sz="half" idx="2"/>
           </p:nvPr>
         </p:nvSpPr>
         <p:spPr>
           <a:xfrm>
-            <a:off x="838200" y="1825625"/>
-            <a:ext cx="10515600" cy="4351338"/>
+            <a:off x="7821429" y="6238816"/>
+            <a:ext cx="2753746" cy="323968"/>
           </a:xfrm>
           <a:prstGeom prst="rect">
             <a:avLst/>
           </a:prstGeom>
         </p:spPr>
         <p:txBody>
-          <a:bodyPr vert="horz" lIns="91440" tIns="45720" rIns="91440" bIns="45720" rtlCol="0">
-            <a:normAutofit/>
-          </a:bodyPr>
-          <a:lstStyle/>
-          <a:p>
-            <a:pPr lvl="0"/>
-            <a:r>
-              <a:rPr lang="en-US"/>
-              <a:t>Click to edit Master text styles</a:t>
-            </a:r>
-          </a:p>
-          <a:p>
-            <a:pPr lvl="1"/>
-            <a:r>
-              <a:rPr lang="en-US"/>
-              <a:t>Second level</a:t>
-            </a:r>
-          </a:p>
-          <a:p>
-            <a:pPr lvl="2"/>
-            <a:r>
-              <a:rPr lang="en-US"/>
-              <a:t>Third level</a:t>
-            </a:r>
-          </a:p>
-          <a:p>
-            <a:pPr lvl="3"/>
-            <a:r>
-              <a:rPr lang="en-US"/>
-              <a:t>Fourth level</a:t>
-            </a:r>
-          </a:p>
-          <a:p>
-            <a:pPr lvl="4"/>
-            <a:r>
-              <a:rPr lang="en-US"/>
-              <a:t>Fifth level</a:t>
-            </a:r>
-          </a:p>
-        </p:txBody>
-      </p:sp>
-      <p:sp>
-        <p:nvSpPr>
-          <p:cNvPr id="4" name="Date Placeholder 3">
-            <a:extLst>
-              <a:ext uri="{FF2B5EF4-FFF2-40B4-BE49-F238E27FC236}">
-                <a16:creationId xmlns:a16="http://schemas.microsoft.com/office/drawing/2014/main" id="{FDD299EA-CDA4-492A-B9FE-07860D40FA9B}"/>
-              </a:ext>
-            </a:extLst>
-          </p:cNvPr>
-          <p:cNvSpPr>
-            <a:spLocks noGrp="1"/>
-          </p:cNvSpPr>
-          <p:nvPr>
-            <p:ph type="dt" sz="half" idx="2"/>
+          <a:bodyPr vert="horz" lIns="91440" tIns="45720" rIns="91440" bIns="45720" rtlCol="0" anchor="ctr"/>
+          <a:lstStyle>
+            <a:lvl1pPr algn="r">
+              <a:defRPr sz="1050">
+                <a:solidFill>
+                  <a:schemeClr val="tx1">
+                    <a:alpha val="70000"/>
+                  </a:schemeClr>
+                </a:solidFill>
+              </a:defRPr>
+            </a:lvl1pPr>
+          </a:lstStyle>
+          <a:p>
+            <a:fld id="{A71E6E4A-F1E9-49B1-A7E6-64E029784417}" type="datetimeFigureOut">
+              <a:rPr lang="en-US" smtClean="0"/>
+              <a:t>8/7/2019</a:t>
+            </a:fld>
+            <a:endParaRPr lang="en-US"/>
+          </a:p>
+        </p:txBody>
+      </p:sp>
+      <p:sp>
+        <p:nvSpPr>
+          <p:cNvPr id="5" name="Footer Placeholder 4"/>
+          <p:cNvSpPr>
+            <a:spLocks noGrp="1"/>
+          </p:cNvSpPr>
+          <p:nvPr>
+            <p:ph type="ftr" sz="quarter" idx="3"/>
           </p:nvPr>
         </p:nvSpPr>
         <p:spPr>
           <a:xfrm>
-            <a:off x="838200" y="6356350"/>
-            <a:ext cx="2743200" cy="365125"/>
+            <a:off x="1600200" y="6236208"/>
+            <a:ext cx="5901189" cy="320040"/>
           </a:xfrm>
           <a:prstGeom prst="rect">
             <a:avLst/>
@@ -2892,106 +3733,58 @@
           <a:bodyPr vert="horz" lIns="91440" tIns="45720" rIns="91440" bIns="45720" rtlCol="0" anchor="ctr"/>
           <a:lstStyle>
             <a:lvl1pPr algn="l">
-              <a:defRPr sz="1200">
+              <a:defRPr sz="1050">
                 <a:solidFill>
                   <a:schemeClr val="tx1">
-                    <a:tint val="75000"/>
+                    <a:alpha val="70000"/>
                   </a:schemeClr>
                 </a:solidFill>
               </a:defRPr>
             </a:lvl1pPr>
           </a:lstStyle>
           <a:p>
-            <a:fld id="{A71E6E4A-F1E9-49B1-A7E6-64E029784417}" type="datetimeFigureOut">
-              <a:rPr lang="en-US" smtClean="0"/>
-              <a:t>8/6/2019</a:t>
-            </a:fld>
             <a:endParaRPr lang="en-US"/>
           </a:p>
         </p:txBody>
       </p:sp>
       <p:sp>
         <p:nvSpPr>
-          <p:cNvPr id="5" name="Footer Placeholder 4">
-            <a:extLst>
-              <a:ext uri="{FF2B5EF4-FFF2-40B4-BE49-F238E27FC236}">
-                <a16:creationId xmlns:a16="http://schemas.microsoft.com/office/drawing/2014/main" id="{EFA09A98-9440-4981-B236-341466AA1062}"/>
-              </a:ext>
-            </a:extLst>
-          </p:cNvPr>
-          <p:cNvSpPr>
-            <a:spLocks noGrp="1"/>
-          </p:cNvSpPr>
-          <p:nvPr>
-            <p:ph type="ftr" sz="quarter" idx="3"/>
+          <p:cNvPr id="6" name="Slide Number Placeholder 5"/>
+          <p:cNvSpPr>
+            <a:spLocks noGrp="1"/>
+          </p:cNvSpPr>
+          <p:nvPr>
+            <p:ph type="sldNum" sz="quarter" idx="4"/>
           </p:nvPr>
         </p:nvSpPr>
         <p:spPr>
           <a:xfrm>
-            <a:off x="4038600" y="6356350"/>
-            <a:ext cx="4114800" cy="365125"/>
+            <a:off x="10758922" y="6217920"/>
+            <a:ext cx="365760" cy="365760"/>
           </a:xfrm>
-          <a:prstGeom prst="rect">
+          <a:prstGeom prst="ellipse">
             <a:avLst/>
           </a:prstGeom>
+          <a:solidFill>
+            <a:srgbClr val="1D1D1D">
+              <a:alpha val="70000"/>
+            </a:srgbClr>
+          </a:solidFill>
         </p:spPr>
         <p:txBody>
-          <a:bodyPr vert="horz" lIns="91440" tIns="45720" rIns="91440" bIns="45720" rtlCol="0" anchor="ctr"/>
+          <a:bodyPr vert="horz" lIns="18288" tIns="45720" rIns="18288" bIns="45720" rtlCol="0" anchor="ctr">
+            <a:noAutofit/>
+          </a:bodyPr>
           <a:lstStyle>
             <a:lvl1pPr algn="ctr">
-              <a:defRPr sz="1200">
+              <a:defRPr sz="1100" spc="0" baseline="0">
                 <a:solidFill>
-                  <a:schemeClr val="tx1">
-                    <a:tint val="75000"/>
-                  </a:schemeClr>
+                  <a:srgbClr val="FFFFFF"/>
                 </a:solidFill>
               </a:defRPr>
             </a:lvl1pPr>
           </a:lstStyle>
           <a:p>
-            <a:endParaRPr lang="en-US"/>
-          </a:p>
-        </p:txBody>
-      </p:sp>
-      <p:sp>
-        <p:nvSpPr>
-          <p:cNvPr id="6" name="Slide Number Placeholder 5">
-            <a:extLst>
-              <a:ext uri="{FF2B5EF4-FFF2-40B4-BE49-F238E27FC236}">
-                <a16:creationId xmlns:a16="http://schemas.microsoft.com/office/drawing/2014/main" id="{E9E450C1-77EF-42F4-B14F-BB76CFDC2071}"/>
-              </a:ext>
-            </a:extLst>
-          </p:cNvPr>
-          <p:cNvSpPr>
-            <a:spLocks noGrp="1"/>
-          </p:cNvSpPr>
-          <p:nvPr>
-            <p:ph type="sldNum" sz="quarter" idx="4"/>
-          </p:nvPr>
-        </p:nvSpPr>
-        <p:spPr>
-          <a:xfrm>
-            <a:off x="8610600" y="6356350"/>
-            <a:ext cx="2743200" cy="365125"/>
-          </a:xfrm>
-          <a:prstGeom prst="rect">
-            <a:avLst/>
-          </a:prstGeom>
-        </p:spPr>
-        <p:txBody>
-          <a:bodyPr vert="horz" lIns="91440" tIns="45720" rIns="91440" bIns="45720" rtlCol="0" anchor="ctr"/>
-          <a:lstStyle>
-            <a:lvl1pPr algn="r">
-              <a:defRPr sz="1200">
-                <a:solidFill>
-                  <a:schemeClr val="tx1">
-                    <a:tint val="75000"/>
-                  </a:schemeClr>
-                </a:solidFill>
-              </a:defRPr>
-            </a:lvl1pPr>
-          </a:lstStyle>
-          <a:p>
             <a:fld id="{AEAEF7F8-C9E9-43F4-AB41-B24E5AA34872}" type="slidenum">
               <a:rPr lang="en-US" smtClean="0"/>
               <a:t>‹#›</a:t>
@@ -3003,27 +3796,27 @@
     </p:spTree>
     <p:extLst>
       <p:ext uri="{BB962C8B-B14F-4D97-AF65-F5344CB8AC3E}">
-        <p14:creationId xmlns:p14="http://schemas.microsoft.com/office/powerpoint/2010/main" val="2888819956"/>
+        <p14:creationId xmlns:p14="http://schemas.microsoft.com/office/powerpoint/2010/main" val="2312184397"/>
       </p:ext>
     </p:extLst>
   </p:cSld>
   <p:clrMap bg1="lt1" tx1="dk1" bg2="lt2" tx2="dk2" accent1="accent1" accent2="accent2" accent3="accent3" accent4="accent4" accent5="accent5" accent6="accent6" hlink="hlink" folHlink="folHlink"/>
   <p:sldLayoutIdLst>
-    <p:sldLayoutId id="2147483649" r:id="rId1"/>
-    <p:sldLayoutId id="2147483650" r:id="rId2"/>
-    <p:sldLayoutId id="2147483651" r:id="rId3"/>
-    <p:sldLayoutId id="2147483652" r:id="rId4"/>
-    <p:sldLayoutId id="2147483653" r:id="rId5"/>
-    <p:sldLayoutId id="2147483654" r:id="rId6"/>
-    <p:sldLayoutId id="2147483655" r:id="rId7"/>
-    <p:sldLayoutId id="2147483656" r:id="rId8"/>
-    <p:sldLayoutId id="2147483657" r:id="rId9"/>
-    <p:sldLayoutId id="2147483658" r:id="rId10"/>
-    <p:sldLayoutId id="2147483659" r:id="rId11"/>
+    <p:sldLayoutId id="2147483673" r:id="rId1"/>
+    <p:sldLayoutId id="2147483674" r:id="rId2"/>
+    <p:sldLayoutId id="2147483675" r:id="rId3"/>
+    <p:sldLayoutId id="2147483676" r:id="rId4"/>
+    <p:sldLayoutId id="2147483677" r:id="rId5"/>
+    <p:sldLayoutId id="2147483678" r:id="rId6"/>
+    <p:sldLayoutId id="2147483679" r:id="rId7"/>
+    <p:sldLayoutId id="2147483680" r:id="rId8"/>
+    <p:sldLayoutId id="2147483681" r:id="rId9"/>
+    <p:sldLayoutId id="2147483682" r:id="rId10"/>
+    <p:sldLayoutId id="2147483683" r:id="rId11"/>
   </p:sldLayoutIdLst>
   <p:txStyles>
     <p:titleStyle>
-      <a:lvl1pPr algn="l" defTabSz="914400" rtl="0" eaLnBrk="1" latinLnBrk="0" hangingPunct="1">
+      <a:lvl1pPr algn="ctr" defTabSz="914400" rtl="0" eaLnBrk="1" latinLnBrk="0" hangingPunct="1">
         <a:lnSpc>
           <a:spcPct val="90000"/>
         </a:lnSpc>
@@ -3031,9 +3824,9 @@
           <a:spcPct val="0"/>
         </a:spcBef>
         <a:buNone/>
-        <a:defRPr sz="4400" kern="1200">
+        <a:defRPr sz="2800" kern="1200" cap="all" spc="200" baseline="0">
           <a:solidFill>
-            <a:schemeClr val="tx1"/>
+            <a:srgbClr val="262626"/>
           </a:solidFill>
           <a:latin typeface="+mj-lt"/>
           <a:ea typeface="+mj-ea"/>
@@ -3044,104 +3837,137 @@
     <p:bodyStyle>
       <a:lvl1pPr marL="228600" indent="-228600" algn="l" defTabSz="914400" rtl="0" eaLnBrk="1" latinLnBrk="0" hangingPunct="1">
         <a:lnSpc>
-          <a:spcPct val="90000"/>
+          <a:spcPct val="100000"/>
         </a:lnSpc>
         <a:spcBef>
           <a:spcPts val="1000"/>
         </a:spcBef>
+        <a:buClr>
+          <a:schemeClr val="accent2"/>
+        </a:buClr>
         <a:buFont typeface="Arial" panose="020B0604020202020204" pitchFamily="34" charset="0"/>
         <a:buChar char="•"/>
-        <a:defRPr sz="2800" kern="1200">
+        <a:defRPr sz="1800" kern="1200">
           <a:solidFill>
-            <a:schemeClr val="tx1"/>
+            <a:schemeClr val="tx1">
+              <a:lumMod val="85000"/>
+              <a:lumOff val="15000"/>
+            </a:schemeClr>
           </a:solidFill>
           <a:latin typeface="+mn-lt"/>
           <a:ea typeface="+mn-ea"/>
           <a:cs typeface="+mn-cs"/>
         </a:defRPr>
       </a:lvl1pPr>
-      <a:lvl2pPr marL="685800" indent="-228600" algn="l" defTabSz="914400" rtl="0" eaLnBrk="1" latinLnBrk="0" hangingPunct="1">
+      <a:lvl2pPr marL="457200" indent="-228600" algn="l" defTabSz="914400" rtl="0" eaLnBrk="1" latinLnBrk="0" hangingPunct="1">
         <a:lnSpc>
-          <a:spcPct val="90000"/>
+          <a:spcPct val="100000"/>
         </a:lnSpc>
         <a:spcBef>
-          <a:spcPts val="500"/>
+          <a:spcPts val="1000"/>
         </a:spcBef>
+        <a:buClr>
+          <a:schemeClr val="accent2"/>
+        </a:buClr>
         <a:buFont typeface="Arial" panose="020B0604020202020204" pitchFamily="34" charset="0"/>
         <a:buChar char="•"/>
-        <a:defRPr sz="2400" kern="1200">
+        <a:defRPr sz="1600" kern="1200">
           <a:solidFill>
-            <a:schemeClr val="tx1"/>
+            <a:schemeClr val="tx1">
+              <a:lumMod val="85000"/>
+              <a:lumOff val="15000"/>
+            </a:schemeClr>
           </a:solidFill>
           <a:latin typeface="+mn-lt"/>
           <a:ea typeface="+mn-ea"/>
           <a:cs typeface="+mn-cs"/>
         </a:defRPr>
       </a:lvl2pPr>
-      <a:lvl3pPr marL="1143000" indent="-228600" algn="l" defTabSz="914400" rtl="0" eaLnBrk="1" latinLnBrk="0" hangingPunct="1">
+      <a:lvl3pPr marL="685800" indent="-228600" algn="l" defTabSz="914400" rtl="0" eaLnBrk="1" latinLnBrk="0" hangingPunct="1">
         <a:lnSpc>
-          <a:spcPct val="90000"/>
+          <a:spcPct val="100000"/>
         </a:lnSpc>
         <a:spcBef>
-          <a:spcPts val="500"/>
+          <a:spcPts val="1000"/>
         </a:spcBef>
+        <a:buClr>
+          <a:schemeClr val="accent2"/>
+        </a:buClr>
         <a:buFont typeface="Arial" panose="020B0604020202020204" pitchFamily="34" charset="0"/>
         <a:buChar char="•"/>
-        <a:defRPr sz="2000" kern="1200">
+        <a:defRPr sz="1600" kern="1200">
           <a:solidFill>
-            <a:schemeClr val="tx1"/>
+            <a:schemeClr val="tx1">
+              <a:lumMod val="85000"/>
+              <a:lumOff val="15000"/>
+            </a:schemeClr>
           </a:solidFill>
           <a:latin typeface="+mn-lt"/>
           <a:ea typeface="+mn-ea"/>
           <a:cs typeface="+mn-cs"/>
         </a:defRPr>
       </a:lvl3pPr>
-      <a:lvl4pPr marL="1600200" indent="-228600" algn="l" defTabSz="914400" rtl="0" eaLnBrk="1" latinLnBrk="0" hangingPunct="1">
+      <a:lvl4pPr marL="914400" indent="-228600" algn="l" defTabSz="914400" rtl="0" eaLnBrk="1" latinLnBrk="0" hangingPunct="1">
         <a:lnSpc>
-          <a:spcPct val="90000"/>
+          <a:spcPct val="100000"/>
         </a:lnSpc>
         <a:spcBef>
-          <a:spcPts val="500"/>
+          <a:spcPts val="1000"/>
         </a:spcBef>
+        <a:buClr>
+          <a:schemeClr val="accent2"/>
+        </a:buClr>
         <a:buFont typeface="Arial" panose="020B0604020202020204" pitchFamily="34" charset="0"/>
         <a:buChar char="•"/>
-        <a:defRPr sz="1800" kern="1200">
+        <a:defRPr sz="1600" kern="1200">
           <a:solidFill>
-            <a:schemeClr val="tx1"/>
+            <a:schemeClr val="tx1">
+              <a:lumMod val="85000"/>
+              <a:lumOff val="15000"/>
+            </a:schemeClr>
           </a:solidFill>
           <a:latin typeface="+mn-lt"/>
           <a:ea typeface="+mn-ea"/>
           <a:cs typeface="+mn-cs"/>
         </a:defRPr>
       </a:lvl4pPr>
-      <a:lvl5pPr marL="2057400" indent="-228600" algn="l" defTabSz="914400" rtl="0" eaLnBrk="1" latinLnBrk="0" hangingPunct="1">
+      <a:lvl5pPr marL="1143000" indent="-228600" algn="l" defTabSz="914400" rtl="0" eaLnBrk="1" latinLnBrk="0" hangingPunct="1">
         <a:lnSpc>
-          <a:spcPct val="90000"/>
+          <a:spcPct val="100000"/>
         </a:lnSpc>
         <a:spcBef>
-          <a:spcPts val="500"/>
+          <a:spcPts val="1000"/>
         </a:spcBef>
+        <a:buClr>
+          <a:schemeClr val="accent2"/>
+        </a:buClr>
         <a:buFont typeface="Arial" panose="020B0604020202020204" pitchFamily="34" charset="0"/>
         <a:buChar char="•"/>
-        <a:defRPr sz="1800" kern="1200">
+        <a:defRPr sz="1600" kern="1200">
           <a:solidFill>
-            <a:schemeClr val="tx1"/>
+            <a:schemeClr val="tx1">
+              <a:lumMod val="85000"/>
+              <a:lumOff val="15000"/>
+            </a:schemeClr>
           </a:solidFill>
           <a:latin typeface="+mn-lt"/>
           <a:ea typeface="+mn-ea"/>
           <a:cs typeface="+mn-cs"/>
         </a:defRPr>
       </a:lvl5pPr>
-      <a:lvl6pPr marL="2514600" indent="-228600" algn="l" defTabSz="914400" rtl="0" eaLnBrk="1" latinLnBrk="0" hangingPunct="1">
+      <a:lvl6pPr marL="1312863" indent="-228600" algn="l" defTabSz="914400" rtl="0" eaLnBrk="1" latinLnBrk="0" hangingPunct="1">
         <a:lnSpc>
-          <a:spcPct val="90000"/>
+          <a:spcPct val="100000"/>
         </a:lnSpc>
         <a:spcBef>
-          <a:spcPts val="500"/>
+          <a:spcPts val="1000"/>
         </a:spcBef>
+        <a:buClr>
+          <a:schemeClr val="accent2"/>
+        </a:buClr>
         <a:buFont typeface="Arial" panose="020B0604020202020204" pitchFamily="34" charset="0"/>
         <a:buChar char="•"/>
-        <a:defRPr sz="1800" kern="1200">
+        <a:defRPr sz="1600" kern="1200">
           <a:solidFill>
             <a:schemeClr val="tx1"/>
           </a:solidFill>
@@ -3150,16 +3976,19 @@
           <a:cs typeface="+mn-cs"/>
         </a:defRPr>
       </a:lvl6pPr>
-      <a:lvl7pPr marL="2971800" indent="-228600" algn="l" defTabSz="914400" rtl="0" eaLnBrk="1" latinLnBrk="0" hangingPunct="1">
+      <a:lvl7pPr marL="1484313" indent="-228600" algn="l" defTabSz="914400" rtl="0" eaLnBrk="1" latinLnBrk="0" hangingPunct="1">
         <a:lnSpc>
-          <a:spcPct val="90000"/>
+          <a:spcPct val="100000"/>
         </a:lnSpc>
         <a:spcBef>
-          <a:spcPts val="500"/>
+          <a:spcPts val="1000"/>
         </a:spcBef>
+        <a:buClr>
+          <a:schemeClr val="accent2"/>
+        </a:buClr>
         <a:buFont typeface="Arial" panose="020B0604020202020204" pitchFamily="34" charset="0"/>
         <a:buChar char="•"/>
-        <a:defRPr sz="1800" kern="1200">
+        <a:defRPr sz="1600" kern="1200">
           <a:solidFill>
             <a:schemeClr val="tx1"/>
           </a:solidFill>
@@ -3168,16 +3997,19 @@
           <a:cs typeface="+mn-cs"/>
         </a:defRPr>
       </a:lvl7pPr>
-      <a:lvl8pPr marL="3429000" indent="-228600" algn="l" defTabSz="914400" rtl="0" eaLnBrk="1" latinLnBrk="0" hangingPunct="1">
+      <a:lvl8pPr marL="1657350" indent="-228600" algn="l" defTabSz="914400" rtl="0" eaLnBrk="1" latinLnBrk="0" hangingPunct="1">
         <a:lnSpc>
-          <a:spcPct val="90000"/>
+          <a:spcPct val="100000"/>
         </a:lnSpc>
         <a:spcBef>
-          <a:spcPts val="500"/>
+          <a:spcPts val="1000"/>
         </a:spcBef>
+        <a:buClr>
+          <a:schemeClr val="accent2"/>
+        </a:buClr>
         <a:buFont typeface="Arial" panose="020B0604020202020204" pitchFamily="34" charset="0"/>
         <a:buChar char="•"/>
-        <a:defRPr sz="1800" kern="1200">
+        <a:defRPr sz="1600" kern="1200" baseline="0">
           <a:solidFill>
             <a:schemeClr val="tx1"/>
           </a:solidFill>
@@ -3186,16 +4018,19 @@
           <a:cs typeface="+mn-cs"/>
         </a:defRPr>
       </a:lvl8pPr>
-      <a:lvl9pPr marL="3886200" indent="-228600" algn="l" defTabSz="914400" rtl="0" eaLnBrk="1" latinLnBrk="0" hangingPunct="1">
+      <a:lvl9pPr marL="1882775" indent="-228600" algn="l" defTabSz="914400" rtl="0" eaLnBrk="1" latinLnBrk="0" hangingPunct="1">
         <a:lnSpc>
-          <a:spcPct val="90000"/>
+          <a:spcPct val="100000"/>
         </a:lnSpc>
         <a:spcBef>
-          <a:spcPts val="500"/>
+          <a:spcPts val="1000"/>
         </a:spcBef>
+        <a:buClr>
+          <a:schemeClr val="accent2"/>
+        </a:buClr>
         <a:buFont typeface="Arial" panose="020B0604020202020204" pitchFamily="34" charset="0"/>
         <a:buChar char="•"/>
-        <a:defRPr sz="1800" kern="1200">
+        <a:defRPr sz="1600" kern="1200" baseline="0">
           <a:solidFill>
             <a:schemeClr val="tx1"/>
           </a:solidFill>
@@ -3385,6 +4220,266 @@
 </file>
 
 <file path=ppt/theme/theme1.xml><?xml version="1.0" encoding="utf-8"?>
+<a:theme xmlns:a="http://schemas.openxmlformats.org/drawingml/2006/main" name="Parcel">
+  <a:themeElements>
+    <a:clrScheme name="Parcel">
+      <a:dk1>
+        <a:srgbClr val="000000"/>
+      </a:dk1>
+      <a:lt1>
+        <a:srgbClr val="FFFFFF"/>
+      </a:lt1>
+      <a:dk2>
+        <a:srgbClr val="4A5356"/>
+      </a:dk2>
+      <a:lt2>
+        <a:srgbClr val="E8E3CE"/>
+      </a:lt2>
+      <a:accent1>
+        <a:srgbClr val="F6A21D"/>
+      </a:accent1>
+      <a:accent2>
+        <a:srgbClr val="9BAFB5"/>
+      </a:accent2>
+      <a:accent3>
+        <a:srgbClr val="C96731"/>
+      </a:accent3>
+      <a:accent4>
+        <a:srgbClr val="9CA383"/>
+      </a:accent4>
+      <a:accent5>
+        <a:srgbClr val="87795D"/>
+      </a:accent5>
+      <a:accent6>
+        <a:srgbClr val="A0988C"/>
+      </a:accent6>
+      <a:hlink>
+        <a:srgbClr val="00B0F0"/>
+      </a:hlink>
+      <a:folHlink>
+        <a:srgbClr val="738F97"/>
+      </a:folHlink>
+    </a:clrScheme>
+    <a:fontScheme name="Parcel">
+      <a:majorFont>
+        <a:latin typeface="Gill Sans MT" panose="020B0502020104020203"/>
+        <a:ea typeface=""/>
+        <a:cs typeface=""/>
+        <a:font script="Grek" typeface="Corbel"/>
+        <a:font script="Cyrl" typeface="Corbel"/>
+        <a:font script="Jpan" typeface="HGｺﾞｼｯｸE"/>
+        <a:font script="Hang" typeface="휴먼매직체"/>
+        <a:font script="Hans" typeface="华文中宋"/>
+        <a:font script="Hant" typeface="微軟正黑體"/>
+        <a:font script="Arab" typeface="Majalla UI"/>
+        <a:font script="Hebr" typeface="Arial"/>
+        <a:font script="Thai" typeface="Cordia New"/>
+        <a:font script="Ethi" typeface="Nyala"/>
+        <a:font script="Beng" typeface="Vrinda"/>
+        <a:font script="Gujr" typeface="Shruti"/>
+        <a:font script="Khmr" typeface="DaunPenh"/>
+        <a:font script="Knda" typeface="Tunga"/>
+        <a:font script="Guru" typeface="Raavi"/>
+        <a:font script="Cans" typeface="Euphemia"/>
+        <a:font script="Cher" typeface="Plantagenet Cherokee"/>
+        <a:font script="Yiii" typeface="Microsoft Yi Baiti"/>
+        <a:font script="Tibt" typeface="Microsoft Himalaya"/>
+        <a:font script="Thaa" typeface="MV Boli"/>
+        <a:font script="Deva" typeface="Mangal"/>
+        <a:font script="Telu" typeface="Gautami"/>
+        <a:font script="Taml" typeface="Latha"/>
+        <a:font script="Syrc" typeface="Estrangelo Edessa"/>
+        <a:font script="Orya" typeface="Kalinga"/>
+        <a:font script="Mlym" typeface="Kartika"/>
+        <a:font script="Laoo" typeface="DokChampa"/>
+        <a:font script="Sinh" typeface="Iskoola Pota"/>
+        <a:font script="Mong" typeface="Mongolian Baiti"/>
+        <a:font script="Viet" typeface="Tahoma"/>
+        <a:font script="Uigh" typeface="Microsoft Uighur"/>
+        <a:font script="Geor" typeface="Sylfaen"/>
+      </a:majorFont>
+      <a:minorFont>
+        <a:latin typeface="Gill Sans MT" panose="020B0502020104020203"/>
+        <a:ea typeface=""/>
+        <a:cs typeface=""/>
+        <a:font script="Grek" typeface="Corbel"/>
+        <a:font script="Cyrl" typeface="Corbel"/>
+        <a:font script="Jpan" typeface="HGｺﾞｼｯｸE"/>
+        <a:font script="Hang" typeface="휴먼매직체"/>
+        <a:font script="Hans" typeface="华文中宋"/>
+        <a:font script="Hant" typeface="微軟正黑體"/>
+        <a:font script="Arab" typeface="Majalla UI"/>
+        <a:font script="Hebr" typeface="Arial"/>
+        <a:font script="Thai" typeface="Cordia New"/>
+        <a:font script="Ethi" typeface="Nyala"/>
+        <a:font script="Beng" typeface="Vrinda"/>
+        <a:font script="Gujr" typeface="Shruti"/>
+        <a:font script="Khmr" typeface="DaunPenh"/>
+        <a:font script="Knda" typeface="Tunga"/>
+        <a:font script="Guru" typeface="Raavi"/>
+        <a:font script="Cans" typeface="Euphemia"/>
+        <a:font script="Cher" typeface="Plantagenet Cherokee"/>
+        <a:font script="Yiii" typeface="Microsoft Yi Baiti"/>
+        <a:font script="Tibt" typeface="Microsoft Himalaya"/>
+        <a:font script="Thaa" typeface="MV Boli"/>
+        <a:font script="Deva" typeface="Mangal"/>
+        <a:font script="Telu" typeface="Gautami"/>
+        <a:font script="Taml" typeface="Latha"/>
+        <a:font script="Syrc" typeface="Estrangelo Edessa"/>
+        <a:font script="Orya" typeface="Kalinga"/>
+        <a:font script="Mlym" typeface="Kartika"/>
+        <a:font script="Laoo" typeface="DokChampa"/>
+        <a:font script="Sinh" typeface="Iskoola Pota"/>
+        <a:font script="Mong" typeface="Mongolian Baiti"/>
+        <a:font script="Viet" typeface="Tahoma"/>
+        <a:font script="Uigh" typeface="Microsoft Uighur"/>
+        <a:font script="Geor" typeface="Sylfaen"/>
+      </a:minorFont>
+    </a:fontScheme>
+    <a:fmtScheme name="Parcel">
+      <a:fillStyleLst>
+        <a:solidFill>
+          <a:schemeClr val="phClr"/>
+        </a:solidFill>
+        <a:gradFill rotWithShape="1">
+          <a:gsLst>
+            <a:gs pos="0">
+              <a:schemeClr val="phClr">
+                <a:tint val="80000"/>
+                <a:satMod val="107000"/>
+                <a:lumMod val="103000"/>
+              </a:schemeClr>
+            </a:gs>
+            <a:gs pos="100000">
+              <a:schemeClr val="phClr">
+                <a:tint val="82000"/>
+                <a:satMod val="109000"/>
+                <a:lumMod val="103000"/>
+              </a:schemeClr>
+            </a:gs>
+          </a:gsLst>
+          <a:lin ang="5400000" scaled="0"/>
+        </a:gradFill>
+        <a:gradFill rotWithShape="1">
+          <a:gsLst>
+            <a:gs pos="0">
+              <a:schemeClr val="phClr">
+                <a:tint val="97000"/>
+                <a:satMod val="100000"/>
+                <a:lumMod val="102000"/>
+              </a:schemeClr>
+            </a:gs>
+            <a:gs pos="50000">
+              <a:schemeClr val="phClr">
+                <a:shade val="100000"/>
+                <a:satMod val="103000"/>
+                <a:lumMod val="100000"/>
+              </a:schemeClr>
+            </a:gs>
+            <a:gs pos="100000">
+              <a:schemeClr val="phClr">
+                <a:shade val="93000"/>
+                <a:satMod val="110000"/>
+                <a:lumMod val="99000"/>
+              </a:schemeClr>
+            </a:gs>
+          </a:gsLst>
+          <a:lin ang="5400000" scaled="0"/>
+        </a:gradFill>
+      </a:fillStyleLst>
+      <a:lnStyleLst>
+        <a:ln w="6350" cap="flat" cmpd="sng" algn="ctr">
+          <a:solidFill>
+            <a:schemeClr val="phClr"/>
+          </a:solidFill>
+          <a:prstDash val="solid"/>
+        </a:ln>
+        <a:ln w="12700" cap="flat" cmpd="sng" algn="ctr">
+          <a:solidFill>
+            <a:schemeClr val="phClr"/>
+          </a:solidFill>
+          <a:prstDash val="solid"/>
+        </a:ln>
+        <a:ln w="31750" cap="flat" cmpd="sng" algn="ctr">
+          <a:solidFill>
+            <a:schemeClr val="phClr"/>
+          </a:solidFill>
+          <a:prstDash val="solid"/>
+        </a:ln>
+      </a:lnStyleLst>
+      <a:effectStyleLst>
+        <a:effectStyle>
+          <a:effectLst/>
+        </a:effectStyle>
+        <a:effectStyle>
+          <a:effectLst/>
+        </a:effectStyle>
+        <a:effectStyle>
+          <a:effectLst>
+            <a:outerShdw blurRad="55880" dist="15240" dir="5400000" algn="ctr" rotWithShape="0">
+              <a:srgbClr val="000000">
+                <a:alpha val="45000"/>
+              </a:srgbClr>
+            </a:outerShdw>
+          </a:effectLst>
+          <a:scene3d>
+            <a:camera prst="orthographicFront">
+              <a:rot lat="0" lon="0" rev="0"/>
+            </a:camera>
+            <a:lightRig rig="brightRoom" dir="tl"/>
+          </a:scene3d>
+          <a:sp3d prstMaterial="dkEdge">
+            <a:bevelT w="0" h="0"/>
+          </a:sp3d>
+        </a:effectStyle>
+      </a:effectStyleLst>
+      <a:bgFillStyleLst>
+        <a:solidFill>
+          <a:schemeClr val="phClr"/>
+        </a:solidFill>
+        <a:solidFill>
+          <a:schemeClr val="phClr">
+            <a:tint val="95000"/>
+            <a:satMod val="170000"/>
+          </a:schemeClr>
+        </a:solidFill>
+        <a:gradFill rotWithShape="1">
+          <a:gsLst>
+            <a:gs pos="0">
+              <a:schemeClr val="phClr">
+                <a:tint val="97000"/>
+                <a:shade val="100000"/>
+                <a:satMod val="185000"/>
+                <a:lumMod val="120000"/>
+              </a:schemeClr>
+            </a:gs>
+            <a:gs pos="100000">
+              <a:schemeClr val="phClr">
+                <a:tint val="96000"/>
+                <a:shade val="95000"/>
+                <a:satMod val="215000"/>
+                <a:lumMod val="80000"/>
+              </a:schemeClr>
+            </a:gs>
+          </a:gsLst>
+          <a:path path="circle">
+            <a:fillToRect l="50000" t="55000" r="125000" b="100000"/>
+          </a:path>
+        </a:gradFill>
+      </a:bgFillStyleLst>
+    </a:fmtScheme>
+  </a:themeElements>
+  <a:objectDefaults/>
+  <a:extraClrSchemeLst/>
+  <a:extLst>
+    <a:ext uri="{05A4C25C-085E-4340-85A3-A5531E510DB2}">
+      <thm15:themeFamily xmlns:thm15="http://schemas.microsoft.com/office/thememl/2012/main" name="Parcel" id="{8BEC4385-4EB9-4D53-BFB5-0EA123736B6D}" vid="{4DB32801-28C0-48B0-8C1D-A9A58613615A}"/>
+    </a:ext>
+  </a:extLst>
+</a:theme>
+</file>
+
+<file path=ppt/theme/theme2.xml><?xml version="1.0" encoding="utf-8"?>
 <a:theme xmlns:a="http://schemas.openxmlformats.org/drawingml/2006/main" name="Office Theme">
   <a:themeElements>
     <a:clrScheme name="Office">
@@ -3401,7 +4496,7 @@
         <a:srgbClr val="E7E6E6"/>
       </a:lt2>
       <a:accent1>
-        <a:srgbClr val="4472C4"/>
+        <a:srgbClr val="5B9BD5"/>
       </a:accent1>
       <a:accent2>
         <a:srgbClr val="ED7D31"/>
@@ -3413,7 +4508,7 @@
         <a:srgbClr val="FFC000"/>
       </a:accent4>
       <a:accent5>
-        <a:srgbClr val="5B9BD5"/>
+        <a:srgbClr val="4472C4"/>
       </a:accent5>
       <a:accent6>
         <a:srgbClr val="70AD47"/>
@@ -3460,23 +4555,6 @@
         <a:font script="Viet" typeface="Times New Roman"/>
         <a:font script="Uigh" typeface="Microsoft Uighur"/>
         <a:font script="Geor" typeface="Sylfaen"/>
-        <a:font script="Armn" typeface="Arial"/>
-        <a:font script="Bugi" typeface="Leelawadee UI"/>
-        <a:font script="Bopo" typeface="Microsoft JhengHei"/>
-        <a:font script="Java" typeface="Javanese Text"/>
-        <a:font script="Lisu" typeface="Segoe UI"/>
-        <a:font script="Mymr" typeface="Myanmar Text"/>
-        <a:font script="Nkoo" typeface="Ebrima"/>
-        <a:font script="Olck" typeface="Nirmala UI"/>
-        <a:font script="Osma" typeface="Ebrima"/>
-        <a:font script="Phag" typeface="Phagspa"/>
-        <a:font script="Syrn" typeface="Estrangelo Edessa"/>
-        <a:font script="Syrj" typeface="Estrangelo Edessa"/>
-        <a:font script="Syre" typeface="Estrangelo Edessa"/>
-        <a:font script="Sora" typeface="Nirmala UI"/>
-        <a:font script="Tale" typeface="Microsoft Tai Le"/>
-        <a:font script="Talu" typeface="Microsoft New Tai Lue"/>
-        <a:font script="Tfng" typeface="Ebrima"/>
       </a:majorFont>
       <a:minorFont>
         <a:latin typeface="Calibri" panose="020F0502020204030204"/>
@@ -3512,23 +4590,6 @@
         <a:font script="Viet" typeface="Arial"/>
         <a:font script="Uigh" typeface="Microsoft Uighur"/>
         <a:font script="Geor" typeface="Sylfaen"/>
-        <a:font script="Armn" typeface="Arial"/>
-        <a:font script="Bugi" typeface="Leelawadee UI"/>
-        <a:font script="Bopo" typeface="Microsoft JhengHei"/>
-        <a:font script="Java" typeface="Javanese Text"/>
-        <a:font script="Lisu" typeface="Segoe UI"/>
-        <a:font script="Mymr" typeface="Myanmar Text"/>
-        <a:font script="Nkoo" typeface="Ebrima"/>
-        <a:font script="Olck" typeface="Nirmala UI"/>
-        <a:font script="Osma" typeface="Ebrima"/>
-        <a:font script="Phag" typeface="Phagspa"/>
-        <a:font script="Syrn" typeface="Estrangelo Edessa"/>
-        <a:font script="Syrj" typeface="Estrangelo Edessa"/>
-        <a:font script="Syre" typeface="Estrangelo Edessa"/>
-        <a:font script="Sora" typeface="Nirmala UI"/>
-        <a:font script="Tale" typeface="Microsoft Tai Le"/>
-        <a:font script="Talu" typeface="Microsoft New Tai Lue"/>
-        <a:font script="Tfng" typeface="Ebrima"/>
       </a:minorFont>
     </a:fontScheme>
     <a:fmtScheme name="Office">

</xml_diff>

<commit_message>
remake some presentation ugh
</commit_message>
<xml_diff>
--- a/notes/presentation.pptx
+++ b/notes/presentation.pptx
@@ -214,7 +214,7 @@
           <a:p>
             <a:fld id="{FDF96BE0-DDC8-4B5A-BC10-EDDAFF2A2D2D}" type="datetimeFigureOut">
               <a:rPr lang="en-US" smtClean="0"/>
-              <a:t>8/9/2019</a:t>
+              <a:t>8/10/2019</a:t>
             </a:fld>
             <a:endParaRPr lang="en-US"/>
           </a:p>
@@ -527,7 +527,7 @@
           <a:p>
             <a:r>
               <a:rPr lang="en-US" dirty="0"/>
-              <a:t>Hello everyone! So this is “it” huh? </a:t>
+              <a:t>Hello everyone!</a:t>
             </a:r>
           </a:p>
           <a:p>
@@ -703,7 +703,7 @@
           <a:p>
             <a:fld id="{825F0330-01FC-4A5E-B2BE-FD83AA068E80}" type="slidenum">
               <a:rPr lang="en-US" smtClean="0"/>
-              <a:t>11</a:t>
+              <a:t>10</a:t>
             </a:fld>
             <a:endParaRPr lang="en-US"/>
           </a:p>
@@ -712,7 +712,7 @@
     </p:spTree>
     <p:extLst>
       <p:ext uri="{BB962C8B-B14F-4D97-AF65-F5344CB8AC3E}">
-        <p14:creationId xmlns:p14="http://schemas.microsoft.com/office/powerpoint/2010/main" val="2687214730"/>
+        <p14:creationId xmlns:p14="http://schemas.microsoft.com/office/powerpoint/2010/main" val="922850570"/>
       </p:ext>
     </p:extLst>
   </p:cSld>
@@ -768,7 +768,7 @@
           <a:p>
             <a:r>
               <a:rPr lang="en-US" dirty="0"/>
-              <a:t>Chr5 bigscan10</a:t>
+              <a:t>Chr5 bigscan5</a:t>
             </a:r>
           </a:p>
         </p:txBody>
@@ -790,7 +790,7 @@
           <a:p>
             <a:fld id="{825F0330-01FC-4A5E-B2BE-FD83AA068E80}" type="slidenum">
               <a:rPr lang="en-US" smtClean="0"/>
-              <a:t>12</a:t>
+              <a:t>11</a:t>
             </a:fld>
             <a:endParaRPr lang="en-US"/>
           </a:p>
@@ -799,7 +799,7 @@
     </p:spTree>
     <p:extLst>
       <p:ext uri="{BB962C8B-B14F-4D97-AF65-F5344CB8AC3E}">
-        <p14:creationId xmlns:p14="http://schemas.microsoft.com/office/powerpoint/2010/main" val="3880194407"/>
+        <p14:creationId xmlns:p14="http://schemas.microsoft.com/office/powerpoint/2010/main" val="2687214730"/>
       </p:ext>
     </p:extLst>
   </p:cSld>
@@ -855,20 +855,8 @@
           <a:p>
             <a:r>
               <a:rPr lang="en-US" dirty="0"/>
-              <a:t>CMs background</a:t>
-            </a:r>
-          </a:p>
-          <a:p>
-            <a:endParaRPr lang="en-US" dirty="0"/>
-          </a:p>
-          <a:p>
-            <a:r>
-              <a:rPr lang="en-US" dirty="0"/>
-              <a:t>Let’s go back to CMs. What are they exactly? TODO</a:t>
-            </a:r>
-          </a:p>
-          <a:p>
-            <a:endParaRPr lang="en-US" dirty="0"/>
+              <a:t>Chr5 bigscan10</a:t>
+            </a:r>
           </a:p>
         </p:txBody>
       </p:sp>
@@ -889,7 +877,7 @@
           <a:p>
             <a:fld id="{825F0330-01FC-4A5E-B2BE-FD83AA068E80}" type="slidenum">
               <a:rPr lang="en-US" smtClean="0"/>
-              <a:t>13</a:t>
+              <a:t>12</a:t>
             </a:fld>
             <a:endParaRPr lang="en-US"/>
           </a:p>
@@ -898,7 +886,7 @@
     </p:spTree>
     <p:extLst>
       <p:ext uri="{BB962C8B-B14F-4D97-AF65-F5344CB8AC3E}">
-        <p14:creationId xmlns:p14="http://schemas.microsoft.com/office/powerpoint/2010/main" val="3397674237"/>
+        <p14:creationId xmlns:p14="http://schemas.microsoft.com/office/powerpoint/2010/main" val="3880194407"/>
       </p:ext>
     </p:extLst>
   </p:cSld>
@@ -954,7 +942,7 @@
           <a:p>
             <a:r>
               <a:rPr lang="en-US" dirty="0"/>
-              <a:t>K-L divergence background</a:t>
+              <a:t>CMs background</a:t>
             </a:r>
           </a:p>
           <a:p>
@@ -963,7 +951,7 @@
           <a:p>
             <a:r>
               <a:rPr lang="en-US" dirty="0"/>
-              <a:t>Describe K-L divergence as a thing that exists</a:t>
+              <a:t>Let’s go back to CMs. What are they exactly?</a:t>
             </a:r>
           </a:p>
           <a:p>
@@ -978,7 +966,7 @@
             <a:spLocks noGrp="1"/>
           </p:cNvSpPr>
           <p:nvPr>
-            <p:ph type="sldNum" sz="quarter" idx="5"/>
+            <p:ph type="sldNum" sz="quarter" idx="10"/>
           </p:nvPr>
         </p:nvSpPr>
         <p:spPr/>
@@ -988,7 +976,7 @@
           <a:p>
             <a:fld id="{825F0330-01FC-4A5E-B2BE-FD83AA068E80}" type="slidenum">
               <a:rPr lang="en-US" smtClean="0"/>
-              <a:t>14</a:t>
+              <a:t>13</a:t>
             </a:fld>
             <a:endParaRPr lang="en-US"/>
           </a:p>
@@ -997,7 +985,7 @@
     </p:spTree>
     <p:extLst>
       <p:ext uri="{BB962C8B-B14F-4D97-AF65-F5344CB8AC3E}">
-        <p14:creationId xmlns:p14="http://schemas.microsoft.com/office/powerpoint/2010/main" val="1527747520"/>
+        <p14:creationId xmlns:p14="http://schemas.microsoft.com/office/powerpoint/2010/main" val="3397674237"/>
       </p:ext>
     </p:extLst>
   </p:cSld>
@@ -1053,7 +1041,7 @@
           <a:p>
             <a:r>
               <a:rPr lang="en-US" dirty="0"/>
-              <a:t>Scoring explanation</a:t>
+              <a:t>K-L divergence background</a:t>
             </a:r>
           </a:p>
           <a:p>
@@ -1062,17 +1050,7 @@
           <a:p>
             <a:r>
               <a:rPr lang="en-US" dirty="0"/>
-              <a:t>Now we have a lot of potential CMs above a score threshold that more than likely exist as patterns, but we also have a lot of overlapping between them. Some of the overlaps might be sensibly exact repeats, but some overlaps suggest an alternative folding. Almost all of them are different in some small regard, How do we collapse those overlaps?</a:t>
-            </a:r>
-          </a:p>
-          <a:p>
-            <a:r>
-              <a:rPr lang="en-US" dirty="0" err="1"/>
-              <a:t>Rfam</a:t>
-            </a:r>
-            <a:r>
-              <a:rPr lang="en-US" dirty="0"/>
-              <a:t> TODO</a:t>
+              <a:t>Describe K-L divergence as a thing that exists</a:t>
             </a:r>
           </a:p>
           <a:p>
@@ -1087,7 +1065,7 @@
             <a:spLocks noGrp="1"/>
           </p:cNvSpPr>
           <p:nvPr>
-            <p:ph type="sldNum" sz="quarter" idx="10"/>
+            <p:ph type="sldNum" sz="quarter" idx="5"/>
           </p:nvPr>
         </p:nvSpPr>
         <p:spPr/>
@@ -1097,7 +1075,7 @@
           <a:p>
             <a:fld id="{825F0330-01FC-4A5E-B2BE-FD83AA068E80}" type="slidenum">
               <a:rPr lang="en-US" smtClean="0"/>
-              <a:t>15</a:t>
+              <a:t>14</a:t>
             </a:fld>
             <a:endParaRPr lang="en-US"/>
           </a:p>
@@ -1106,7 +1084,7 @@
     </p:spTree>
     <p:extLst>
       <p:ext uri="{BB962C8B-B14F-4D97-AF65-F5344CB8AC3E}">
-        <p14:creationId xmlns:p14="http://schemas.microsoft.com/office/powerpoint/2010/main" val="2303391412"/>
+        <p14:creationId xmlns:p14="http://schemas.microsoft.com/office/powerpoint/2010/main" val="1527747520"/>
       </p:ext>
     </p:extLst>
   </p:cSld>
@@ -1162,7 +1140,7 @@
           <a:p>
             <a:r>
               <a:rPr lang="en-US" dirty="0"/>
-              <a:t>Scoring result exploration</a:t>
+              <a:t>Scoring explanation</a:t>
             </a:r>
           </a:p>
           <a:p>
@@ -1171,11 +1149,75 @@
           <a:p>
             <a:r>
               <a:rPr lang="en-US" dirty="0"/>
-              <a:t>Here’s the six ways we tried that and how clustering them turned out. Probably some of those ways weren’t very good..</a:t>
+              <a:t>have a lot of potential CMs above a score threshold </a:t>
+            </a:r>
+          </a:p>
+          <a:p>
+            <a:r>
+              <a:rPr lang="en-US" dirty="0"/>
+              <a:t>	- that more than likely exist as patterns</a:t>
+            </a:r>
+          </a:p>
+          <a:p>
+            <a:r>
+              <a:rPr lang="en-US" dirty="0"/>
+              <a:t>	- but we also have a lot of overlapping between them</a:t>
+            </a:r>
+          </a:p>
+          <a:p>
+            <a:r>
+              <a:rPr lang="en-US" dirty="0"/>
+              <a:t>	- Some of the overlaps might be sensibly exact repeats</a:t>
+            </a:r>
+          </a:p>
+          <a:p>
+            <a:r>
+              <a:rPr lang="en-US" dirty="0"/>
+              <a:t>	- some overlaps suggest an alternative folding</a:t>
+            </a:r>
+          </a:p>
+          <a:p>
+            <a:r>
+              <a:rPr lang="en-US" dirty="0"/>
+              <a:t>	- Almost all of them are different in some small regard</a:t>
+            </a:r>
+          </a:p>
+          <a:p>
+            <a:r>
+              <a:rPr lang="en-US" dirty="0"/>
+              <a:t>	- How do we collapse those overlaps?</a:t>
+            </a:r>
+          </a:p>
+          <a:p>
+            <a:r>
+              <a:rPr lang="en-US" dirty="0" err="1"/>
+              <a:t>Rfam</a:t>
+            </a:r>
+            <a:r>
+              <a:rPr lang="en-US" dirty="0"/>
+              <a:t>?</a:t>
             </a:r>
           </a:p>
           <a:p>
             <a:endParaRPr lang="en-US" dirty="0"/>
+          </a:p>
+          <a:p>
+            <a:r>
+              <a:rPr lang="en-US" dirty="0"/>
+              <a:t>Here’s the six ways we tried.</a:t>
+            </a:r>
+          </a:p>
+          <a:p>
+            <a:r>
+              <a:rPr lang="en-US" dirty="0"/>
+              <a:t>	- PQ had really high variance generally. PN also.</a:t>
+            </a:r>
+          </a:p>
+          <a:p>
+            <a:r>
+              <a:rPr lang="en-US" dirty="0"/>
+              <a:t>	- PQ2P I went with using</a:t>
+            </a:r>
           </a:p>
         </p:txBody>
       </p:sp>
@@ -1196,7 +1238,7 @@
           <a:p>
             <a:fld id="{825F0330-01FC-4A5E-B2BE-FD83AA068E80}" type="slidenum">
               <a:rPr lang="en-US" smtClean="0"/>
-              <a:t>16</a:t>
+              <a:t>15</a:t>
             </a:fld>
             <a:endParaRPr lang="en-US"/>
           </a:p>
@@ -1205,7 +1247,7 @@
     </p:spTree>
     <p:extLst>
       <p:ext uri="{BB962C8B-B14F-4D97-AF65-F5344CB8AC3E}">
-        <p14:creationId xmlns:p14="http://schemas.microsoft.com/office/powerpoint/2010/main" val="3402329955"/>
+        <p14:creationId xmlns:p14="http://schemas.microsoft.com/office/powerpoint/2010/main" val="2303391412"/>
       </p:ext>
     </p:extLst>
   </p:cSld>
@@ -1261,6 +1303,105 @@
           <a:p>
             <a:r>
               <a:rPr lang="en-US" dirty="0"/>
+              <a:t>Scoring result exploration</a:t>
+            </a:r>
+          </a:p>
+          <a:p>
+            <a:endParaRPr lang="en-US" dirty="0"/>
+          </a:p>
+          <a:p>
+            <a:r>
+              <a:rPr lang="en-US" dirty="0"/>
+              <a:t>Here’s how clustering them turned out. Probably some of those ways weren’t very good..</a:t>
+            </a:r>
+          </a:p>
+          <a:p>
+            <a:endParaRPr lang="en-US" dirty="0"/>
+          </a:p>
+        </p:txBody>
+      </p:sp>
+      <p:sp>
+        <p:nvSpPr>
+          <p:cNvPr id="4" name="Slide Number Placeholder 3"/>
+          <p:cNvSpPr>
+            <a:spLocks noGrp="1"/>
+          </p:cNvSpPr>
+          <p:nvPr>
+            <p:ph type="sldNum" sz="quarter" idx="10"/>
+          </p:nvPr>
+        </p:nvSpPr>
+        <p:spPr/>
+        <p:txBody>
+          <a:bodyPr/>
+          <a:lstStyle/>
+          <a:p>
+            <a:fld id="{825F0330-01FC-4A5E-B2BE-FD83AA068E80}" type="slidenum">
+              <a:rPr lang="en-US" smtClean="0"/>
+              <a:t>16</a:t>
+            </a:fld>
+            <a:endParaRPr lang="en-US"/>
+          </a:p>
+        </p:txBody>
+      </p:sp>
+    </p:spTree>
+    <p:extLst>
+      <p:ext uri="{BB962C8B-B14F-4D97-AF65-F5344CB8AC3E}">
+        <p14:creationId xmlns:p14="http://schemas.microsoft.com/office/powerpoint/2010/main" val="3402329955"/>
+      </p:ext>
+    </p:extLst>
+  </p:cSld>
+  <p:clrMapOvr>
+    <a:masterClrMapping/>
+  </p:clrMapOvr>
+</p:notes>
+</file>
+
+<file path=ppt/notesSlides/notesSlide17.xml><?xml version="1.0" encoding="utf-8"?>
+<p:notes xmlns:a="http://schemas.openxmlformats.org/drawingml/2006/main" xmlns:r="http://schemas.openxmlformats.org/officeDocument/2006/relationships" xmlns:p="http://schemas.openxmlformats.org/presentationml/2006/main">
+  <p:cSld>
+    <p:spTree>
+      <p:nvGrpSpPr>
+        <p:cNvPr id="1" name=""/>
+        <p:cNvGrpSpPr/>
+        <p:nvPr/>
+      </p:nvGrpSpPr>
+      <p:grpSpPr>
+        <a:xfrm>
+          <a:off x="0" y="0"/>
+          <a:ext cx="0" cy="0"/>
+          <a:chOff x="0" y="0"/>
+          <a:chExt cx="0" cy="0"/>
+        </a:xfrm>
+      </p:grpSpPr>
+      <p:sp>
+        <p:nvSpPr>
+          <p:cNvPr id="2" name="Slide Image Placeholder 1"/>
+          <p:cNvSpPr>
+            <a:spLocks noGrp="1" noRot="1" noChangeAspect="1"/>
+          </p:cNvSpPr>
+          <p:nvPr>
+            <p:ph type="sldImg"/>
+          </p:nvPr>
+        </p:nvSpPr>
+        <p:spPr/>
+      </p:sp>
+      <p:sp>
+        <p:nvSpPr>
+          <p:cNvPr id="3" name="Notes Placeholder 2"/>
+          <p:cNvSpPr>
+            <a:spLocks noGrp="1"/>
+          </p:cNvSpPr>
+          <p:nvPr>
+            <p:ph type="body" idx="1"/>
+          </p:nvPr>
+        </p:nvSpPr>
+        <p:spPr/>
+        <p:txBody>
+          <a:bodyPr/>
+          <a:lstStyle/>
+          <a:p>
+            <a:r>
+              <a:rPr lang="en-US" dirty="0"/>
               <a:t>Summary</a:t>
             </a:r>
           </a:p>
@@ -1317,7 +1458,7 @@
 </p:notes>
 </file>
 
-<file path=ppt/notesSlides/notesSlide17.xml><?xml version="1.0" encoding="utf-8"?>
+<file path=ppt/notesSlides/notesSlide18.xml><?xml version="1.0" encoding="utf-8"?>
 <p:notes xmlns:a="http://schemas.openxmlformats.org/drawingml/2006/main" xmlns:r="http://schemas.openxmlformats.org/officeDocument/2006/relationships" xmlns:p="http://schemas.openxmlformats.org/presentationml/2006/main">
   <p:cSld>
     <p:spTree>
@@ -2545,27 +2686,31 @@
           <a:p>
             <a:r>
               <a:rPr lang="en-US" dirty="0"/>
-              <a:t>That’s the motivation for why I’m interested in merging blocks.</a:t>
-            </a:r>
-          </a:p>
-          <a:p>
-            <a:r>
-              <a:rPr lang="en-US" dirty="0"/>
-              <a:t>Describe </a:t>
-            </a:r>
-            <a:r>
-              <a:rPr lang="en-US" dirty="0" err="1"/>
-              <a:t>synteny</a:t>
-            </a:r>
-            <a:r>
-              <a:rPr lang="en-US" dirty="0"/>
-              <a:t> blocks.</a:t>
+              <a:t>Describe “syntenic blocks”</a:t>
+            </a:r>
+          </a:p>
+          <a:p>
+            <a:r>
+              <a:rPr lang="en-US" dirty="0"/>
+              <a:t>	- Blocks that can be merged</a:t>
             </a:r>
           </a:p>
           <a:p>
             <a:r>
               <a:rPr lang="en-US" dirty="0"/>
               <a:t>Describe the motivations for how I’m merging them and the rules.</a:t>
+            </a:r>
+          </a:p>
+          <a:p>
+            <a:r>
+              <a:rPr lang="en-US" dirty="0"/>
+              <a:t>	- Rules apply per-species</a:t>
+            </a:r>
+          </a:p>
+          <a:p>
+            <a:r>
+              <a:rPr lang="en-US" dirty="0"/>
+              <a:t>	- Sequences that don’t fit all of these rules are excluded from the output</a:t>
             </a:r>
           </a:p>
         </p:txBody>
@@ -2683,7 +2828,31 @@
             </a:r>
             <a:r>
               <a:rPr lang="en-US" dirty="0"/>
-              <a:t>: simple, less redundant</a:t>
+              <a:t>:</a:t>
+            </a:r>
+          </a:p>
+          <a:p>
+            <a:r>
+              <a:rPr lang="en-US" dirty="0"/>
+              <a:t>	- group n blocks at a time</a:t>
+            </a:r>
+          </a:p>
+          <a:p>
+            <a:r>
+              <a:rPr lang="en-US" dirty="0"/>
+              <a:t>	- window shift down 1 block at a time</a:t>
+            </a:r>
+          </a:p>
+          <a:p>
+            <a:r>
+              <a:rPr lang="en-US" dirty="0"/>
+              <a:t>	- simple, less redundant</a:t>
+            </a:r>
+          </a:p>
+          <a:p>
+            <a:r>
+              <a:rPr lang="en-US" dirty="0"/>
+              <a:t>	- Short block error</a:t>
             </a:r>
           </a:p>
           <a:p>
@@ -2693,7 +2862,25 @@
             </a:r>
             <a:r>
               <a:rPr lang="en-US" dirty="0"/>
-              <a:t>: doesn’t have “short block error” but VERY redundant</a:t>
+              <a:t>: </a:t>
+            </a:r>
+          </a:p>
+          <a:p>
+            <a:r>
+              <a:rPr lang="en-US" dirty="0"/>
+              <a:t>	- within a length range for the REF sequence</a:t>
+            </a:r>
+          </a:p>
+          <a:p>
+            <a:r>
+              <a:rPr lang="en-US" dirty="0"/>
+              <a:t>	- doesn’t have “short block error”</a:t>
+            </a:r>
+          </a:p>
+          <a:p>
+            <a:r>
+              <a:rPr lang="en-US" dirty="0"/>
+              <a:t>	- VERY redundant</a:t>
             </a:r>
           </a:p>
         </p:txBody>
@@ -2780,7 +2967,7 @@
           <a:p>
             <a:r>
               <a:rPr lang="en-US" dirty="0"/>
-              <a:t>Chr5 bigscan5</a:t>
+              <a:t>Screenshot of the browser for chr5</a:t>
             </a:r>
           </a:p>
         </p:txBody>
@@ -2792,7 +2979,7 @@
             <a:spLocks noGrp="1"/>
           </p:cNvSpPr>
           <p:nvPr>
-            <p:ph type="sldNum" sz="quarter" idx="10"/>
+            <p:ph type="sldNum" sz="quarter" idx="5"/>
           </p:nvPr>
         </p:nvSpPr>
         <p:spPr/>
@@ -2802,7 +2989,7 @@
           <a:p>
             <a:fld id="{825F0330-01FC-4A5E-B2BE-FD83AA068E80}" type="slidenum">
               <a:rPr lang="en-US" smtClean="0"/>
-              <a:t>10</a:t>
+              <a:t>9</a:t>
             </a:fld>
             <a:endParaRPr lang="en-US"/>
           </a:p>
@@ -2811,7 +2998,7 @@
     </p:spTree>
     <p:extLst>
       <p:ext uri="{BB962C8B-B14F-4D97-AF65-F5344CB8AC3E}">
-        <p14:creationId xmlns:p14="http://schemas.microsoft.com/office/powerpoint/2010/main" val="922850570"/>
+        <p14:creationId xmlns:p14="http://schemas.microsoft.com/office/powerpoint/2010/main" val="597354951"/>
       </p:ext>
     </p:extLst>
   </p:cSld>
@@ -2984,7 +3171,7 @@
           <a:p>
             <a:fld id="{A71E6E4A-F1E9-49B1-A7E6-64E029784417}" type="datetimeFigureOut">
               <a:rPr lang="en-US" smtClean="0"/>
-              <a:t>8/9/2019</a:t>
+              <a:t>8/10/2019</a:t>
             </a:fld>
             <a:endParaRPr lang="en-US"/>
           </a:p>
@@ -3154,7 +3341,7 @@
           <a:p>
             <a:fld id="{A71E6E4A-F1E9-49B1-A7E6-64E029784417}" type="datetimeFigureOut">
               <a:rPr lang="en-US" smtClean="0"/>
-              <a:t>8/9/2019</a:t>
+              <a:t>8/10/2019</a:t>
             </a:fld>
             <a:endParaRPr lang="en-US"/>
           </a:p>
@@ -3334,7 +3521,7 @@
           <a:p>
             <a:fld id="{A71E6E4A-F1E9-49B1-A7E6-64E029784417}" type="datetimeFigureOut">
               <a:rPr lang="en-US" smtClean="0"/>
-              <a:t>8/9/2019</a:t>
+              <a:t>8/10/2019</a:t>
             </a:fld>
             <a:endParaRPr lang="en-US"/>
           </a:p>
@@ -3504,7 +3691,7 @@
           <a:p>
             <a:fld id="{A71E6E4A-F1E9-49B1-A7E6-64E029784417}" type="datetimeFigureOut">
               <a:rPr lang="en-US" smtClean="0"/>
-              <a:t>8/9/2019</a:t>
+              <a:t>8/10/2019</a:t>
             </a:fld>
             <a:endParaRPr lang="en-US"/>
           </a:p>
@@ -3772,7 +3959,7 @@
           <a:p>
             <a:fld id="{A71E6E4A-F1E9-49B1-A7E6-64E029784417}" type="datetimeFigureOut">
               <a:rPr lang="en-US" smtClean="0"/>
-              <a:t>8/9/2019</a:t>
+              <a:t>8/10/2019</a:t>
             </a:fld>
             <a:endParaRPr lang="en-US"/>
           </a:p>
@@ -4004,7 +4191,7 @@
           <a:p>
             <a:fld id="{A71E6E4A-F1E9-49B1-A7E6-64E029784417}" type="datetimeFigureOut">
               <a:rPr lang="en-US" smtClean="0"/>
-              <a:t>8/9/2019</a:t>
+              <a:t>8/10/2019</a:t>
             </a:fld>
             <a:endParaRPr lang="en-US"/>
           </a:p>
@@ -4363,7 +4550,7 @@
           <a:p>
             <a:fld id="{A71E6E4A-F1E9-49B1-A7E6-64E029784417}" type="datetimeFigureOut">
               <a:rPr lang="en-US" smtClean="0"/>
-              <a:t>8/9/2019</a:t>
+              <a:t>8/10/2019</a:t>
             </a:fld>
             <a:endParaRPr lang="en-US"/>
           </a:p>
@@ -4504,7 +4691,7 @@
           <a:p>
             <a:fld id="{A71E6E4A-F1E9-49B1-A7E6-64E029784417}" type="datetimeFigureOut">
               <a:rPr lang="en-US" smtClean="0"/>
-              <a:t>8/9/2019</a:t>
+              <a:t>8/10/2019</a:t>
             </a:fld>
             <a:endParaRPr lang="en-US"/>
           </a:p>
@@ -4599,7 +4786,7 @@
           <a:p>
             <a:fld id="{A71E6E4A-F1E9-49B1-A7E6-64E029784417}" type="datetimeFigureOut">
               <a:rPr lang="en-US" smtClean="0"/>
-              <a:t>8/9/2019</a:t>
+              <a:t>8/10/2019</a:t>
             </a:fld>
             <a:endParaRPr lang="en-US"/>
           </a:p>
@@ -4956,7 +5143,7 @@
           <a:p>
             <a:fld id="{A71E6E4A-F1E9-49B1-A7E6-64E029784417}" type="datetimeFigureOut">
               <a:rPr lang="en-US" smtClean="0"/>
-              <a:t>8/9/2019</a:t>
+              <a:t>8/10/2019</a:t>
             </a:fld>
             <a:endParaRPr lang="en-US"/>
           </a:p>
@@ -5313,7 +5500,7 @@
           <a:p>
             <a:fld id="{A71E6E4A-F1E9-49B1-A7E6-64E029784417}" type="datetimeFigureOut">
               <a:rPr lang="en-US" smtClean="0"/>
-              <a:t>8/9/2019</a:t>
+              <a:t>8/10/2019</a:t>
             </a:fld>
             <a:endParaRPr lang="en-US"/>
           </a:p>
@@ -5554,7 +5741,7 @@
           <a:p>
             <a:fld id="{A71E6E4A-F1E9-49B1-A7E6-64E029784417}" type="datetimeFigureOut">
               <a:rPr lang="en-US" smtClean="0"/>
-              <a:t>8/9/2019</a:t>
+              <a:t>8/10/2019</a:t>
             </a:fld>
             <a:endParaRPr lang="en-US"/>
           </a:p>
@@ -6484,11 +6671,117 @@
             </a:pPr>
             <a:r>
               <a:rPr lang="en-US" dirty="0"/>
-              <a:t>Not symmetric, sometimes </a:t>
-            </a:r>
-          </a:p>
-        </p:txBody>
-      </p:sp>
+              <a:t>Usually not symmetric: can add </a:t>
+            </a:r>
+            <a:r>
+              <a:rPr lang="en-US" dirty="0" err="1"/>
+              <a:t>Dkl</a:t>
+            </a:r>
+            <a:r>
+              <a:rPr lang="en-US" dirty="0"/>
+              <a:t>(P||Q)+</a:t>
+            </a:r>
+            <a:r>
+              <a:rPr lang="en-US" dirty="0" err="1"/>
+              <a:t>Dkl</a:t>
+            </a:r>
+            <a:r>
+              <a:rPr lang="en-US" dirty="0"/>
+              <a:t>(Q||P) to get symmetric score</a:t>
+            </a:r>
+          </a:p>
+          <a:p>
+            <a:pPr marL="0" indent="0">
+              <a:buNone/>
+            </a:pPr>
+            <a:endParaRPr lang="en-US" dirty="0"/>
+          </a:p>
+          <a:p>
+            <a:pPr marL="0" indent="0">
+              <a:buNone/>
+            </a:pPr>
+            <a:r>
+              <a:rPr lang="en-US" dirty="0"/>
+              <a:t>Continuous distributions:</a:t>
+            </a:r>
+          </a:p>
+          <a:p>
+            <a:pPr marL="0" indent="0">
+              <a:buNone/>
+            </a:pPr>
+            <a:endParaRPr lang="en-US" dirty="0"/>
+          </a:p>
+          <a:p>
+            <a:pPr marL="0" indent="0">
+              <a:buNone/>
+            </a:pPr>
+            <a:r>
+              <a:rPr lang="en-US" dirty="0"/>
+              <a:t>Discrete distributions:</a:t>
+            </a:r>
+          </a:p>
+        </p:txBody>
+      </p:sp>
+      <p:pic>
+        <p:nvPicPr>
+          <p:cNvPr id="4" name="Picture 3">
+            <a:extLst>
+              <a:ext uri="{FF2B5EF4-FFF2-40B4-BE49-F238E27FC236}">
+                <a16:creationId xmlns:a16="http://schemas.microsoft.com/office/drawing/2014/main" id="{B0799644-F426-41E2-AC19-D3214414E508}"/>
+              </a:ext>
+            </a:extLst>
+          </p:cNvPr>
+          <p:cNvPicPr>
+            <a:picLocks noChangeAspect="1"/>
+          </p:cNvPicPr>
+          <p:nvPr/>
+        </p:nvPicPr>
+        <p:blipFill>
+          <a:blip r:embed="rId3"/>
+          <a:stretch>
+            <a:fillRect/>
+          </a:stretch>
+        </p:blipFill>
+        <p:spPr>
+          <a:xfrm>
+            <a:off x="4899230" y="4512853"/>
+            <a:ext cx="3219450" cy="752475"/>
+          </a:xfrm>
+          <a:prstGeom prst="rect">
+            <a:avLst/>
+          </a:prstGeom>
+        </p:spPr>
+      </p:pic>
+      <p:pic>
+        <p:nvPicPr>
+          <p:cNvPr id="5" name="Picture 4">
+            <a:extLst>
+              <a:ext uri="{FF2B5EF4-FFF2-40B4-BE49-F238E27FC236}">
+                <a16:creationId xmlns:a16="http://schemas.microsoft.com/office/drawing/2014/main" id="{0116C498-D0FE-4987-A31D-60067A0C857B}"/>
+              </a:ext>
+            </a:extLst>
+          </p:cNvPr>
+          <p:cNvPicPr>
+            <a:picLocks noChangeAspect="1"/>
+          </p:cNvPicPr>
+          <p:nvPr/>
+        </p:nvPicPr>
+        <p:blipFill>
+          <a:blip r:embed="rId4"/>
+          <a:stretch>
+            <a:fillRect/>
+          </a:stretch>
+        </p:blipFill>
+        <p:spPr>
+          <a:xfrm>
+            <a:off x="4899230" y="3670462"/>
+            <a:ext cx="3505200" cy="600075"/>
+          </a:xfrm>
+          <a:prstGeom prst="rect">
+            <a:avLst/>
+          </a:prstGeom>
+        </p:spPr>
+      </p:pic>
     </p:spTree>
     <p:extLst>
       <p:ext uri="{BB962C8B-B14F-4D97-AF65-F5344CB8AC3E}">
@@ -6556,7 +6849,104 @@
           <a:bodyPr/>
           <a:lstStyle/>
           <a:p>
+            <a:pPr marL="0" indent="0">
+              <a:buNone/>
+            </a:pPr>
+            <a:r>
+              <a:rPr lang="en-US" dirty="0"/>
+              <a:t>Hard to estimate divergence for all discrete distributions [1]</a:t>
+            </a:r>
+          </a:p>
+          <a:p>
+            <a:pPr marL="0" indent="0">
+              <a:buNone/>
+            </a:pPr>
+            <a:r>
+              <a:rPr lang="en-US" dirty="0"/>
+              <a:t>Infernal </a:t>
+            </a:r>
+            <a:r>
+              <a:rPr lang="en-US" dirty="0" err="1"/>
+              <a:t>bitscore</a:t>
+            </a:r>
+            <a:r>
+              <a:rPr lang="en-US" dirty="0"/>
+              <a:t> = log2(P/null)</a:t>
+            </a:r>
+          </a:p>
+          <a:p>
+            <a:pPr marL="0" indent="0">
+              <a:buNone/>
+            </a:pPr>
             <a:endParaRPr lang="en-US" dirty="0"/>
+          </a:p>
+          <a:p>
+            <a:pPr marL="0" indent="0">
+              <a:buNone/>
+            </a:pPr>
+            <a:r>
+              <a:rPr lang="en-US" dirty="0"/>
+              <a:t>6 estimation methods tested:</a:t>
+            </a:r>
+          </a:p>
+          <a:p>
+            <a:pPr marL="0" indent="0">
+              <a:buNone/>
+            </a:pPr>
+            <a:r>
+              <a:rPr lang="en-US" dirty="0"/>
+              <a:t>Sampling: sample from P only, sample from both P and Q</a:t>
+            </a:r>
+          </a:p>
+          <a:p>
+            <a:pPr marL="0" indent="0">
+              <a:buNone/>
+            </a:pPr>
+            <a:r>
+              <a:rPr lang="en-US" dirty="0"/>
+              <a:t>Correction: direct avg, corrected 2^Pbitscore, corrected 2^Pbitscore/null</a:t>
+            </a:r>
+          </a:p>
+        </p:txBody>
+      </p:sp>
+      <p:sp>
+        <p:nvSpPr>
+          <p:cNvPr id="4" name="Footer Placeholder 3">
+            <a:extLst>
+              <a:ext uri="{FF2B5EF4-FFF2-40B4-BE49-F238E27FC236}">
+                <a16:creationId xmlns:a16="http://schemas.microsoft.com/office/drawing/2014/main" id="{77434E9B-CC34-48AF-9F01-A0E8EEE87F9B}"/>
+              </a:ext>
+            </a:extLst>
+          </p:cNvPr>
+          <p:cNvSpPr>
+            <a:spLocks noGrp="1"/>
+          </p:cNvSpPr>
+          <p:nvPr>
+            <p:ph type="ftr" sz="quarter" idx="11"/>
+          </p:nvPr>
+        </p:nvSpPr>
+        <p:spPr>
+          <a:xfrm>
+            <a:off x="1600200" y="5471652"/>
+            <a:ext cx="7989277" cy="1069825"/>
+          </a:xfrm>
+        </p:spPr>
+        <p:txBody>
+          <a:bodyPr/>
+          <a:lstStyle/>
+          <a:p>
+            <a:r>
+              <a:rPr lang="en-US" dirty="0"/>
+              <a:t>[1] Bu, </a:t>
+            </a:r>
+            <a:r>
+              <a:rPr lang="en-US" dirty="0" err="1"/>
+              <a:t>Yuheng</a:t>
+            </a:r>
+            <a:r>
+              <a:rPr lang="en-US" dirty="0"/>
+              <a:t> et al. “Estimation of KL Divergence: Optimal Minimax Rate”. </a:t>
+            </a:r>
           </a:p>
         </p:txBody>
       </p:sp>
@@ -6698,7 +7088,51 @@
           <a:bodyPr/>
           <a:lstStyle/>
           <a:p>
-            <a:endParaRPr lang="en-US"/>
+            <a:pPr marL="0" indent="0">
+              <a:buNone/>
+            </a:pPr>
+            <a:r>
+              <a:rPr lang="en-US" dirty="0"/>
+              <a:t>Done:</a:t>
+            </a:r>
+          </a:p>
+          <a:p>
+            <a:r>
+              <a:rPr lang="en-US" dirty="0"/>
+              <a:t>Merge alignment blocks</a:t>
+            </a:r>
+          </a:p>
+          <a:p>
+            <a:r>
+              <a:rPr lang="en-US" dirty="0"/>
+              <a:t>Scoring method for comparing CMs</a:t>
+            </a:r>
+          </a:p>
+          <a:p>
+            <a:pPr marL="0" indent="0">
+              <a:buNone/>
+            </a:pPr>
+            <a:r>
+              <a:rPr lang="en-US" dirty="0"/>
+              <a:t>Future work?:</a:t>
+            </a:r>
+          </a:p>
+          <a:p>
+            <a:r>
+              <a:rPr lang="en-US" dirty="0"/>
+              <a:t>Evaluate score threshold quality</a:t>
+            </a:r>
+          </a:p>
+          <a:p>
+            <a:r>
+              <a:rPr lang="en-US" dirty="0"/>
+              <a:t>Compare against </a:t>
+            </a:r>
+            <a:r>
+              <a:rPr lang="en-US" dirty="0" err="1"/>
+              <a:t>Rfam</a:t>
+            </a:r>
+            <a:endParaRPr lang="en-US" dirty="0"/>
           </a:p>
         </p:txBody>
       </p:sp>
@@ -7336,8 +7770,8 @@
         </p:nvSpPr>
         <p:spPr>
           <a:xfrm>
-            <a:off x="1600200" y="4958862"/>
-            <a:ext cx="7989277" cy="1582615"/>
+            <a:off x="1600200" y="5471652"/>
+            <a:ext cx="7989277" cy="1069825"/>
           </a:xfrm>
         </p:spPr>
         <p:txBody>
@@ -7386,7 +7820,7 @@
             </a:r>
             <a:r>
               <a:rPr lang="en-US" dirty="0"/>
-              <a:t> RNA motif finding algorithm”. In: Bioinformatics 22 (4 Feb. 2006), pp. 445–452. doi:10.1093/bioinformatics/btk008. </a:t>
+              <a:t> RNA motif finding algorithm”. </a:t>
             </a:r>
           </a:p>
           <a:p>
@@ -7400,18 +7834,11 @@
             </a:r>
             <a:r>
               <a:rPr lang="en-US" dirty="0"/>
-              <a:t> Yao et al. “A Computational Pipeline for High-Throughput Discovery of cis-Regulatory Noncoding RNA in Prokaryotes”. In: </a:t>
-            </a:r>
-            <a:r>
-              <a:rPr lang="en-US" dirty="0" err="1"/>
-              <a:t>PLoS</a:t>
-            </a:r>
-            <a:r>
-              <a:rPr lang="en-US" dirty="0"/>
-              <a:t> Computational Biology 3 (7 July 2007), e126.doi:10.1371/journal.pcbi.0030126.6 </a:t>
-            </a:r>
-          </a:p>
-          <a:p>
+              <a:t> Yao et al. “A Computational Pipeline for High-Throughput Discovery of cis-Regulatory Noncoding RNA in Prokaryotes”</a:t>
+            </a:r>
+            <a:br>
+              <a:rPr lang="en-US" dirty="0"/>
+            </a:br>
             <a:r>
               <a:rPr lang="en-US" dirty="0"/>
               <a:t>[3] </a:t>
@@ -7430,15 +7857,7 @@
             </a:r>
             <a:r>
               <a:rPr lang="en-US" dirty="0"/>
-              <a:t> comparative genomics pipeline”. In: Nucleic Acids Research 35 (14 June 2007), pp. 4809–4819.doi:10.1093/</a:t>
-            </a:r>
-            <a:r>
-              <a:rPr lang="en-US" dirty="0" err="1"/>
-              <a:t>nar</a:t>
-            </a:r>
-            <a:r>
-              <a:rPr lang="en-US" dirty="0"/>
-              <a:t>/gkm487.</a:t>
+              <a:t> comparative genomics pipeline”.</a:t>
             </a:r>
           </a:p>
           <a:p>
@@ -7452,7 +7871,7 @@
             </a:r>
             <a:r>
               <a:rPr lang="en-US" dirty="0"/>
-              <a:t> et al. “The identification and functional annotation of RNA structures conserved in vertebrates”. In: Genome Research 27 (8 May 2017), pp. 1371–1383. doi:10.1101/gr.208652.116.</a:t>
+              <a:t> et al. “The identification and functional annotation of RNA structures conserved in vertebrates”.</a:t>
             </a:r>
           </a:p>
         </p:txBody>
@@ -7860,7 +8279,7 @@
           <p:nvPr/>
         </p:nvPicPr>
         <p:blipFill>
-          <a:blip r:embed="rId2"/>
+          <a:blip r:embed="rId3"/>
           <a:stretch>
             <a:fillRect/>
           </a:stretch>

</xml_diff>

<commit_message>
patch up presentation info
</commit_message>
<xml_diff>
--- a/notes/presentation.pptx
+++ b/notes/presentation.pptx
@@ -5,7 +5,7 @@
     <p:sldMasterId id="2147483672" r:id="rId1"/>
   </p:sldMasterIdLst>
   <p:notesMasterIdLst>
-    <p:notesMasterId r:id="rId20"/>
+    <p:notesMasterId r:id="rId21"/>
   </p:notesMasterIdLst>
   <p:sldIdLst>
     <p:sldId id="256" r:id="rId2"/>
@@ -24,8 +24,9 @@
     <p:sldId id="266" r:id="rId15"/>
     <p:sldId id="267" r:id="rId16"/>
     <p:sldId id="268" r:id="rId17"/>
-    <p:sldId id="269" r:id="rId18"/>
-    <p:sldId id="270" r:id="rId19"/>
+    <p:sldId id="275" r:id="rId18"/>
+    <p:sldId id="269" r:id="rId19"/>
+    <p:sldId id="270" r:id="rId20"/>
   </p:sldIdLst>
   <p:sldSz cx="12192000" cy="6858000"/>
   <p:notesSz cx="6858000" cy="9144000"/>
@@ -1402,22 +1403,12 @@
           <a:p>
             <a:r>
               <a:rPr lang="en-US" dirty="0"/>
-              <a:t>Summary</a:t>
-            </a:r>
-          </a:p>
-          <a:p>
-            <a:r>
-              <a:rPr lang="en-US" dirty="0"/>
-              <a:t>Review of the things that I did.</a:t>
-            </a:r>
-          </a:p>
-          <a:p>
-            <a:r>
-              <a:rPr lang="en-US" dirty="0"/>
-              <a:t>Should I mention the things that I didn’t do?</a:t>
-            </a:r>
-          </a:p>
-          <a:p>
+              <a:t>Scoring </a:t>
+            </a:r>
+            <a:r>
+              <a:rPr lang="en-US"/>
+              <a:t>result exploration</a:t>
+            </a:r>
             <a:endParaRPr lang="en-US" dirty="0"/>
           </a:p>
         </p:txBody>
@@ -1448,7 +1439,7 @@
     </p:spTree>
     <p:extLst>
       <p:ext uri="{BB962C8B-B14F-4D97-AF65-F5344CB8AC3E}">
-        <p14:creationId xmlns:p14="http://schemas.microsoft.com/office/powerpoint/2010/main" val="468221222"/>
+        <p14:creationId xmlns:p14="http://schemas.microsoft.com/office/powerpoint/2010/main" val="2757846790"/>
       </p:ext>
     </p:extLst>
   </p:cSld>
@@ -1502,6 +1493,24 @@
           <a:bodyPr/>
           <a:lstStyle/>
           <a:p>
+            <a:r>
+              <a:rPr lang="en-US" dirty="0"/>
+              <a:t>Summary</a:t>
+            </a:r>
+          </a:p>
+          <a:p>
+            <a:r>
+              <a:rPr lang="en-US" dirty="0"/>
+              <a:t>Review of the things that I did.</a:t>
+            </a:r>
+          </a:p>
+          <a:p>
+            <a:r>
+              <a:rPr lang="en-US" dirty="0"/>
+              <a:t>Should I mention the things that I didn’t do?</a:t>
+            </a:r>
+          </a:p>
+          <a:p>
             <a:endParaRPr lang="en-US" dirty="0"/>
           </a:p>
         </p:txBody>
@@ -1524,6 +1533,90 @@
             <a:fld id="{825F0330-01FC-4A5E-B2BE-FD83AA068E80}" type="slidenum">
               <a:rPr lang="en-US" smtClean="0"/>
               <a:t>18</a:t>
+            </a:fld>
+            <a:endParaRPr lang="en-US"/>
+          </a:p>
+        </p:txBody>
+      </p:sp>
+    </p:spTree>
+    <p:extLst>
+      <p:ext uri="{BB962C8B-B14F-4D97-AF65-F5344CB8AC3E}">
+        <p14:creationId xmlns:p14="http://schemas.microsoft.com/office/powerpoint/2010/main" val="468221222"/>
+      </p:ext>
+    </p:extLst>
+  </p:cSld>
+  <p:clrMapOvr>
+    <a:masterClrMapping/>
+  </p:clrMapOvr>
+</p:notes>
+</file>
+
+<file path=ppt/notesSlides/notesSlide19.xml><?xml version="1.0" encoding="utf-8"?>
+<p:notes xmlns:a="http://schemas.openxmlformats.org/drawingml/2006/main" xmlns:r="http://schemas.openxmlformats.org/officeDocument/2006/relationships" xmlns:p="http://schemas.openxmlformats.org/presentationml/2006/main">
+  <p:cSld>
+    <p:spTree>
+      <p:nvGrpSpPr>
+        <p:cNvPr id="1" name=""/>
+        <p:cNvGrpSpPr/>
+        <p:nvPr/>
+      </p:nvGrpSpPr>
+      <p:grpSpPr>
+        <a:xfrm>
+          <a:off x="0" y="0"/>
+          <a:ext cx="0" cy="0"/>
+          <a:chOff x="0" y="0"/>
+          <a:chExt cx="0" cy="0"/>
+        </a:xfrm>
+      </p:grpSpPr>
+      <p:sp>
+        <p:nvSpPr>
+          <p:cNvPr id="2" name="Slide Image Placeholder 1"/>
+          <p:cNvSpPr>
+            <a:spLocks noGrp="1" noRot="1" noChangeAspect="1"/>
+          </p:cNvSpPr>
+          <p:nvPr>
+            <p:ph type="sldImg"/>
+          </p:nvPr>
+        </p:nvSpPr>
+        <p:spPr/>
+      </p:sp>
+      <p:sp>
+        <p:nvSpPr>
+          <p:cNvPr id="3" name="Notes Placeholder 2"/>
+          <p:cNvSpPr>
+            <a:spLocks noGrp="1"/>
+          </p:cNvSpPr>
+          <p:nvPr>
+            <p:ph type="body" idx="1"/>
+          </p:nvPr>
+        </p:nvSpPr>
+        <p:spPr/>
+        <p:txBody>
+          <a:bodyPr/>
+          <a:lstStyle/>
+          <a:p>
+            <a:endParaRPr lang="en-US" dirty="0"/>
+          </a:p>
+        </p:txBody>
+      </p:sp>
+      <p:sp>
+        <p:nvSpPr>
+          <p:cNvPr id="4" name="Slide Number Placeholder 3"/>
+          <p:cNvSpPr>
+            <a:spLocks noGrp="1"/>
+          </p:cNvSpPr>
+          <p:nvPr>
+            <p:ph type="sldNum" sz="quarter" idx="10"/>
+          </p:nvPr>
+        </p:nvSpPr>
+        <p:spPr/>
+        <p:txBody>
+          <a:bodyPr/>
+          <a:lstStyle/>
+          <a:p>
+            <a:fld id="{825F0330-01FC-4A5E-B2BE-FD83AA068E80}" type="slidenum">
+              <a:rPr lang="en-US" smtClean="0"/>
+              <a:t>19</a:t>
             </a:fld>
             <a:endParaRPr lang="en-US"/>
           </a:p>
@@ -7012,15 +7105,105 @@
             <p:ph idx="1"/>
           </p:nvPr>
         </p:nvSpPr>
-        <p:spPr/>
-        <p:txBody>
-          <a:bodyPr/>
-          <a:lstStyle/>
-          <a:p>
-            <a:endParaRPr lang="en-US"/>
-          </a:p>
-        </p:txBody>
-      </p:sp>
+        <p:spPr>
+          <a:xfrm>
+            <a:off x="2231136" y="2638044"/>
+            <a:ext cx="3097220" cy="3412800"/>
+          </a:xfrm>
+        </p:spPr>
+        <p:txBody>
+          <a:bodyPr>
+            <a:normAutofit/>
+          </a:bodyPr>
+          <a:lstStyle/>
+          <a:p>
+            <a:pPr marL="0" indent="0">
+              <a:buNone/>
+            </a:pPr>
+            <a:r>
+              <a:rPr lang="en-US" dirty="0"/>
+              <a:t>Distance matrix between CMs</a:t>
+            </a:r>
+          </a:p>
+          <a:p>
+            <a:pPr marL="0" indent="0">
+              <a:buNone/>
+            </a:pPr>
+            <a:r>
+              <a:rPr lang="en-US" dirty="0"/>
+              <a:t>Can be converted to affinity matrix</a:t>
+            </a:r>
+          </a:p>
+          <a:p>
+            <a:pPr marL="0" indent="0">
+              <a:buNone/>
+            </a:pPr>
+            <a:endParaRPr lang="en-US" dirty="0"/>
+          </a:p>
+          <a:p>
+            <a:pPr marL="0" indent="0">
+              <a:buNone/>
+            </a:pPr>
+            <a:r>
+              <a:rPr lang="en-US" dirty="0"/>
+              <a:t>Use spectral clustering to group (graph interpretation)</a:t>
+            </a:r>
+          </a:p>
+          <a:p>
+            <a:pPr marL="0" indent="0">
+              <a:buNone/>
+            </a:pPr>
+            <a:endParaRPr lang="en-US" dirty="0"/>
+          </a:p>
+          <a:p>
+            <a:pPr marL="0" indent="0">
+              <a:buNone/>
+            </a:pPr>
+            <a:r>
+              <a:rPr lang="en-US" dirty="0"/>
+              <a:t>For visualization: use Force Atlas (</a:t>
+            </a:r>
+            <a:r>
+              <a:rPr lang="en-US" dirty="0" err="1"/>
+              <a:t>Gephi</a:t>
+            </a:r>
+            <a:r>
+              <a:rPr lang="en-US" dirty="0"/>
+              <a:t>)                        &gt;</a:t>
+            </a:r>
+          </a:p>
+        </p:txBody>
+      </p:sp>
+      <p:pic>
+        <p:nvPicPr>
+          <p:cNvPr id="5" name="Picture 4">
+            <a:extLst>
+              <a:ext uri="{FF2B5EF4-FFF2-40B4-BE49-F238E27FC236}">
+                <a16:creationId xmlns:a16="http://schemas.microsoft.com/office/drawing/2014/main" id="{CB64E4A9-68EA-4BA7-B6D6-02080498DA71}"/>
+              </a:ext>
+            </a:extLst>
+          </p:cNvPr>
+          <p:cNvPicPr>
+            <a:picLocks noChangeAspect="1"/>
+          </p:cNvPicPr>
+          <p:nvPr/>
+        </p:nvPicPr>
+        <p:blipFill>
+          <a:blip r:embed="rId3"/>
+          <a:stretch>
+            <a:fillRect/>
+          </a:stretch>
+        </p:blipFill>
+        <p:spPr>
+          <a:xfrm>
+            <a:off x="5224507" y="2330770"/>
+            <a:ext cx="6109216" cy="3884835"/>
+          </a:xfrm>
+          <a:prstGeom prst="rect">
+            <a:avLst/>
+          </a:prstGeom>
+        </p:spPr>
+      </p:pic>
     </p:spTree>
     <p:extLst>
       <p:ext uri="{BB962C8B-B14F-4D97-AF65-F5344CB8AC3E}">
@@ -7068,6 +7251,105 @@
           <a:p>
             <a:r>
               <a:rPr lang="en-US" dirty="0"/>
+              <a:t>Clustering CMs</a:t>
+            </a:r>
+          </a:p>
+        </p:txBody>
+      </p:sp>
+      <p:sp>
+        <p:nvSpPr>
+          <p:cNvPr id="3" name="Content Placeholder 2"/>
+          <p:cNvSpPr>
+            <a:spLocks noGrp="1"/>
+          </p:cNvSpPr>
+          <p:nvPr>
+            <p:ph idx="1"/>
+          </p:nvPr>
+        </p:nvSpPr>
+        <p:spPr>
+          <a:xfrm>
+            <a:off x="2231135" y="2638044"/>
+            <a:ext cx="7729727" cy="3412800"/>
+          </a:xfrm>
+        </p:spPr>
+        <p:txBody>
+          <a:bodyPr>
+            <a:normAutofit/>
+          </a:bodyPr>
+          <a:lstStyle/>
+          <a:p>
+            <a:pPr marL="0" indent="0">
+              <a:buNone/>
+            </a:pPr>
+            <a:r>
+              <a:rPr lang="en-US" dirty="0"/>
+              <a:t>This was done for a much larger set of CMs!</a:t>
+            </a:r>
+          </a:p>
+          <a:p>
+            <a:pPr marL="0" indent="0">
+              <a:buNone/>
+            </a:pPr>
+            <a:endParaRPr lang="en-US" dirty="0"/>
+          </a:p>
+          <a:p>
+            <a:pPr marL="0" indent="0">
+              <a:buNone/>
+            </a:pPr>
+            <a:r>
+              <a:rPr lang="en-US" dirty="0"/>
+              <a:t>The visualization software wasn’t cooperating…</a:t>
+            </a:r>
+          </a:p>
+        </p:txBody>
+      </p:sp>
+    </p:spTree>
+    <p:extLst>
+      <p:ext uri="{BB962C8B-B14F-4D97-AF65-F5344CB8AC3E}">
+        <p14:creationId xmlns:p14="http://schemas.microsoft.com/office/powerpoint/2010/main" val="1819394198"/>
+      </p:ext>
+    </p:extLst>
+  </p:cSld>
+  <p:clrMapOvr>
+    <a:masterClrMapping/>
+  </p:clrMapOvr>
+</p:sld>
+</file>
+
+<file path=ppt/slides/slide18.xml><?xml version="1.0" encoding="utf-8"?>
+<p:sld xmlns:a="http://schemas.openxmlformats.org/drawingml/2006/main" xmlns:r="http://schemas.openxmlformats.org/officeDocument/2006/relationships" xmlns:p="http://schemas.openxmlformats.org/presentationml/2006/main">
+  <p:cSld>
+    <p:spTree>
+      <p:nvGrpSpPr>
+        <p:cNvPr id="1" name=""/>
+        <p:cNvGrpSpPr/>
+        <p:nvPr/>
+      </p:nvGrpSpPr>
+      <p:grpSpPr>
+        <a:xfrm>
+          <a:off x="0" y="0"/>
+          <a:ext cx="0" cy="0"/>
+          <a:chOff x="0" y="0"/>
+          <a:chExt cx="0" cy="0"/>
+        </a:xfrm>
+      </p:grpSpPr>
+      <p:sp>
+        <p:nvSpPr>
+          <p:cNvPr id="2" name="Title 1"/>
+          <p:cNvSpPr>
+            <a:spLocks noGrp="1"/>
+          </p:cNvSpPr>
+          <p:nvPr>
+            <p:ph type="title"/>
+          </p:nvPr>
+        </p:nvSpPr>
+        <p:spPr/>
+        <p:txBody>
+          <a:bodyPr/>
+          <a:lstStyle/>
+          <a:p>
+            <a:r>
+              <a:rPr lang="en-US" dirty="0"/>
               <a:t>Review</a:t>
             </a:r>
           </a:p>
@@ -7149,7 +7431,7 @@
 </p:sld>
 </file>
 
-<file path=ppt/slides/slide18.xml><?xml version="1.0" encoding="utf-8"?>
+<file path=ppt/slides/slide19.xml><?xml version="1.0" encoding="utf-8"?>
 <p:sld xmlns:a="http://schemas.openxmlformats.org/drawingml/2006/main" xmlns:r="http://schemas.openxmlformats.org/officeDocument/2006/relationships" xmlns:p="http://schemas.openxmlformats.org/presentationml/2006/main">
   <p:cSld>
     <p:spTree>

</xml_diff>